<commit_message>
add knime material and my workflows
</commit_message>
<xml_diff>
--- a/Part 2 - Introduction to Machine Learning/Introduction to Machine Learning.pptx
+++ b/Part 2 - Introduction to Machine Learning/Introduction to Machine Learning.pptx
@@ -21,19 +21,21 @@
     <p:sldId id="462" r:id="rId18"/>
     <p:sldId id="459" r:id="rId19"/>
     <p:sldId id="592" r:id="rId20"/>
-    <p:sldId id="461" r:id="rId21"/>
-    <p:sldId id="580" r:id="rId22"/>
-    <p:sldId id="581" r:id="rId23"/>
-    <p:sldId id="582" r:id="rId24"/>
-    <p:sldId id="583" r:id="rId25"/>
-    <p:sldId id="584" r:id="rId26"/>
-    <p:sldId id="585" r:id="rId27"/>
-    <p:sldId id="586" r:id="rId28"/>
-    <p:sldId id="587" r:id="rId29"/>
-    <p:sldId id="593" r:id="rId30"/>
-    <p:sldId id="594" r:id="rId31"/>
-    <p:sldId id="595" r:id="rId32"/>
-    <p:sldId id="589" r:id="rId33"/>
+    <p:sldId id="3317" r:id="rId21"/>
+    <p:sldId id="392" r:id="rId22"/>
+    <p:sldId id="1511" r:id="rId23"/>
+    <p:sldId id="580" r:id="rId24"/>
+    <p:sldId id="581" r:id="rId25"/>
+    <p:sldId id="582" r:id="rId26"/>
+    <p:sldId id="583" r:id="rId27"/>
+    <p:sldId id="584" r:id="rId28"/>
+    <p:sldId id="585" r:id="rId29"/>
+    <p:sldId id="586" r:id="rId30"/>
+    <p:sldId id="587" r:id="rId31"/>
+    <p:sldId id="593" r:id="rId32"/>
+    <p:sldId id="594" r:id="rId33"/>
+    <p:sldId id="595" r:id="rId34"/>
+    <p:sldId id="589" r:id="rId35"/>
   </p:sldIdLst>
   <p:sldSz cx="12192000" cy="6858000"/>
   <p:notesSz cx="6858000" cy="9144000"/>
@@ -143,6 +145,7 @@
 <file path=ppt/revisionInfo.xml><?xml version="1.0" encoding="utf-8"?>
 <p1510:revInfo xmlns:a="http://schemas.openxmlformats.org/drawingml/2006/main" xmlns:r="http://schemas.openxmlformats.org/officeDocument/2006/relationships" xmlns:p1510="http://schemas.microsoft.com/office/powerpoint/2015/10/main">
   <p1510:revLst>
+    <p1510:client id="{01CCA8BA-5B80-4D38-88F0-6F62E5B1BF6B}" v="6" dt="2025-08-02T04:50:29.083"/>
     <p1510:client id="{D8A0DC6E-ADDD-400D-BCAB-883DB6FDE99C}" v="101" dt="2025-08-01T13:05:08.747"/>
   </p1510:revLst>
 </p1510:revInfo>
@@ -150,6 +153,285 @@
 
 <file path=ppt/changesInfos/changesInfo1.xml><?xml version="1.0" encoding="utf-8"?>
 <pc:chgInfo xmlns:a="http://schemas.openxmlformats.org/drawingml/2006/main" xmlns:r="http://schemas.openxmlformats.org/officeDocument/2006/relationships" xmlns:ac="http://schemas.microsoft.com/office/drawing/2013/main/command" xmlns:pc="http://schemas.microsoft.com/office/powerpoint/2013/main/command">
+  <pc:docChgLst>
+    <pc:chgData name="Mohammed Fasha" userId="cc64f42d-a1a6-4f08-b97b-0c37f877119f" providerId="ADAL" clId="{30B40AC3-5669-44FB-A9B9-80E8E88C9E32}"/>
+    <pc:docChg chg="undo custSel addSld delSld modSld">
+      <pc:chgData name="Mohammed Fasha" userId="cc64f42d-a1a6-4f08-b97b-0c37f877119f" providerId="ADAL" clId="{30B40AC3-5669-44FB-A9B9-80E8E88C9E32}" dt="2024-10-21T08:00:22.594" v="429" actId="207"/>
+      <pc:docMkLst>
+        <pc:docMk/>
+      </pc:docMkLst>
+      <pc:sldChg chg="modSp">
+        <pc:chgData name="Mohammed Fasha" userId="cc64f42d-a1a6-4f08-b97b-0c37f877119f" providerId="ADAL" clId="{30B40AC3-5669-44FB-A9B9-80E8E88C9E32}" dt="2024-10-21T07:01:55.743" v="0" actId="207"/>
+        <pc:sldMkLst>
+          <pc:docMk/>
+          <pc:sldMk cId="4051642265" sldId="268"/>
+        </pc:sldMkLst>
+      </pc:sldChg>
+      <pc:sldChg chg="modSp">
+        <pc:chgData name="Mohammed Fasha" userId="cc64f42d-a1a6-4f08-b97b-0c37f877119f" providerId="ADAL" clId="{30B40AC3-5669-44FB-A9B9-80E8E88C9E32}" dt="2024-10-21T07:23:44.619" v="11"/>
+        <pc:sldMkLst>
+          <pc:docMk/>
+          <pc:sldMk cId="1260131707" sldId="277"/>
+        </pc:sldMkLst>
+      </pc:sldChg>
+      <pc:sldChg chg="addSp delSp modSp add del">
+        <pc:chgData name="Mohammed Fasha" userId="cc64f42d-a1a6-4f08-b97b-0c37f877119f" providerId="ADAL" clId="{30B40AC3-5669-44FB-A9B9-80E8E88C9E32}" dt="2024-10-21T07:42:04.586" v="230" actId="2696"/>
+        <pc:sldMkLst>
+          <pc:docMk/>
+          <pc:sldMk cId="3743348053" sldId="456"/>
+        </pc:sldMkLst>
+      </pc:sldChg>
+      <pc:sldChg chg="addSp delSp modSp add del">
+        <pc:chgData name="Mohammed Fasha" userId="cc64f42d-a1a6-4f08-b97b-0c37f877119f" providerId="ADAL" clId="{30B40AC3-5669-44FB-A9B9-80E8E88C9E32}" dt="2024-10-21T07:43:37.674" v="248" actId="2696"/>
+        <pc:sldMkLst>
+          <pc:docMk/>
+          <pc:sldMk cId="1914310957" sldId="457"/>
+        </pc:sldMkLst>
+      </pc:sldChg>
+      <pc:sldChg chg="addSp delSp modSp add del">
+        <pc:chgData name="Mohammed Fasha" userId="cc64f42d-a1a6-4f08-b97b-0c37f877119f" providerId="ADAL" clId="{30B40AC3-5669-44FB-A9B9-80E8E88C9E32}" dt="2024-10-21T07:43:44.968" v="251" actId="2696"/>
+        <pc:sldMkLst>
+          <pc:docMk/>
+          <pc:sldMk cId="1563484610" sldId="458"/>
+        </pc:sldMkLst>
+      </pc:sldChg>
+      <pc:sldChg chg="addSp delSp modSp add del">
+        <pc:chgData name="Mohammed Fasha" userId="cc64f42d-a1a6-4f08-b97b-0c37f877119f" providerId="ADAL" clId="{30B40AC3-5669-44FB-A9B9-80E8E88C9E32}" dt="2024-10-21T07:43:48.926" v="253" actId="2696"/>
+        <pc:sldMkLst>
+          <pc:docMk/>
+          <pc:sldMk cId="3782395966" sldId="459"/>
+        </pc:sldMkLst>
+      </pc:sldChg>
+      <pc:sldChg chg="addSp delSp modSp add">
+        <pc:chgData name="Mohammed Fasha" userId="cc64f42d-a1a6-4f08-b97b-0c37f877119f" providerId="ADAL" clId="{30B40AC3-5669-44FB-A9B9-80E8E88C9E32}" dt="2024-10-21T07:58:46.456" v="410" actId="207"/>
+        <pc:sldMkLst>
+          <pc:docMk/>
+          <pc:sldMk cId="713799975" sldId="460"/>
+        </pc:sldMkLst>
+      </pc:sldChg>
+      <pc:sldChg chg="addSp delSp modSp add">
+        <pc:chgData name="Mohammed Fasha" userId="cc64f42d-a1a6-4f08-b97b-0c37f877119f" providerId="ADAL" clId="{30B40AC3-5669-44FB-A9B9-80E8E88C9E32}" dt="2024-10-21T08:00:22.594" v="429" actId="207"/>
+        <pc:sldMkLst>
+          <pc:docMk/>
+          <pc:sldMk cId="1559487564" sldId="461"/>
+        </pc:sldMkLst>
+      </pc:sldChg>
+      <pc:sldChg chg="addSp delSp modSp add">
+        <pc:chgData name="Mohammed Fasha" userId="cc64f42d-a1a6-4f08-b97b-0c37f877119f" providerId="ADAL" clId="{30B40AC3-5669-44FB-A9B9-80E8E88C9E32}" dt="2024-10-21T07:54:42.825" v="379" actId="207"/>
+        <pc:sldMkLst>
+          <pc:docMk/>
+          <pc:sldMk cId="3087456825" sldId="462"/>
+        </pc:sldMkLst>
+      </pc:sldChg>
+      <pc:sldChg chg="addSp delSp modSp add">
+        <pc:chgData name="Mohammed Fasha" userId="cc64f42d-a1a6-4f08-b97b-0c37f877119f" providerId="ADAL" clId="{30B40AC3-5669-44FB-A9B9-80E8E88C9E32}" dt="2024-10-21T07:56:10.314" v="392" actId="14100"/>
+        <pc:sldMkLst>
+          <pc:docMk/>
+          <pc:sldMk cId="1869085755" sldId="463"/>
+        </pc:sldMkLst>
+      </pc:sldChg>
+      <pc:sldChg chg="addSp modSp add">
+        <pc:chgData name="Mohammed Fasha" userId="cc64f42d-a1a6-4f08-b97b-0c37f877119f" providerId="ADAL" clId="{30B40AC3-5669-44FB-A9B9-80E8E88C9E32}" dt="2024-10-21T07:56:43.392" v="396" actId="5793"/>
+        <pc:sldMkLst>
+          <pc:docMk/>
+          <pc:sldMk cId="4139560" sldId="464"/>
+        </pc:sldMkLst>
+      </pc:sldChg>
+      <pc:sldChg chg="addSp modSp add">
+        <pc:chgData name="Mohammed Fasha" userId="cc64f42d-a1a6-4f08-b97b-0c37f877119f" providerId="ADAL" clId="{30B40AC3-5669-44FB-A9B9-80E8E88C9E32}" dt="2024-10-21T07:57:39.264" v="404" actId="207"/>
+        <pc:sldMkLst>
+          <pc:docMk/>
+          <pc:sldMk cId="277181267" sldId="465"/>
+        </pc:sldMkLst>
+      </pc:sldChg>
+    </pc:docChg>
+  </pc:docChgLst>
+  <pc:docChgLst>
+    <pc:chgData name="Mohammed Fasha" userId="cc64f42d-a1a6-4f08-b97b-0c37f877119f" providerId="ADAL" clId="{D1859E10-E91F-4CD4-B9AD-657F2116AC8C}"/>
+    <pc:docChg chg="custSel modMainMaster">
+      <pc:chgData name="Mohammed Fasha" userId="cc64f42d-a1a6-4f08-b97b-0c37f877119f" providerId="ADAL" clId="{D1859E10-E91F-4CD4-B9AD-657F2116AC8C}" dt="2024-11-09T05:23:14.444" v="3" actId="1076"/>
+      <pc:docMkLst>
+        <pc:docMk/>
+      </pc:docMkLst>
+      <pc:sldMasterChg chg="addSp delSp modSp mod">
+        <pc:chgData name="Mohammed Fasha" userId="cc64f42d-a1a6-4f08-b97b-0c37f877119f" providerId="ADAL" clId="{D1859E10-E91F-4CD4-B9AD-657F2116AC8C}" dt="2024-11-09T05:23:14.444" v="3" actId="1076"/>
+        <pc:sldMasterMkLst>
+          <pc:docMk/>
+          <pc:sldMasterMk cId="2573801746" sldId="2147483648"/>
+        </pc:sldMasterMkLst>
+      </pc:sldMasterChg>
+    </pc:docChg>
+  </pc:docChgLst>
+  <pc:docChgLst>
+    <pc:chgData name="Mohammed Fasha" userId="cc64f42d-a1a6-4f08-b97b-0c37f877119f" providerId="ADAL" clId="{985CD171-9E4A-4264-B045-872AAA800AE3}"/>
+    <pc:docChg chg="undo custSel addSld delSld modSld sldOrd">
+      <pc:chgData name="Mohammed Fasha" userId="cc64f42d-a1a6-4f08-b97b-0c37f877119f" providerId="ADAL" clId="{985CD171-9E4A-4264-B045-872AAA800AE3}" dt="2024-10-16T08:02:59.311" v="633" actId="404"/>
+      <pc:docMkLst>
+        <pc:docMk/>
+      </pc:docMkLst>
+      <pc:sldChg chg="modSp">
+        <pc:chgData name="Mohammed Fasha" userId="cc64f42d-a1a6-4f08-b97b-0c37f877119f" providerId="ADAL" clId="{985CD171-9E4A-4264-B045-872AAA800AE3}" dt="2024-10-16T07:15:21.970" v="481" actId="27636"/>
+        <pc:sldMkLst>
+          <pc:docMk/>
+          <pc:sldMk cId="1162554463" sldId="257"/>
+        </pc:sldMkLst>
+      </pc:sldChg>
+      <pc:sldChg chg="addSp modSp">
+        <pc:chgData name="Mohammed Fasha" userId="cc64f42d-a1a6-4f08-b97b-0c37f877119f" providerId="ADAL" clId="{985CD171-9E4A-4264-B045-872AAA800AE3}" dt="2024-10-16T07:06:03.884" v="437" actId="1076"/>
+        <pc:sldMkLst>
+          <pc:docMk/>
+          <pc:sldMk cId="706735111" sldId="258"/>
+        </pc:sldMkLst>
+      </pc:sldChg>
+      <pc:sldChg chg="addSp delSp modSp ord">
+        <pc:chgData name="Mohammed Fasha" userId="cc64f42d-a1a6-4f08-b97b-0c37f877119f" providerId="ADAL" clId="{985CD171-9E4A-4264-B045-872AAA800AE3}" dt="2024-10-16T07:00:38.831" v="349" actId="207"/>
+        <pc:sldMkLst>
+          <pc:docMk/>
+          <pc:sldMk cId="4289469650" sldId="261"/>
+        </pc:sldMkLst>
+      </pc:sldChg>
+      <pc:sldChg chg="addSp delSp modSp ord">
+        <pc:chgData name="Mohammed Fasha" userId="cc64f42d-a1a6-4f08-b97b-0c37f877119f" providerId="ADAL" clId="{985CD171-9E4A-4264-B045-872AAA800AE3}" dt="2024-10-16T06:46:39.846" v="191" actId="14100"/>
+        <pc:sldMkLst>
+          <pc:docMk/>
+          <pc:sldMk cId="4130133658" sldId="262"/>
+        </pc:sldMkLst>
+      </pc:sldChg>
+      <pc:sldChg chg="addSp modSp ord">
+        <pc:chgData name="Mohammed Fasha" userId="cc64f42d-a1a6-4f08-b97b-0c37f877119f" providerId="ADAL" clId="{985CD171-9E4A-4264-B045-872AAA800AE3}" dt="2024-10-16T07:55:18.576" v="615" actId="207"/>
+        <pc:sldMkLst>
+          <pc:docMk/>
+          <pc:sldMk cId="4074862586" sldId="263"/>
+        </pc:sldMkLst>
+      </pc:sldChg>
+      <pc:sldChg chg="addSp delSp modSp add">
+        <pc:chgData name="Mohammed Fasha" userId="cc64f42d-a1a6-4f08-b97b-0c37f877119f" providerId="ADAL" clId="{985CD171-9E4A-4264-B045-872AAA800AE3}" dt="2024-10-16T07:54:33.790" v="610"/>
+        <pc:sldMkLst>
+          <pc:docMk/>
+          <pc:sldMk cId="2611575643" sldId="264"/>
+        </pc:sldMkLst>
+      </pc:sldChg>
+      <pc:sldChg chg="addSp modSp add ord">
+        <pc:chgData name="Mohammed Fasha" userId="cc64f42d-a1a6-4f08-b97b-0c37f877119f" providerId="ADAL" clId="{985CD171-9E4A-4264-B045-872AAA800AE3}" dt="2024-10-16T07:08:38.092" v="475" actId="27636"/>
+        <pc:sldMkLst>
+          <pc:docMk/>
+          <pc:sldMk cId="335199774" sldId="265"/>
+        </pc:sldMkLst>
+      </pc:sldChg>
+      <pc:sldChg chg="addSp delSp modSp add">
+        <pc:chgData name="Mohammed Fasha" userId="cc64f42d-a1a6-4f08-b97b-0c37f877119f" providerId="ADAL" clId="{985CD171-9E4A-4264-B045-872AAA800AE3}" dt="2024-10-16T07:02:57.901" v="385" actId="27636"/>
+        <pc:sldMkLst>
+          <pc:docMk/>
+          <pc:sldMk cId="2810357117" sldId="266"/>
+        </pc:sldMkLst>
+      </pc:sldChg>
+      <pc:sldChg chg="addSp modSp add">
+        <pc:chgData name="Mohammed Fasha" userId="cc64f42d-a1a6-4f08-b97b-0c37f877119f" providerId="ADAL" clId="{985CD171-9E4A-4264-B045-872AAA800AE3}" dt="2024-10-16T07:03:19.455" v="397" actId="27636"/>
+        <pc:sldMkLst>
+          <pc:docMk/>
+          <pc:sldMk cId="2433706687" sldId="267"/>
+        </pc:sldMkLst>
+      </pc:sldChg>
+      <pc:sldChg chg="addSp modSp add">
+        <pc:chgData name="Mohammed Fasha" userId="cc64f42d-a1a6-4f08-b97b-0c37f877119f" providerId="ADAL" clId="{985CD171-9E4A-4264-B045-872AAA800AE3}" dt="2024-10-16T08:00:33.047" v="616" actId="14100"/>
+        <pc:sldMkLst>
+          <pc:docMk/>
+          <pc:sldMk cId="4051642265" sldId="268"/>
+        </pc:sldMkLst>
+      </pc:sldChg>
+      <pc:sldChg chg="addSp modSp add">
+        <pc:chgData name="Mohammed Fasha" userId="cc64f42d-a1a6-4f08-b97b-0c37f877119f" providerId="ADAL" clId="{985CD171-9E4A-4264-B045-872AAA800AE3}" dt="2024-10-16T07:04:05.205" v="412" actId="14100"/>
+        <pc:sldMkLst>
+          <pc:docMk/>
+          <pc:sldMk cId="87410777" sldId="269"/>
+        </pc:sldMkLst>
+      </pc:sldChg>
+      <pc:sldChg chg="addSp modSp add">
+        <pc:chgData name="Mohammed Fasha" userId="cc64f42d-a1a6-4f08-b97b-0c37f877119f" providerId="ADAL" clId="{985CD171-9E4A-4264-B045-872AAA800AE3}" dt="2024-10-16T07:04:34.185" v="419" actId="14100"/>
+        <pc:sldMkLst>
+          <pc:docMk/>
+          <pc:sldMk cId="595502031" sldId="270"/>
+        </pc:sldMkLst>
+      </pc:sldChg>
+      <pc:sldChg chg="addSp modSp add ord">
+        <pc:chgData name="Mohammed Fasha" userId="cc64f42d-a1a6-4f08-b97b-0c37f877119f" providerId="ADAL" clId="{985CD171-9E4A-4264-B045-872AAA800AE3}" dt="2024-10-16T07:03:52.480" v="404" actId="27636"/>
+        <pc:sldMkLst>
+          <pc:docMk/>
+          <pc:sldMk cId="3925652072" sldId="271"/>
+        </pc:sldMkLst>
+      </pc:sldChg>
+      <pc:sldChg chg="addSp modSp add">
+        <pc:chgData name="Mohammed Fasha" userId="cc64f42d-a1a6-4f08-b97b-0c37f877119f" providerId="ADAL" clId="{985CD171-9E4A-4264-B045-872AAA800AE3}" dt="2024-10-16T07:04:42.805" v="424" actId="1076"/>
+        <pc:sldMkLst>
+          <pc:docMk/>
+          <pc:sldMk cId="463115072" sldId="272"/>
+        </pc:sldMkLst>
+      </pc:sldChg>
+      <pc:sldChg chg="addSp modSp add">
+        <pc:chgData name="Mohammed Fasha" userId="cc64f42d-a1a6-4f08-b97b-0c37f877119f" providerId="ADAL" clId="{985CD171-9E4A-4264-B045-872AAA800AE3}" dt="2024-10-16T07:06:32.789" v="441" actId="14100"/>
+        <pc:sldMkLst>
+          <pc:docMk/>
+          <pc:sldMk cId="3668955903" sldId="273"/>
+        </pc:sldMkLst>
+      </pc:sldChg>
+      <pc:sldChg chg="addSp delSp modSp add">
+        <pc:chgData name="Mohammed Fasha" userId="cc64f42d-a1a6-4f08-b97b-0c37f877119f" providerId="ADAL" clId="{985CD171-9E4A-4264-B045-872AAA800AE3}" dt="2024-10-16T07:06:45.628" v="449" actId="27636"/>
+        <pc:sldMkLst>
+          <pc:docMk/>
+          <pc:sldMk cId="3192380798" sldId="274"/>
+        </pc:sldMkLst>
+      </pc:sldChg>
+      <pc:sldChg chg="addSp modSp add">
+        <pc:chgData name="Mohammed Fasha" userId="cc64f42d-a1a6-4f08-b97b-0c37f877119f" providerId="ADAL" clId="{985CD171-9E4A-4264-B045-872AAA800AE3}" dt="2024-10-16T07:07:23.747" v="460" actId="20577"/>
+        <pc:sldMkLst>
+          <pc:docMk/>
+          <pc:sldMk cId="3898002179" sldId="275"/>
+        </pc:sldMkLst>
+      </pc:sldChg>
+      <pc:sldChg chg="addSp modSp add">
+        <pc:chgData name="Mohammed Fasha" userId="cc64f42d-a1a6-4f08-b97b-0c37f877119f" providerId="ADAL" clId="{985CD171-9E4A-4264-B045-872AAA800AE3}" dt="2024-10-16T07:07:35.379" v="465" actId="27636"/>
+        <pc:sldMkLst>
+          <pc:docMk/>
+          <pc:sldMk cId="1503352162" sldId="276"/>
+        </pc:sldMkLst>
+      </pc:sldChg>
+      <pc:sldChg chg="addSp delSp modSp add">
+        <pc:chgData name="Mohammed Fasha" userId="cc64f42d-a1a6-4f08-b97b-0c37f877119f" providerId="ADAL" clId="{985CD171-9E4A-4264-B045-872AAA800AE3}" dt="2024-10-16T07:28:38.184" v="537" actId="948"/>
+        <pc:sldMkLst>
+          <pc:docMk/>
+          <pc:sldMk cId="1260131707" sldId="277"/>
+        </pc:sldMkLst>
+      </pc:sldChg>
+      <pc:sldChg chg="addSp modSp add ord">
+        <pc:chgData name="Mohammed Fasha" userId="cc64f42d-a1a6-4f08-b97b-0c37f877119f" providerId="ADAL" clId="{985CD171-9E4A-4264-B045-872AAA800AE3}" dt="2024-10-16T07:16:54.093" v="501" actId="27636"/>
+        <pc:sldMkLst>
+          <pc:docMk/>
+          <pc:sldMk cId="1324937023" sldId="280"/>
+        </pc:sldMkLst>
+      </pc:sldChg>
+      <pc:sldChg chg="addSp delSp modSp add">
+        <pc:chgData name="Mohammed Fasha" userId="cc64f42d-a1a6-4f08-b97b-0c37f877119f" providerId="ADAL" clId="{985CD171-9E4A-4264-B045-872AAA800AE3}" dt="2024-10-16T07:44:30.797" v="606" actId="5793"/>
+        <pc:sldMkLst>
+          <pc:docMk/>
+          <pc:sldMk cId="4085727926" sldId="281"/>
+        </pc:sldMkLst>
+      </pc:sldChg>
+      <pc:sldChg chg="addSp modSp add">
+        <pc:chgData name="Mohammed Fasha" userId="cc64f42d-a1a6-4f08-b97b-0c37f877119f" providerId="ADAL" clId="{985CD171-9E4A-4264-B045-872AAA800AE3}" dt="2024-10-16T08:01:33.772" v="621" actId="403"/>
+        <pc:sldMkLst>
+          <pc:docMk/>
+          <pc:sldMk cId="156012141" sldId="282"/>
+        </pc:sldMkLst>
+      </pc:sldChg>
+      <pc:sldChg chg="addSp modSp add">
+        <pc:chgData name="Mohammed Fasha" userId="cc64f42d-a1a6-4f08-b97b-0c37f877119f" providerId="ADAL" clId="{985CD171-9E4A-4264-B045-872AAA800AE3}" dt="2024-10-16T08:02:59.311" v="633" actId="404"/>
+        <pc:sldMkLst>
+          <pc:docMk/>
+          <pc:sldMk cId="248623450" sldId="284"/>
+        </pc:sldMkLst>
+      </pc:sldChg>
+    </pc:docChg>
+  </pc:docChgLst>
   <pc:docChgLst>
     <pc:chgData name="Mohammed Fasha" userId="cc64f42d-a1a6-4f08-b97b-0c37f877119f" providerId="ADAL" clId="{6B515210-E3E2-4B4B-BC10-968DB84AFC83}"/>
     <pc:docChg chg="undo custSel addSld delSld modSld sldOrd modMainMaster">
@@ -647,6 +929,22 @@
             <pc:sldLayoutMk cId="3033015503" sldId="2147483650"/>
           </pc:sldLayoutMkLst>
         </pc:sldLayoutChg>
+      </pc:sldMasterChg>
+    </pc:docChg>
+  </pc:docChgLst>
+  <pc:docChgLst>
+    <pc:chgData name="Mohammed Fasha" userId="cc64f42d-a1a6-4f08-b97b-0c37f877119f" providerId="ADAL" clId="{7118EDE2-0191-4A32-A95D-AE24A3E2731E}"/>
+    <pc:docChg chg="custSel modMainMaster">
+      <pc:chgData name="Mohammed Fasha" userId="cc64f42d-a1a6-4f08-b97b-0c37f877119f" providerId="ADAL" clId="{7118EDE2-0191-4A32-A95D-AE24A3E2731E}" dt="2025-07-20T17:08:30.314" v="2" actId="478"/>
+      <pc:docMkLst>
+        <pc:docMk/>
+      </pc:docMkLst>
+      <pc:sldMasterChg chg="delSp mod">
+        <pc:chgData name="Mohammed Fasha" userId="cc64f42d-a1a6-4f08-b97b-0c37f877119f" providerId="ADAL" clId="{7118EDE2-0191-4A32-A95D-AE24A3E2731E}" dt="2025-07-20T17:08:30.314" v="2" actId="478"/>
+        <pc:sldMasterMkLst>
+          <pc:docMk/>
+          <pc:sldMasterMk cId="2573801746" sldId="2147483648"/>
+        </pc:sldMasterMkLst>
       </pc:sldMasterChg>
     </pc:docChg>
   </pc:docChgLst>
@@ -767,172 +1065,212 @@
     </pc:docChg>
   </pc:docChgLst>
   <pc:docChgLst>
-    <pc:chgData name="Mohammed Fasha" userId="cc64f42d-a1a6-4f08-b97b-0c37f877119f" providerId="ADAL" clId="{985CD171-9E4A-4264-B045-872AAA800AE3}"/>
+    <pc:chgData name="Mohammed Fasha" userId="cc64f42d-a1a6-4f08-b97b-0c37f877119f" providerId="ADAL" clId="{01CCA8BA-5B80-4D38-88F0-6F62E5B1BF6B}"/>
     <pc:docChg chg="undo custSel addSld delSld modSld sldOrd">
-      <pc:chgData name="Mohammed Fasha" userId="cc64f42d-a1a6-4f08-b97b-0c37f877119f" providerId="ADAL" clId="{985CD171-9E4A-4264-B045-872AAA800AE3}" dt="2024-10-16T08:02:59.311" v="633" actId="404"/>
+      <pc:chgData name="Mohammed Fasha" userId="cc64f42d-a1a6-4f08-b97b-0c37f877119f" providerId="ADAL" clId="{01CCA8BA-5B80-4D38-88F0-6F62E5B1BF6B}" dt="2025-08-02T05:03:31.165" v="246" actId="1076"/>
       <pc:docMkLst>
         <pc:docMk/>
       </pc:docMkLst>
-      <pc:sldChg chg="modSp">
-        <pc:chgData name="Mohammed Fasha" userId="cc64f42d-a1a6-4f08-b97b-0c37f877119f" providerId="ADAL" clId="{985CD171-9E4A-4264-B045-872AAA800AE3}" dt="2024-10-16T07:15:21.970" v="481" actId="27636"/>
-        <pc:sldMkLst>
-          <pc:docMk/>
-          <pc:sldMk cId="1162554463" sldId="257"/>
-        </pc:sldMkLst>
-      </pc:sldChg>
-      <pc:sldChg chg="addSp modSp">
-        <pc:chgData name="Mohammed Fasha" userId="cc64f42d-a1a6-4f08-b97b-0c37f877119f" providerId="ADAL" clId="{985CD171-9E4A-4264-B045-872AAA800AE3}" dt="2024-10-16T07:06:03.884" v="437" actId="1076"/>
-        <pc:sldMkLst>
-          <pc:docMk/>
-          <pc:sldMk cId="706735111" sldId="258"/>
-        </pc:sldMkLst>
-      </pc:sldChg>
-      <pc:sldChg chg="addSp delSp modSp ord">
-        <pc:chgData name="Mohammed Fasha" userId="cc64f42d-a1a6-4f08-b97b-0c37f877119f" providerId="ADAL" clId="{985CD171-9E4A-4264-B045-872AAA800AE3}" dt="2024-10-16T07:00:38.831" v="349" actId="207"/>
-        <pc:sldMkLst>
-          <pc:docMk/>
-          <pc:sldMk cId="4289469650" sldId="261"/>
-        </pc:sldMkLst>
-      </pc:sldChg>
-      <pc:sldChg chg="addSp delSp modSp ord">
-        <pc:chgData name="Mohammed Fasha" userId="cc64f42d-a1a6-4f08-b97b-0c37f877119f" providerId="ADAL" clId="{985CD171-9E4A-4264-B045-872AAA800AE3}" dt="2024-10-16T06:46:39.846" v="191" actId="14100"/>
-        <pc:sldMkLst>
-          <pc:docMk/>
-          <pc:sldMk cId="4130133658" sldId="262"/>
-        </pc:sldMkLst>
-      </pc:sldChg>
-      <pc:sldChg chg="addSp modSp ord">
-        <pc:chgData name="Mohammed Fasha" userId="cc64f42d-a1a6-4f08-b97b-0c37f877119f" providerId="ADAL" clId="{985CD171-9E4A-4264-B045-872AAA800AE3}" dt="2024-10-16T07:55:18.576" v="615" actId="207"/>
-        <pc:sldMkLst>
-          <pc:docMk/>
-          <pc:sldMk cId="4074862586" sldId="263"/>
-        </pc:sldMkLst>
-      </pc:sldChg>
-      <pc:sldChg chg="addSp delSp modSp add">
-        <pc:chgData name="Mohammed Fasha" userId="cc64f42d-a1a6-4f08-b97b-0c37f877119f" providerId="ADAL" clId="{985CD171-9E4A-4264-B045-872AAA800AE3}" dt="2024-10-16T07:54:33.790" v="610"/>
-        <pc:sldMkLst>
-          <pc:docMk/>
-          <pc:sldMk cId="2611575643" sldId="264"/>
-        </pc:sldMkLst>
-      </pc:sldChg>
-      <pc:sldChg chg="addSp modSp add ord">
-        <pc:chgData name="Mohammed Fasha" userId="cc64f42d-a1a6-4f08-b97b-0c37f877119f" providerId="ADAL" clId="{985CD171-9E4A-4264-B045-872AAA800AE3}" dt="2024-10-16T07:08:38.092" v="475" actId="27636"/>
-        <pc:sldMkLst>
-          <pc:docMk/>
-          <pc:sldMk cId="335199774" sldId="265"/>
-        </pc:sldMkLst>
-      </pc:sldChg>
-      <pc:sldChg chg="addSp delSp modSp add">
-        <pc:chgData name="Mohammed Fasha" userId="cc64f42d-a1a6-4f08-b97b-0c37f877119f" providerId="ADAL" clId="{985CD171-9E4A-4264-B045-872AAA800AE3}" dt="2024-10-16T07:02:57.901" v="385" actId="27636"/>
-        <pc:sldMkLst>
-          <pc:docMk/>
-          <pc:sldMk cId="2810357117" sldId="266"/>
-        </pc:sldMkLst>
-      </pc:sldChg>
-      <pc:sldChg chg="addSp modSp add">
-        <pc:chgData name="Mohammed Fasha" userId="cc64f42d-a1a6-4f08-b97b-0c37f877119f" providerId="ADAL" clId="{985CD171-9E4A-4264-B045-872AAA800AE3}" dt="2024-10-16T07:03:19.455" v="397" actId="27636"/>
-        <pc:sldMkLst>
-          <pc:docMk/>
-          <pc:sldMk cId="2433706687" sldId="267"/>
-        </pc:sldMkLst>
-      </pc:sldChg>
-      <pc:sldChg chg="addSp modSp add">
-        <pc:chgData name="Mohammed Fasha" userId="cc64f42d-a1a6-4f08-b97b-0c37f877119f" providerId="ADAL" clId="{985CD171-9E4A-4264-B045-872AAA800AE3}" dt="2024-10-16T08:00:33.047" v="616" actId="14100"/>
-        <pc:sldMkLst>
-          <pc:docMk/>
-          <pc:sldMk cId="4051642265" sldId="268"/>
-        </pc:sldMkLst>
-      </pc:sldChg>
-      <pc:sldChg chg="addSp modSp add">
-        <pc:chgData name="Mohammed Fasha" userId="cc64f42d-a1a6-4f08-b97b-0c37f877119f" providerId="ADAL" clId="{985CD171-9E4A-4264-B045-872AAA800AE3}" dt="2024-10-16T07:04:05.205" v="412" actId="14100"/>
-        <pc:sldMkLst>
-          <pc:docMk/>
-          <pc:sldMk cId="87410777" sldId="269"/>
-        </pc:sldMkLst>
-      </pc:sldChg>
-      <pc:sldChg chg="addSp modSp add">
-        <pc:chgData name="Mohammed Fasha" userId="cc64f42d-a1a6-4f08-b97b-0c37f877119f" providerId="ADAL" clId="{985CD171-9E4A-4264-B045-872AAA800AE3}" dt="2024-10-16T07:04:34.185" v="419" actId="14100"/>
-        <pc:sldMkLst>
-          <pc:docMk/>
-          <pc:sldMk cId="595502031" sldId="270"/>
-        </pc:sldMkLst>
-      </pc:sldChg>
-      <pc:sldChg chg="addSp modSp add ord">
-        <pc:chgData name="Mohammed Fasha" userId="cc64f42d-a1a6-4f08-b97b-0c37f877119f" providerId="ADAL" clId="{985CD171-9E4A-4264-B045-872AAA800AE3}" dt="2024-10-16T07:03:52.480" v="404" actId="27636"/>
-        <pc:sldMkLst>
-          <pc:docMk/>
-          <pc:sldMk cId="3925652072" sldId="271"/>
-        </pc:sldMkLst>
-      </pc:sldChg>
-      <pc:sldChg chg="addSp modSp add">
-        <pc:chgData name="Mohammed Fasha" userId="cc64f42d-a1a6-4f08-b97b-0c37f877119f" providerId="ADAL" clId="{985CD171-9E4A-4264-B045-872AAA800AE3}" dt="2024-10-16T07:04:42.805" v="424" actId="1076"/>
-        <pc:sldMkLst>
-          <pc:docMk/>
-          <pc:sldMk cId="463115072" sldId="272"/>
-        </pc:sldMkLst>
-      </pc:sldChg>
-      <pc:sldChg chg="addSp modSp add">
-        <pc:chgData name="Mohammed Fasha" userId="cc64f42d-a1a6-4f08-b97b-0c37f877119f" providerId="ADAL" clId="{985CD171-9E4A-4264-B045-872AAA800AE3}" dt="2024-10-16T07:06:32.789" v="441" actId="14100"/>
-        <pc:sldMkLst>
-          <pc:docMk/>
-          <pc:sldMk cId="3668955903" sldId="273"/>
-        </pc:sldMkLst>
-      </pc:sldChg>
-      <pc:sldChg chg="addSp delSp modSp add">
-        <pc:chgData name="Mohammed Fasha" userId="cc64f42d-a1a6-4f08-b97b-0c37f877119f" providerId="ADAL" clId="{985CD171-9E4A-4264-B045-872AAA800AE3}" dt="2024-10-16T07:06:45.628" v="449" actId="27636"/>
-        <pc:sldMkLst>
-          <pc:docMk/>
-          <pc:sldMk cId="3192380798" sldId="274"/>
-        </pc:sldMkLst>
-      </pc:sldChg>
-      <pc:sldChg chg="addSp modSp add">
-        <pc:chgData name="Mohammed Fasha" userId="cc64f42d-a1a6-4f08-b97b-0c37f877119f" providerId="ADAL" clId="{985CD171-9E4A-4264-B045-872AAA800AE3}" dt="2024-10-16T07:07:23.747" v="460" actId="20577"/>
-        <pc:sldMkLst>
-          <pc:docMk/>
-          <pc:sldMk cId="3898002179" sldId="275"/>
-        </pc:sldMkLst>
-      </pc:sldChg>
-      <pc:sldChg chg="addSp modSp add">
-        <pc:chgData name="Mohammed Fasha" userId="cc64f42d-a1a6-4f08-b97b-0c37f877119f" providerId="ADAL" clId="{985CD171-9E4A-4264-B045-872AAA800AE3}" dt="2024-10-16T07:07:35.379" v="465" actId="27636"/>
-        <pc:sldMkLst>
-          <pc:docMk/>
-          <pc:sldMk cId="1503352162" sldId="276"/>
-        </pc:sldMkLst>
-      </pc:sldChg>
-      <pc:sldChg chg="addSp delSp modSp add">
-        <pc:chgData name="Mohammed Fasha" userId="cc64f42d-a1a6-4f08-b97b-0c37f877119f" providerId="ADAL" clId="{985CD171-9E4A-4264-B045-872AAA800AE3}" dt="2024-10-16T07:28:38.184" v="537" actId="948"/>
-        <pc:sldMkLst>
-          <pc:docMk/>
-          <pc:sldMk cId="1260131707" sldId="277"/>
-        </pc:sldMkLst>
-      </pc:sldChg>
-      <pc:sldChg chg="addSp modSp add ord">
-        <pc:chgData name="Mohammed Fasha" userId="cc64f42d-a1a6-4f08-b97b-0c37f877119f" providerId="ADAL" clId="{985CD171-9E4A-4264-B045-872AAA800AE3}" dt="2024-10-16T07:16:54.093" v="501" actId="27636"/>
-        <pc:sldMkLst>
-          <pc:docMk/>
-          <pc:sldMk cId="1324937023" sldId="280"/>
-        </pc:sldMkLst>
-      </pc:sldChg>
-      <pc:sldChg chg="addSp delSp modSp add">
-        <pc:chgData name="Mohammed Fasha" userId="cc64f42d-a1a6-4f08-b97b-0c37f877119f" providerId="ADAL" clId="{985CD171-9E4A-4264-B045-872AAA800AE3}" dt="2024-10-16T07:44:30.797" v="606" actId="5793"/>
-        <pc:sldMkLst>
-          <pc:docMk/>
-          <pc:sldMk cId="4085727926" sldId="281"/>
-        </pc:sldMkLst>
-      </pc:sldChg>
-      <pc:sldChg chg="addSp modSp add">
-        <pc:chgData name="Mohammed Fasha" userId="cc64f42d-a1a6-4f08-b97b-0c37f877119f" providerId="ADAL" clId="{985CD171-9E4A-4264-B045-872AAA800AE3}" dt="2024-10-16T08:01:33.772" v="621" actId="403"/>
-        <pc:sldMkLst>
-          <pc:docMk/>
-          <pc:sldMk cId="156012141" sldId="282"/>
-        </pc:sldMkLst>
-      </pc:sldChg>
-      <pc:sldChg chg="addSp modSp add">
-        <pc:chgData name="Mohammed Fasha" userId="cc64f42d-a1a6-4f08-b97b-0c37f877119f" providerId="ADAL" clId="{985CD171-9E4A-4264-B045-872AAA800AE3}" dt="2024-10-16T08:02:59.311" v="633" actId="404"/>
-        <pc:sldMkLst>
-          <pc:docMk/>
-          <pc:sldMk cId="248623450" sldId="284"/>
-        </pc:sldMkLst>
+      <pc:sldChg chg="delSp modSp add mod">
+        <pc:chgData name="Mohammed Fasha" userId="cc64f42d-a1a6-4f08-b97b-0c37f877119f" providerId="ADAL" clId="{01CCA8BA-5B80-4D38-88F0-6F62E5B1BF6B}" dt="2025-08-02T04:50:34.463" v="208" actId="20577"/>
+        <pc:sldMkLst>
+          <pc:docMk/>
+          <pc:sldMk cId="1940856282" sldId="392"/>
+        </pc:sldMkLst>
+        <pc:spChg chg="mod">
+          <ac:chgData name="Mohammed Fasha" userId="cc64f42d-a1a6-4f08-b97b-0c37f877119f" providerId="ADAL" clId="{01CCA8BA-5B80-4D38-88F0-6F62E5B1BF6B}" dt="2025-08-02T04:50:34.463" v="208" actId="20577"/>
+          <ac:spMkLst>
+            <pc:docMk/>
+            <pc:sldMk cId="1940856282" sldId="392"/>
+            <ac:spMk id="2" creationId="{B22977B1-547B-43B2-86C8-50159B2DE907}"/>
+          </ac:spMkLst>
+        </pc:spChg>
+        <pc:spChg chg="mod">
+          <ac:chgData name="Mohammed Fasha" userId="cc64f42d-a1a6-4f08-b97b-0c37f877119f" providerId="ADAL" clId="{01CCA8BA-5B80-4D38-88F0-6F62E5B1BF6B}" dt="2025-08-02T04:50:29.083" v="200" actId="404"/>
+          <ac:spMkLst>
+            <pc:docMk/>
+            <pc:sldMk cId="1940856282" sldId="392"/>
+            <ac:spMk id="3" creationId="{844C7A84-9CD0-4AAB-8632-11C1BBF9CC59}"/>
+          </ac:spMkLst>
+        </pc:spChg>
+        <pc:spChg chg="del mod">
+          <ac:chgData name="Mohammed Fasha" userId="cc64f42d-a1a6-4f08-b97b-0c37f877119f" providerId="ADAL" clId="{01CCA8BA-5B80-4D38-88F0-6F62E5B1BF6B}" dt="2025-08-02T04:50:04.192" v="193" actId="478"/>
+          <ac:spMkLst>
+            <pc:docMk/>
+            <pc:sldMk cId="1940856282" sldId="392"/>
+            <ac:spMk id="4" creationId="{199319D0-7A9F-5743-87EB-887B3E6A1807}"/>
+          </ac:spMkLst>
+        </pc:spChg>
+      </pc:sldChg>
+      <pc:sldChg chg="modSp mod">
+        <pc:chgData name="Mohammed Fasha" userId="cc64f42d-a1a6-4f08-b97b-0c37f877119f" providerId="ADAL" clId="{01CCA8BA-5B80-4D38-88F0-6F62E5B1BF6B}" dt="2025-08-02T05:03:20.469" v="245" actId="113"/>
+        <pc:sldMkLst>
+          <pc:docMk/>
+          <pc:sldMk cId="3415756226" sldId="457"/>
+        </pc:sldMkLst>
+        <pc:graphicFrameChg chg="mod modGraphic">
+          <ac:chgData name="Mohammed Fasha" userId="cc64f42d-a1a6-4f08-b97b-0c37f877119f" providerId="ADAL" clId="{01CCA8BA-5B80-4D38-88F0-6F62E5B1BF6B}" dt="2025-08-02T05:03:20.469" v="245" actId="113"/>
+          <ac:graphicFrameMkLst>
+            <pc:docMk/>
+            <pc:sldMk cId="3415756226" sldId="457"/>
+            <ac:graphicFrameMk id="4" creationId="{99F7850E-FBEB-E396-6E03-F8260EB4E8FF}"/>
+          </ac:graphicFrameMkLst>
+        </pc:graphicFrameChg>
+      </pc:sldChg>
+      <pc:sldChg chg="del">
+        <pc:chgData name="Mohammed Fasha" userId="cc64f42d-a1a6-4f08-b97b-0c37f877119f" providerId="ADAL" clId="{01CCA8BA-5B80-4D38-88F0-6F62E5B1BF6B}" dt="2025-08-02T04:46:26.008" v="3" actId="2696"/>
+        <pc:sldMkLst>
+          <pc:docMk/>
+          <pc:sldMk cId="2379583142" sldId="461"/>
+        </pc:sldMkLst>
+      </pc:sldChg>
+      <pc:sldChg chg="modSp mod">
+        <pc:chgData name="Mohammed Fasha" userId="cc64f42d-a1a6-4f08-b97b-0c37f877119f" providerId="ADAL" clId="{01CCA8BA-5B80-4D38-88F0-6F62E5B1BF6B}" dt="2025-08-02T05:03:31.165" v="246" actId="1076"/>
+        <pc:sldMkLst>
+          <pc:docMk/>
+          <pc:sldMk cId="2300765676" sldId="477"/>
+        </pc:sldMkLst>
+        <pc:graphicFrameChg chg="mod">
+          <ac:chgData name="Mohammed Fasha" userId="cc64f42d-a1a6-4f08-b97b-0c37f877119f" providerId="ADAL" clId="{01CCA8BA-5B80-4D38-88F0-6F62E5B1BF6B}" dt="2025-08-02T05:03:31.165" v="246" actId="1076"/>
+          <ac:graphicFrameMkLst>
+            <pc:docMk/>
+            <pc:sldMk cId="2300765676" sldId="477"/>
+            <ac:graphicFrameMk id="4" creationId="{BB730729-FAFB-B6B5-1C32-4B159042FDCF}"/>
+          </ac:graphicFrameMkLst>
+        </pc:graphicFrameChg>
+      </pc:sldChg>
+      <pc:sldChg chg="modSp mod">
+        <pc:chgData name="Mohammed Fasha" userId="cc64f42d-a1a6-4f08-b97b-0c37f877119f" providerId="ADAL" clId="{01CCA8BA-5B80-4D38-88F0-6F62E5B1BF6B}" dt="2025-08-02T04:52:10.855" v="224" actId="404"/>
+        <pc:sldMkLst>
+          <pc:docMk/>
+          <pc:sldMk cId="1090369301" sldId="580"/>
+        </pc:sldMkLst>
+        <pc:spChg chg="mod">
+          <ac:chgData name="Mohammed Fasha" userId="cc64f42d-a1a6-4f08-b97b-0c37f877119f" providerId="ADAL" clId="{01CCA8BA-5B80-4D38-88F0-6F62E5B1BF6B}" dt="2025-08-02T04:52:10.855" v="224" actId="404"/>
+          <ac:spMkLst>
+            <pc:docMk/>
+            <pc:sldMk cId="1090369301" sldId="580"/>
+            <ac:spMk id="5" creationId="{52021908-6640-2279-6376-B5868E148168}"/>
+          </ac:spMkLst>
+        </pc:spChg>
+      </pc:sldChg>
+      <pc:sldChg chg="delSp modSp add mod">
+        <pc:chgData name="Mohammed Fasha" userId="cc64f42d-a1a6-4f08-b97b-0c37f877119f" providerId="ADAL" clId="{01CCA8BA-5B80-4D38-88F0-6F62E5B1BF6B}" dt="2025-08-02T04:50:23.841" v="198" actId="27636"/>
+        <pc:sldMkLst>
+          <pc:docMk/>
+          <pc:sldMk cId="2775611767" sldId="1511"/>
+        </pc:sldMkLst>
+        <pc:spChg chg="mod">
+          <ac:chgData name="Mohammed Fasha" userId="cc64f42d-a1a6-4f08-b97b-0c37f877119f" providerId="ADAL" clId="{01CCA8BA-5B80-4D38-88F0-6F62E5B1BF6B}" dt="2025-08-02T04:50:23.841" v="198" actId="27636"/>
+          <ac:spMkLst>
+            <pc:docMk/>
+            <pc:sldMk cId="2775611767" sldId="1511"/>
+            <ac:spMk id="4" creationId="{DAFFB958-32F0-704B-914A-D7005FD29F39}"/>
+          </ac:spMkLst>
+        </pc:spChg>
+        <pc:spChg chg="del mod">
+          <ac:chgData name="Mohammed Fasha" userId="cc64f42d-a1a6-4f08-b97b-0c37f877119f" providerId="ADAL" clId="{01CCA8BA-5B80-4D38-88F0-6F62E5B1BF6B}" dt="2025-08-02T04:50:07.894" v="194" actId="478"/>
+          <ac:spMkLst>
+            <pc:docMk/>
+            <pc:sldMk cId="2775611767" sldId="1511"/>
+            <ac:spMk id="5" creationId="{125800C4-FABA-054F-9276-4F9003B79D9C}"/>
+          </ac:spMkLst>
+        </pc:spChg>
+        <pc:spChg chg="mod">
+          <ac:chgData name="Mohammed Fasha" userId="cc64f42d-a1a6-4f08-b97b-0c37f877119f" providerId="ADAL" clId="{01CCA8BA-5B80-4D38-88F0-6F62E5B1BF6B}" dt="2025-08-02T04:46:44.152" v="47" actId="1035"/>
+          <ac:spMkLst>
+            <pc:docMk/>
+            <pc:sldMk cId="2775611767" sldId="1511"/>
+            <ac:spMk id="95" creationId="{4B25B004-1628-C74A-AAC8-765CE918D652}"/>
+          </ac:spMkLst>
+        </pc:spChg>
+        <pc:spChg chg="mod">
+          <ac:chgData name="Mohammed Fasha" userId="cc64f42d-a1a6-4f08-b97b-0c37f877119f" providerId="ADAL" clId="{01CCA8BA-5B80-4D38-88F0-6F62E5B1BF6B}" dt="2025-08-02T04:46:44.152" v="47" actId="1035"/>
+          <ac:spMkLst>
+            <pc:docMk/>
+            <pc:sldMk cId="2775611767" sldId="1511"/>
+            <ac:spMk id="104" creationId="{17317157-2D16-C44F-8975-455C7DF51E3D}"/>
+          </ac:spMkLst>
+        </pc:spChg>
+        <pc:graphicFrameChg chg="mod modGraphic">
+          <ac:chgData name="Mohammed Fasha" userId="cc64f42d-a1a6-4f08-b97b-0c37f877119f" providerId="ADAL" clId="{01CCA8BA-5B80-4D38-88F0-6F62E5B1BF6B}" dt="2025-08-02T04:47:38.643" v="78" actId="1076"/>
+          <ac:graphicFrameMkLst>
+            <pc:docMk/>
+            <pc:sldMk cId="2775611767" sldId="1511"/>
+            <ac:graphicFrameMk id="96" creationId="{F699DA68-632A-4C70-B511-E901FE5434D1}"/>
+          </ac:graphicFrameMkLst>
+        </pc:graphicFrameChg>
+        <pc:graphicFrameChg chg="mod modGraphic">
+          <ac:chgData name="Mohammed Fasha" userId="cc64f42d-a1a6-4f08-b97b-0c37f877119f" providerId="ADAL" clId="{01CCA8BA-5B80-4D38-88F0-6F62E5B1BF6B}" dt="2025-08-02T04:47:41.530" v="79" actId="1076"/>
+          <ac:graphicFrameMkLst>
+            <pc:docMk/>
+            <pc:sldMk cId="2775611767" sldId="1511"/>
+            <ac:graphicFrameMk id="103" creationId="{2ADE5E6F-01FB-9146-95A4-CC9F2C15F16D}"/>
+          </ac:graphicFrameMkLst>
+        </pc:graphicFrameChg>
+      </pc:sldChg>
+      <pc:sldChg chg="addSp delSp modSp add mod ord">
+        <pc:chgData name="Mohammed Fasha" userId="cc64f42d-a1a6-4f08-b97b-0c37f877119f" providerId="ADAL" clId="{01CCA8BA-5B80-4D38-88F0-6F62E5B1BF6B}" dt="2025-08-02T04:50:40.826" v="217" actId="20577"/>
+        <pc:sldMkLst>
+          <pc:docMk/>
+          <pc:sldMk cId="1227170847" sldId="3317"/>
+        </pc:sldMkLst>
+        <pc:spChg chg="mod">
+          <ac:chgData name="Mohammed Fasha" userId="cc64f42d-a1a6-4f08-b97b-0c37f877119f" providerId="ADAL" clId="{01CCA8BA-5B80-4D38-88F0-6F62E5B1BF6B}" dt="2025-08-02T04:50:40.826" v="217" actId="20577"/>
+          <ac:spMkLst>
+            <pc:docMk/>
+            <pc:sldMk cId="1227170847" sldId="3317"/>
+            <ac:spMk id="2" creationId="{37EAD044-CF40-5441-A6C5-A306615F2936}"/>
+          </ac:spMkLst>
+        </pc:spChg>
+        <pc:spChg chg="del mod">
+          <ac:chgData name="Mohammed Fasha" userId="cc64f42d-a1a6-4f08-b97b-0c37f877119f" providerId="ADAL" clId="{01CCA8BA-5B80-4D38-88F0-6F62E5B1BF6B}" dt="2025-08-02T04:49:20.006" v="114" actId="21"/>
+          <ac:spMkLst>
+            <pc:docMk/>
+            <pc:sldMk cId="1227170847" sldId="3317"/>
+            <ac:spMk id="3" creationId="{B36BB95C-3CD0-934A-BBF0-F6D0A346833C}"/>
+          </ac:spMkLst>
+        </pc:spChg>
+        <pc:spChg chg="del mod">
+          <ac:chgData name="Mohammed Fasha" userId="cc64f42d-a1a6-4f08-b97b-0c37f877119f" providerId="ADAL" clId="{01CCA8BA-5B80-4D38-88F0-6F62E5B1BF6B}" dt="2025-08-02T04:49:47.103" v="175" actId="478"/>
+          <ac:spMkLst>
+            <pc:docMk/>
+            <pc:sldMk cId="1227170847" sldId="3317"/>
+            <ac:spMk id="4" creationId="{B5FF67BB-E8E7-7B47-B4D7-FC8E83865416}"/>
+          </ac:spMkLst>
+        </pc:spChg>
+        <pc:spChg chg="mod">
+          <ac:chgData name="Mohammed Fasha" userId="cc64f42d-a1a6-4f08-b97b-0c37f877119f" providerId="ADAL" clId="{01CCA8BA-5B80-4D38-88F0-6F62E5B1BF6B}" dt="2025-08-02T04:49:53.147" v="192" actId="1036"/>
+          <ac:spMkLst>
+            <pc:docMk/>
+            <pc:sldMk cId="1227170847" sldId="3317"/>
+            <ac:spMk id="5" creationId="{7C23633B-B73C-CB4B-9298-DAEAACEBCCB8}"/>
+          </ac:spMkLst>
+        </pc:spChg>
+        <pc:spChg chg="add del mod">
+          <ac:chgData name="Mohammed Fasha" userId="cc64f42d-a1a6-4f08-b97b-0c37f877119f" providerId="ADAL" clId="{01CCA8BA-5B80-4D38-88F0-6F62E5B1BF6B}" dt="2025-08-02T04:49:21.948" v="115" actId="478"/>
+          <ac:spMkLst>
+            <pc:docMk/>
+            <pc:sldMk cId="1227170847" sldId="3317"/>
+            <ac:spMk id="8" creationId="{32F79E39-997E-7E98-5EB1-60FDC3E1B56B}"/>
+          </ac:spMkLst>
+        </pc:spChg>
+        <pc:spChg chg="add mod">
+          <ac:chgData name="Mohammed Fasha" userId="cc64f42d-a1a6-4f08-b97b-0c37f877119f" providerId="ADAL" clId="{01CCA8BA-5B80-4D38-88F0-6F62E5B1BF6B}" dt="2025-08-02T04:49:35.159" v="152" actId="1076"/>
+          <ac:spMkLst>
+            <pc:docMk/>
+            <pc:sldMk cId="1227170847" sldId="3317"/>
+            <ac:spMk id="9" creationId="{B36BB95C-3CD0-934A-BBF0-F6D0A346833C}"/>
+          </ac:spMkLst>
+        </pc:spChg>
+        <pc:graphicFrameChg chg="mod modGraphic">
+          <ac:chgData name="Mohammed Fasha" userId="cc64f42d-a1a6-4f08-b97b-0c37f877119f" providerId="ADAL" clId="{01CCA8BA-5B80-4D38-88F0-6F62E5B1BF6B}" dt="2025-08-02T04:49:53.147" v="192" actId="1036"/>
+          <ac:graphicFrameMkLst>
+            <pc:docMk/>
+            <pc:sldMk cId="1227170847" sldId="3317"/>
+            <ac:graphicFrameMk id="6" creationId="{95FCDC4C-175D-B542-BA3A-D6EC4578F8CC}"/>
+          </ac:graphicFrameMkLst>
+        </pc:graphicFrameChg>
       </pc:sldChg>
     </pc:docChg>
   </pc:docChgLst>
@@ -981,38 +1319,6 @@
     </pc:docChg>
   </pc:docChgLst>
   <pc:docChgLst>
-    <pc:chgData name="Mohammed Fasha" userId="cc64f42d-a1a6-4f08-b97b-0c37f877119f" providerId="ADAL" clId="{7118EDE2-0191-4A32-A95D-AE24A3E2731E}"/>
-    <pc:docChg chg="custSel modMainMaster">
-      <pc:chgData name="Mohammed Fasha" userId="cc64f42d-a1a6-4f08-b97b-0c37f877119f" providerId="ADAL" clId="{7118EDE2-0191-4A32-A95D-AE24A3E2731E}" dt="2025-07-20T17:08:30.314" v="2" actId="478"/>
-      <pc:docMkLst>
-        <pc:docMk/>
-      </pc:docMkLst>
-      <pc:sldMasterChg chg="delSp mod">
-        <pc:chgData name="Mohammed Fasha" userId="cc64f42d-a1a6-4f08-b97b-0c37f877119f" providerId="ADAL" clId="{7118EDE2-0191-4A32-A95D-AE24A3E2731E}" dt="2025-07-20T17:08:30.314" v="2" actId="478"/>
-        <pc:sldMasterMkLst>
-          <pc:docMk/>
-          <pc:sldMasterMk cId="2573801746" sldId="2147483648"/>
-        </pc:sldMasterMkLst>
-      </pc:sldMasterChg>
-    </pc:docChg>
-  </pc:docChgLst>
-  <pc:docChgLst>
-    <pc:chgData name="Mohammed Fasha" userId="cc64f42d-a1a6-4f08-b97b-0c37f877119f" providerId="ADAL" clId="{D1859E10-E91F-4CD4-B9AD-657F2116AC8C}"/>
-    <pc:docChg chg="custSel modMainMaster">
-      <pc:chgData name="Mohammed Fasha" userId="cc64f42d-a1a6-4f08-b97b-0c37f877119f" providerId="ADAL" clId="{D1859E10-E91F-4CD4-B9AD-657F2116AC8C}" dt="2024-11-09T05:23:14.444" v="3" actId="1076"/>
-      <pc:docMkLst>
-        <pc:docMk/>
-      </pc:docMkLst>
-      <pc:sldMasterChg chg="addSp delSp modSp mod">
-        <pc:chgData name="Mohammed Fasha" userId="cc64f42d-a1a6-4f08-b97b-0c37f877119f" providerId="ADAL" clId="{D1859E10-E91F-4CD4-B9AD-657F2116AC8C}" dt="2024-11-09T05:23:14.444" v="3" actId="1076"/>
-        <pc:sldMasterMkLst>
-          <pc:docMk/>
-          <pc:sldMasterMk cId="2573801746" sldId="2147483648"/>
-        </pc:sldMasterMkLst>
-      </pc:sldMasterChg>
-    </pc:docChg>
-  </pc:docChgLst>
-  <pc:docChgLst>
     <pc:chgData name="Mohammed Fasha" userId="cc64f42d-a1a6-4f08-b97b-0c37f877119f" providerId="ADAL" clId="{D8A0DC6E-ADDD-400D-BCAB-883DB6FDE99C}"/>
     <pc:docChg chg="undo custSel addSld delSld modSld sldOrd">
       <pc:chgData name="Mohammed Fasha" userId="cc64f42d-a1a6-4f08-b97b-0c37f877119f" providerId="ADAL" clId="{D8A0DC6E-ADDD-400D-BCAB-883DB6FDE99C}" dt="2025-08-01T13:07:13.387" v="1990" actId="5793"/>
@@ -2490,6 +2796,64 @@
             <ac:spMk id="3" creationId="{8A356918-8E8B-3470-EED8-4E8A46CA63AE}"/>
           </ac:spMkLst>
         </pc:spChg>
+      </pc:sldChg>
+    </pc:docChg>
+  </pc:docChgLst>
+  <pc:docChgLst>
+    <pc:chgData name="Mohammed Fasha" userId="cc64f42d-a1a6-4f08-b97b-0c37f877119f" providerId="ADAL" clId="{F585A28F-34F7-4D28-B641-78252DAB29E0}"/>
+    <pc:docChg chg="undo custSel modSld sldOrd">
+      <pc:chgData name="Mohammed Fasha" userId="cc64f42d-a1a6-4f08-b97b-0c37f877119f" providerId="ADAL" clId="{F585A28F-34F7-4D28-B641-78252DAB29E0}" dt="2025-07-16T09:17:57.509" v="81" actId="114"/>
+      <pc:docMkLst>
+        <pc:docMk/>
+      </pc:docMkLst>
+      <pc:sldChg chg="modSp mod">
+        <pc:chgData name="Mohammed Fasha" userId="cc64f42d-a1a6-4f08-b97b-0c37f877119f" providerId="ADAL" clId="{F585A28F-34F7-4D28-B641-78252DAB29E0}" dt="2025-07-16T09:14:06.583" v="24" actId="27636"/>
+        <pc:sldMkLst>
+          <pc:docMk/>
+          <pc:sldMk cId="1162554463" sldId="257"/>
+        </pc:sldMkLst>
+      </pc:sldChg>
+      <pc:sldChg chg="modSp mod">
+        <pc:chgData name="Mohammed Fasha" userId="cc64f42d-a1a6-4f08-b97b-0c37f877119f" providerId="ADAL" clId="{F585A28F-34F7-4D28-B641-78252DAB29E0}" dt="2025-07-16T09:14:22.611" v="25" actId="20577"/>
+        <pc:sldMkLst>
+          <pc:docMk/>
+          <pc:sldMk cId="2881282849" sldId="459"/>
+        </pc:sldMkLst>
+      </pc:sldChg>
+      <pc:sldChg chg="modSp mod ord">
+        <pc:chgData name="Mohammed Fasha" userId="cc64f42d-a1a6-4f08-b97b-0c37f877119f" providerId="ADAL" clId="{F585A28F-34F7-4D28-B641-78252DAB29E0}" dt="2025-07-16T09:17:57.509" v="81" actId="114"/>
+        <pc:sldMkLst>
+          <pc:docMk/>
+          <pc:sldMk cId="1427723282" sldId="462"/>
+        </pc:sldMkLst>
+      </pc:sldChg>
+      <pc:sldChg chg="modSp mod">
+        <pc:chgData name="Mohammed Fasha" userId="cc64f42d-a1a6-4f08-b97b-0c37f877119f" providerId="ADAL" clId="{F585A28F-34F7-4D28-B641-78252DAB29E0}" dt="2025-07-16T09:12:22.563" v="0" actId="404"/>
+        <pc:sldMkLst>
+          <pc:docMk/>
+          <pc:sldMk cId="2145969539" sldId="478"/>
+        </pc:sldMkLst>
+      </pc:sldChg>
+      <pc:sldChg chg="modSp mod">
+        <pc:chgData name="Mohammed Fasha" userId="cc64f42d-a1a6-4f08-b97b-0c37f877119f" providerId="ADAL" clId="{F585A28F-34F7-4D28-B641-78252DAB29E0}" dt="2025-07-16T09:14:47.069" v="29" actId="255"/>
+        <pc:sldMkLst>
+          <pc:docMk/>
+          <pc:sldMk cId="1427132372" sldId="479"/>
+        </pc:sldMkLst>
+      </pc:sldChg>
+      <pc:sldChg chg="modSp mod">
+        <pc:chgData name="Mohammed Fasha" userId="cc64f42d-a1a6-4f08-b97b-0c37f877119f" providerId="ADAL" clId="{F585A28F-34F7-4D28-B641-78252DAB29E0}" dt="2025-07-16T09:16:07.771" v="68" actId="1076"/>
+        <pc:sldMkLst>
+          <pc:docMk/>
+          <pc:sldMk cId="3075052158" sldId="480"/>
+        </pc:sldMkLst>
+      </pc:sldChg>
+      <pc:sldChg chg="modSp mod">
+        <pc:chgData name="Mohammed Fasha" userId="cc64f42d-a1a6-4f08-b97b-0c37f877119f" providerId="ADAL" clId="{F585A28F-34F7-4D28-B641-78252DAB29E0}" dt="2025-07-16T09:16:45.419" v="74" actId="1076"/>
+        <pc:sldMkLst>
+          <pc:docMk/>
+          <pc:sldMk cId="1949621639" sldId="484"/>
+        </pc:sldMkLst>
       </pc:sldChg>
     </pc:docChg>
   </pc:docChgLst>
@@ -2626,157 +2990,6 @@
         <pc:sldMkLst>
           <pc:docMk/>
           <pc:sldMk cId="1949621639" sldId="484"/>
-        </pc:sldMkLst>
-      </pc:sldChg>
-    </pc:docChg>
-  </pc:docChgLst>
-  <pc:docChgLst>
-    <pc:chgData name="Mohammed Fasha" userId="cc64f42d-a1a6-4f08-b97b-0c37f877119f" providerId="ADAL" clId="{F585A28F-34F7-4D28-B641-78252DAB29E0}"/>
-    <pc:docChg chg="undo custSel modSld sldOrd">
-      <pc:chgData name="Mohammed Fasha" userId="cc64f42d-a1a6-4f08-b97b-0c37f877119f" providerId="ADAL" clId="{F585A28F-34F7-4D28-B641-78252DAB29E0}" dt="2025-07-16T09:17:57.509" v="81" actId="114"/>
-      <pc:docMkLst>
-        <pc:docMk/>
-      </pc:docMkLst>
-      <pc:sldChg chg="modSp mod">
-        <pc:chgData name="Mohammed Fasha" userId="cc64f42d-a1a6-4f08-b97b-0c37f877119f" providerId="ADAL" clId="{F585A28F-34F7-4D28-B641-78252DAB29E0}" dt="2025-07-16T09:14:06.583" v="24" actId="27636"/>
-        <pc:sldMkLst>
-          <pc:docMk/>
-          <pc:sldMk cId="1162554463" sldId="257"/>
-        </pc:sldMkLst>
-      </pc:sldChg>
-      <pc:sldChg chg="modSp mod">
-        <pc:chgData name="Mohammed Fasha" userId="cc64f42d-a1a6-4f08-b97b-0c37f877119f" providerId="ADAL" clId="{F585A28F-34F7-4D28-B641-78252DAB29E0}" dt="2025-07-16T09:14:22.611" v="25" actId="20577"/>
-        <pc:sldMkLst>
-          <pc:docMk/>
-          <pc:sldMk cId="2881282849" sldId="459"/>
-        </pc:sldMkLst>
-      </pc:sldChg>
-      <pc:sldChg chg="modSp mod ord">
-        <pc:chgData name="Mohammed Fasha" userId="cc64f42d-a1a6-4f08-b97b-0c37f877119f" providerId="ADAL" clId="{F585A28F-34F7-4D28-B641-78252DAB29E0}" dt="2025-07-16T09:17:57.509" v="81" actId="114"/>
-        <pc:sldMkLst>
-          <pc:docMk/>
-          <pc:sldMk cId="1427723282" sldId="462"/>
-        </pc:sldMkLst>
-      </pc:sldChg>
-      <pc:sldChg chg="modSp mod">
-        <pc:chgData name="Mohammed Fasha" userId="cc64f42d-a1a6-4f08-b97b-0c37f877119f" providerId="ADAL" clId="{F585A28F-34F7-4D28-B641-78252DAB29E0}" dt="2025-07-16T09:12:22.563" v="0" actId="404"/>
-        <pc:sldMkLst>
-          <pc:docMk/>
-          <pc:sldMk cId="2145969539" sldId="478"/>
-        </pc:sldMkLst>
-      </pc:sldChg>
-      <pc:sldChg chg="modSp mod">
-        <pc:chgData name="Mohammed Fasha" userId="cc64f42d-a1a6-4f08-b97b-0c37f877119f" providerId="ADAL" clId="{F585A28F-34F7-4D28-B641-78252DAB29E0}" dt="2025-07-16T09:14:47.069" v="29" actId="255"/>
-        <pc:sldMkLst>
-          <pc:docMk/>
-          <pc:sldMk cId="1427132372" sldId="479"/>
-        </pc:sldMkLst>
-      </pc:sldChg>
-      <pc:sldChg chg="modSp mod">
-        <pc:chgData name="Mohammed Fasha" userId="cc64f42d-a1a6-4f08-b97b-0c37f877119f" providerId="ADAL" clId="{F585A28F-34F7-4D28-B641-78252DAB29E0}" dt="2025-07-16T09:16:07.771" v="68" actId="1076"/>
-        <pc:sldMkLst>
-          <pc:docMk/>
-          <pc:sldMk cId="3075052158" sldId="480"/>
-        </pc:sldMkLst>
-      </pc:sldChg>
-      <pc:sldChg chg="modSp mod">
-        <pc:chgData name="Mohammed Fasha" userId="cc64f42d-a1a6-4f08-b97b-0c37f877119f" providerId="ADAL" clId="{F585A28F-34F7-4D28-B641-78252DAB29E0}" dt="2025-07-16T09:16:45.419" v="74" actId="1076"/>
-        <pc:sldMkLst>
-          <pc:docMk/>
-          <pc:sldMk cId="1949621639" sldId="484"/>
-        </pc:sldMkLst>
-      </pc:sldChg>
-    </pc:docChg>
-  </pc:docChgLst>
-  <pc:docChgLst>
-    <pc:chgData name="Mohammed Fasha" userId="cc64f42d-a1a6-4f08-b97b-0c37f877119f" providerId="ADAL" clId="{30B40AC3-5669-44FB-A9B9-80E8E88C9E32}"/>
-    <pc:docChg chg="undo custSel addSld delSld modSld">
-      <pc:chgData name="Mohammed Fasha" userId="cc64f42d-a1a6-4f08-b97b-0c37f877119f" providerId="ADAL" clId="{30B40AC3-5669-44FB-A9B9-80E8E88C9E32}" dt="2024-10-21T08:00:22.594" v="429" actId="207"/>
-      <pc:docMkLst>
-        <pc:docMk/>
-      </pc:docMkLst>
-      <pc:sldChg chg="modSp">
-        <pc:chgData name="Mohammed Fasha" userId="cc64f42d-a1a6-4f08-b97b-0c37f877119f" providerId="ADAL" clId="{30B40AC3-5669-44FB-A9B9-80E8E88C9E32}" dt="2024-10-21T07:01:55.743" v="0" actId="207"/>
-        <pc:sldMkLst>
-          <pc:docMk/>
-          <pc:sldMk cId="4051642265" sldId="268"/>
-        </pc:sldMkLst>
-      </pc:sldChg>
-      <pc:sldChg chg="modSp">
-        <pc:chgData name="Mohammed Fasha" userId="cc64f42d-a1a6-4f08-b97b-0c37f877119f" providerId="ADAL" clId="{30B40AC3-5669-44FB-A9B9-80E8E88C9E32}" dt="2024-10-21T07:23:44.619" v="11"/>
-        <pc:sldMkLst>
-          <pc:docMk/>
-          <pc:sldMk cId="1260131707" sldId="277"/>
-        </pc:sldMkLst>
-      </pc:sldChg>
-      <pc:sldChg chg="addSp delSp modSp add del">
-        <pc:chgData name="Mohammed Fasha" userId="cc64f42d-a1a6-4f08-b97b-0c37f877119f" providerId="ADAL" clId="{30B40AC3-5669-44FB-A9B9-80E8E88C9E32}" dt="2024-10-21T07:42:04.586" v="230" actId="2696"/>
-        <pc:sldMkLst>
-          <pc:docMk/>
-          <pc:sldMk cId="3743348053" sldId="456"/>
-        </pc:sldMkLst>
-      </pc:sldChg>
-      <pc:sldChg chg="addSp delSp modSp add del">
-        <pc:chgData name="Mohammed Fasha" userId="cc64f42d-a1a6-4f08-b97b-0c37f877119f" providerId="ADAL" clId="{30B40AC3-5669-44FB-A9B9-80E8E88C9E32}" dt="2024-10-21T07:43:37.674" v="248" actId="2696"/>
-        <pc:sldMkLst>
-          <pc:docMk/>
-          <pc:sldMk cId="1914310957" sldId="457"/>
-        </pc:sldMkLst>
-      </pc:sldChg>
-      <pc:sldChg chg="addSp delSp modSp add del">
-        <pc:chgData name="Mohammed Fasha" userId="cc64f42d-a1a6-4f08-b97b-0c37f877119f" providerId="ADAL" clId="{30B40AC3-5669-44FB-A9B9-80E8E88C9E32}" dt="2024-10-21T07:43:44.968" v="251" actId="2696"/>
-        <pc:sldMkLst>
-          <pc:docMk/>
-          <pc:sldMk cId="1563484610" sldId="458"/>
-        </pc:sldMkLst>
-      </pc:sldChg>
-      <pc:sldChg chg="addSp delSp modSp add del">
-        <pc:chgData name="Mohammed Fasha" userId="cc64f42d-a1a6-4f08-b97b-0c37f877119f" providerId="ADAL" clId="{30B40AC3-5669-44FB-A9B9-80E8E88C9E32}" dt="2024-10-21T07:43:48.926" v="253" actId="2696"/>
-        <pc:sldMkLst>
-          <pc:docMk/>
-          <pc:sldMk cId="3782395966" sldId="459"/>
-        </pc:sldMkLst>
-      </pc:sldChg>
-      <pc:sldChg chg="addSp delSp modSp add">
-        <pc:chgData name="Mohammed Fasha" userId="cc64f42d-a1a6-4f08-b97b-0c37f877119f" providerId="ADAL" clId="{30B40AC3-5669-44FB-A9B9-80E8E88C9E32}" dt="2024-10-21T07:58:46.456" v="410" actId="207"/>
-        <pc:sldMkLst>
-          <pc:docMk/>
-          <pc:sldMk cId="713799975" sldId="460"/>
-        </pc:sldMkLst>
-      </pc:sldChg>
-      <pc:sldChg chg="addSp delSp modSp add">
-        <pc:chgData name="Mohammed Fasha" userId="cc64f42d-a1a6-4f08-b97b-0c37f877119f" providerId="ADAL" clId="{30B40AC3-5669-44FB-A9B9-80E8E88C9E32}" dt="2024-10-21T08:00:22.594" v="429" actId="207"/>
-        <pc:sldMkLst>
-          <pc:docMk/>
-          <pc:sldMk cId="1559487564" sldId="461"/>
-        </pc:sldMkLst>
-      </pc:sldChg>
-      <pc:sldChg chg="addSp delSp modSp add">
-        <pc:chgData name="Mohammed Fasha" userId="cc64f42d-a1a6-4f08-b97b-0c37f877119f" providerId="ADAL" clId="{30B40AC3-5669-44FB-A9B9-80E8E88C9E32}" dt="2024-10-21T07:54:42.825" v="379" actId="207"/>
-        <pc:sldMkLst>
-          <pc:docMk/>
-          <pc:sldMk cId="3087456825" sldId="462"/>
-        </pc:sldMkLst>
-      </pc:sldChg>
-      <pc:sldChg chg="addSp delSp modSp add">
-        <pc:chgData name="Mohammed Fasha" userId="cc64f42d-a1a6-4f08-b97b-0c37f877119f" providerId="ADAL" clId="{30B40AC3-5669-44FB-A9B9-80E8E88C9E32}" dt="2024-10-21T07:56:10.314" v="392" actId="14100"/>
-        <pc:sldMkLst>
-          <pc:docMk/>
-          <pc:sldMk cId="1869085755" sldId="463"/>
-        </pc:sldMkLst>
-      </pc:sldChg>
-      <pc:sldChg chg="addSp modSp add">
-        <pc:chgData name="Mohammed Fasha" userId="cc64f42d-a1a6-4f08-b97b-0c37f877119f" providerId="ADAL" clId="{30B40AC3-5669-44FB-A9B9-80E8E88C9E32}" dt="2024-10-21T07:56:43.392" v="396" actId="5793"/>
-        <pc:sldMkLst>
-          <pc:docMk/>
-          <pc:sldMk cId="4139560" sldId="464"/>
-        </pc:sldMkLst>
-      </pc:sldChg>
-      <pc:sldChg chg="addSp modSp add">
-        <pc:chgData name="Mohammed Fasha" userId="cc64f42d-a1a6-4f08-b97b-0c37f877119f" providerId="ADAL" clId="{30B40AC3-5669-44FB-A9B9-80E8E88C9E32}" dt="2024-10-21T07:57:39.264" v="404" actId="207"/>
-        <pc:sldMkLst>
-          <pc:docMk/>
-          <pc:sldMk cId="277181267" sldId="465"/>
         </pc:sldMkLst>
       </pc:sldChg>
     </pc:docChg>
@@ -2931,7 +3144,7 @@
           <a:p>
             <a:fld id="{D83FB9BE-DA6C-46CF-8E77-0CE63E601AD4}" type="datetimeFigureOut">
               <a:rPr lang="en-US" smtClean="0"/>
-              <a:t>8/1/2025</a:t>
+              <a:t>8/2/2025</a:t>
             </a:fld>
             <a:endParaRPr lang="en-US"/>
           </a:p>
@@ -3129,7 +3342,7 @@
           <a:p>
             <a:fld id="{D83FB9BE-DA6C-46CF-8E77-0CE63E601AD4}" type="datetimeFigureOut">
               <a:rPr lang="en-US" smtClean="0"/>
-              <a:t>8/1/2025</a:t>
+              <a:t>8/2/2025</a:t>
             </a:fld>
             <a:endParaRPr lang="en-US"/>
           </a:p>
@@ -3337,7 +3550,7 @@
           <a:p>
             <a:fld id="{D83FB9BE-DA6C-46CF-8E77-0CE63E601AD4}" type="datetimeFigureOut">
               <a:rPr lang="en-US" smtClean="0"/>
-              <a:t>8/1/2025</a:t>
+              <a:t>8/2/2025</a:t>
             </a:fld>
             <a:endParaRPr lang="en-US"/>
           </a:p>
@@ -3750,7 +3963,7 @@
           <a:p>
             <a:fld id="{D83FB9BE-DA6C-46CF-8E77-0CE63E601AD4}" type="datetimeFigureOut">
               <a:rPr lang="en-US" smtClean="0"/>
-              <a:t>8/1/2025</a:t>
+              <a:t>8/2/2025</a:t>
             </a:fld>
             <a:endParaRPr lang="en-US"/>
           </a:p>
@@ -4015,7 +4228,7 @@
           <a:p>
             <a:fld id="{D83FB9BE-DA6C-46CF-8E77-0CE63E601AD4}" type="datetimeFigureOut">
               <a:rPr lang="en-US" smtClean="0"/>
-              <a:t>8/1/2025</a:t>
+              <a:t>8/2/2025</a:t>
             </a:fld>
             <a:endParaRPr lang="en-US"/>
           </a:p>
@@ -4427,7 +4640,7 @@
           <a:p>
             <a:fld id="{D83FB9BE-DA6C-46CF-8E77-0CE63E601AD4}" type="datetimeFigureOut">
               <a:rPr lang="en-US" smtClean="0"/>
-              <a:t>8/1/2025</a:t>
+              <a:t>8/2/2025</a:t>
             </a:fld>
             <a:endParaRPr lang="en-US"/>
           </a:p>
@@ -4568,7 +4781,7 @@
           <a:p>
             <a:fld id="{D83FB9BE-DA6C-46CF-8E77-0CE63E601AD4}" type="datetimeFigureOut">
               <a:rPr lang="en-US" smtClean="0"/>
-              <a:t>8/1/2025</a:t>
+              <a:t>8/2/2025</a:t>
             </a:fld>
             <a:endParaRPr lang="en-US"/>
           </a:p>
@@ -4681,7 +4894,7 @@
           <a:p>
             <a:fld id="{D83FB9BE-DA6C-46CF-8E77-0CE63E601AD4}" type="datetimeFigureOut">
               <a:rPr lang="en-US" smtClean="0"/>
-              <a:t>8/1/2025</a:t>
+              <a:t>8/2/2025</a:t>
             </a:fld>
             <a:endParaRPr lang="en-US"/>
           </a:p>
@@ -4992,7 +5205,7 @@
           <a:p>
             <a:fld id="{D83FB9BE-DA6C-46CF-8E77-0CE63E601AD4}" type="datetimeFigureOut">
               <a:rPr lang="en-US" smtClean="0"/>
-              <a:t>8/1/2025</a:t>
+              <a:t>8/2/2025</a:t>
             </a:fld>
             <a:endParaRPr lang="en-US"/>
           </a:p>
@@ -5280,7 +5493,7 @@
           <a:p>
             <a:fld id="{D83FB9BE-DA6C-46CF-8E77-0CE63E601AD4}" type="datetimeFigureOut">
               <a:rPr lang="en-US" smtClean="0"/>
-              <a:t>8/1/2025</a:t>
+              <a:t>8/2/2025</a:t>
             </a:fld>
             <a:endParaRPr lang="en-US"/>
           </a:p>
@@ -5521,7 +5734,7 @@
           <a:p>
             <a:fld id="{D83FB9BE-DA6C-46CF-8E77-0CE63E601AD4}" type="datetimeFigureOut">
               <a:rPr lang="en-US" smtClean="0"/>
-              <a:t>8/1/2025</a:t>
+              <a:t>8/2/2025</a:t>
             </a:fld>
             <a:endParaRPr lang="en-US"/>
           </a:p>
@@ -6404,6 +6617,11 @@
           </p:cNvGraphicFramePr>
           <p:nvPr>
             <p:ph idx="1"/>
+            <p:extLst>
+              <p:ext uri="{D42A27DB-BD31-4B8C-83A1-F6EECF244321}">
+                <p14:modId xmlns:p14="http://schemas.microsoft.com/office/powerpoint/2010/main" val="1360167518"/>
+              </p:ext>
+            </p:extLst>
           </p:nvPr>
         </p:nvGraphicFramePr>
         <p:xfrm>
@@ -6438,32 +6656,44 @@
                     <a:bodyPr/>
                     <a:lstStyle/>
                     <a:p>
-                      <a:pPr>
+                      <a:pPr algn="ctr">
                         <a:buNone/>
                       </a:pPr>
                       <a:r>
-                        <a:rPr lang="en-US"/>
+                        <a:rPr lang="en-US" b="1"/>
                         <a:t>Problem</a:t>
                       </a:r>
                     </a:p>
                   </a:txBody>
-                  <a:tcPr anchor="ctr"/>
+                  <a:tcPr anchor="ctr">
+                    <a:solidFill>
+                      <a:schemeClr val="bg1">
+                        <a:lumMod val="85000"/>
+                      </a:schemeClr>
+                    </a:solidFill>
+                  </a:tcPr>
                 </a:tc>
                 <a:tc>
                   <a:txBody>
                     <a:bodyPr/>
                     <a:lstStyle/>
                     <a:p>
-                      <a:pPr>
+                      <a:pPr algn="ctr">
                         <a:buNone/>
                       </a:pPr>
                       <a:r>
-                        <a:rPr lang="en-US"/>
+                        <a:rPr lang="en-US" b="1" dirty="0"/>
                         <a:t>Example Features</a:t>
                       </a:r>
                     </a:p>
                   </a:txBody>
-                  <a:tcPr anchor="ctr"/>
+                  <a:tcPr anchor="ctr">
+                    <a:solidFill>
+                      <a:schemeClr val="bg1">
+                        <a:lumMod val="85000"/>
+                      </a:schemeClr>
+                    </a:solidFill>
+                  </a:tcPr>
                 </a:tc>
                 <a:extLst>
                   <a:ext uri="{0D108BD9-81ED-4DB2-BD59-A6C34878D82A}">
@@ -7405,13 +7635,7 @@
   <p:cSld>
     <p:spTree>
       <p:nvGrpSpPr>
-        <p:cNvPr id="1" name="">
-          <a:extLst>
-            <a:ext uri="{FF2B5EF4-FFF2-40B4-BE49-F238E27FC236}">
-              <a16:creationId xmlns:a16="http://schemas.microsoft.com/office/drawing/2014/main" id="{CF452EDB-8C6F-DA21-CA10-506C092C17D3}"/>
-            </a:ext>
-          </a:extLst>
-        </p:cNvPr>
+        <p:cNvPr id="1" name=""/>
         <p:cNvGrpSpPr/>
         <p:nvPr/>
       </p:nvGrpSpPr>
@@ -7425,53 +7649,10 @@
       </p:grpSpPr>
       <p:sp>
         <p:nvSpPr>
-          <p:cNvPr id="2" name="Content Placeholder 1">
-            <a:extLst>
-              <a:ext uri="{FF2B5EF4-FFF2-40B4-BE49-F238E27FC236}">
-                <a16:creationId xmlns:a16="http://schemas.microsoft.com/office/drawing/2014/main" id="{E9432BF3-EBC3-84DA-6256-9DFBD39C3EF8}"/>
-              </a:ext>
-            </a:extLst>
-          </p:cNvPr>
-          <p:cNvSpPr>
-            <a:spLocks noGrp="1"/>
-          </p:cNvSpPr>
-          <p:nvPr>
-            <p:ph idx="1"/>
-          </p:nvPr>
-        </p:nvSpPr>
-        <p:spPr>
-          <a:xfrm>
-            <a:off x="838200" y="1633491"/>
-            <a:ext cx="10515600" cy="410245"/>
-          </a:xfrm>
-        </p:spPr>
-        <p:txBody>
-          <a:bodyPr>
-            <a:normAutofit lnSpcReduction="10000"/>
-          </a:bodyPr>
-          <a:lstStyle/>
-          <a:p>
-            <a:pPr marL="0" indent="0">
-              <a:buNone/>
-            </a:pPr>
-            <a:r>
-              <a:rPr lang="en-US" sz="2400" b="1" dirty="0"/>
-              <a:t>Confusion Matrix:</a:t>
-            </a:r>
-            <a:r>
-              <a:rPr lang="en-US" sz="2400" dirty="0"/>
-              <a:t> A table summarizing prediction accuracy</a:t>
-            </a:r>
-            <a:endParaRPr lang="en-US" sz="2400" b="1" dirty="0"/>
-          </a:p>
-        </p:txBody>
-      </p:sp>
-      <p:sp>
-        <p:nvSpPr>
-          <p:cNvPr id="3" name="Title 2">
-            <a:extLst>
-              <a:ext uri="{FF2B5EF4-FFF2-40B4-BE49-F238E27FC236}">
-                <a16:creationId xmlns:a16="http://schemas.microsoft.com/office/drawing/2014/main" id="{94BD4596-B9A1-B460-0BEF-45C6EFBF5881}"/>
+          <p:cNvPr id="2" name="Titel 1">
+            <a:extLst>
+              <a:ext uri="{FF2B5EF4-FFF2-40B4-BE49-F238E27FC236}">
+                <a16:creationId xmlns:a16="http://schemas.microsoft.com/office/drawing/2014/main" id="{37EAD044-CF40-5441-A6C5-A306615F2936}"/>
               </a:ext>
             </a:extLst>
           </p:cNvPr>
@@ -7488,471 +7669,431 @@
           <a:lstStyle/>
           <a:p>
             <a:r>
-              <a:rPr lang="en-US" dirty="0"/>
-              <a:t>Measuring Classification Performance</a:t>
+              <a:rPr lang="de-DE" dirty="0"/>
+              <a:t>Confusion Matrix</a:t>
             </a:r>
           </a:p>
         </p:txBody>
       </p:sp>
       <p:sp>
         <p:nvSpPr>
-          <p:cNvPr id="10" name="Content Placeholder 1">
-            <a:extLst>
-              <a:ext uri="{FF2B5EF4-FFF2-40B4-BE49-F238E27FC236}">
-                <a16:creationId xmlns:a16="http://schemas.microsoft.com/office/drawing/2014/main" id="{2275BCB7-2A19-8AB8-2680-32718E88D9DD}"/>
-              </a:ext>
-            </a:extLst>
-          </p:cNvPr>
-          <p:cNvSpPr txBox="1">
-            <a:spLocks/>
-          </p:cNvSpPr>
+          <p:cNvPr id="5" name="Rechteck 4">
+            <a:extLst>
+              <a:ext uri="{FF2B5EF4-FFF2-40B4-BE49-F238E27FC236}">
+                <a16:creationId xmlns:a16="http://schemas.microsoft.com/office/drawing/2014/main" id="{7C23633B-B73C-CB4B-9298-DAEAACEBCCB8}"/>
+              </a:ext>
+            </a:extLst>
+          </p:cNvPr>
+          <p:cNvSpPr/>
           <p:nvPr/>
         </p:nvSpPr>
         <p:spPr>
           <a:xfrm>
-            <a:off x="838200" y="3394537"/>
-            <a:ext cx="10515600" cy="2839456"/>
+            <a:off x="6367780" y="3114154"/>
+            <a:ext cx="5824220" cy="2923877"/>
           </a:xfrm>
           <a:prstGeom prst="rect">
             <a:avLst/>
           </a:prstGeom>
         </p:spPr>
         <p:txBody>
-          <a:bodyPr vert="horz" lIns="91440" tIns="45720" rIns="91440" bIns="45720" rtlCol="0">
-            <a:normAutofit/>
+          <a:bodyPr wrap="square">
+            <a:spAutoFit/>
           </a:bodyPr>
-          <a:lstStyle>
-            <a:lvl1pPr marL="228600" indent="-228600" algn="l" defTabSz="914400" rtl="0" eaLnBrk="1" latinLnBrk="0" hangingPunct="1">
-              <a:lnSpc>
-                <a:spcPct val="90000"/>
-              </a:lnSpc>
-              <a:spcBef>
-                <a:spcPts val="1000"/>
-              </a:spcBef>
-              <a:buFont typeface="Arial" panose="020B0604020202020204" pitchFamily="34" charset="0"/>
-              <a:buChar char="•"/>
-              <a:defRPr sz="2800" kern="1200">
+          <a:lstStyle/>
+          <a:p>
+            <a:pPr marL="457200" indent="-457200">
+              <a:buFont typeface="+mj-lt"/>
+              <a:buAutoNum type="arabicPeriod"/>
+            </a:pPr>
+            <a:r>
+              <a:rPr lang="de-DE" sz="2000" dirty="0"/>
+              <a:t>TRUE POSITIVE (</a:t>
+            </a:r>
+            <a:r>
+              <a:rPr lang="de-DE" sz="2000" b="1" dirty="0">
                 <a:solidFill>
-                  <a:schemeClr val="tx1"/>
+                  <a:schemeClr val="tx2"/>
                 </a:solidFill>
-                <a:latin typeface="+mn-lt"/>
-                <a:ea typeface="+mn-ea"/>
-                <a:cs typeface="+mn-cs"/>
-              </a:defRPr>
-            </a:lvl1pPr>
-            <a:lvl2pPr marL="685800" indent="-228600" algn="l" defTabSz="914400" rtl="0" eaLnBrk="1" latinLnBrk="0" hangingPunct="1">
-              <a:lnSpc>
-                <a:spcPct val="90000"/>
-              </a:lnSpc>
-              <a:spcBef>
-                <a:spcPts val="500"/>
-              </a:spcBef>
-              <a:buFont typeface="Arial" panose="020B0604020202020204" pitchFamily="34" charset="0"/>
-              <a:buChar char="•"/>
-              <a:defRPr sz="2400" kern="1200">
+              </a:rPr>
+              <a:t>TP</a:t>
+            </a:r>
+            <a:r>
+              <a:rPr lang="de-DE" sz="2000" dirty="0"/>
+              <a:t>): Actual and predicted class is positive</a:t>
+            </a:r>
+          </a:p>
+          <a:p>
+            <a:pPr marL="457200" indent="-457200">
+              <a:buFont typeface="+mj-lt"/>
+              <a:buAutoNum type="arabicPeriod"/>
+            </a:pPr>
+            <a:r>
+              <a:rPr lang="de-DE" sz="2000" dirty="0"/>
+              <a:t>TRUE NEGATIVE (</a:t>
+            </a:r>
+            <a:r>
+              <a:rPr lang="de-DE" sz="2000" b="1" dirty="0">
                 <a:solidFill>
-                  <a:schemeClr val="tx1"/>
+                  <a:schemeClr val="tx2"/>
                 </a:solidFill>
-                <a:latin typeface="+mn-lt"/>
-                <a:ea typeface="+mn-ea"/>
-                <a:cs typeface="+mn-cs"/>
-              </a:defRPr>
-            </a:lvl2pPr>
-            <a:lvl3pPr marL="1143000" indent="-228600" algn="l" defTabSz="914400" rtl="0" eaLnBrk="1" latinLnBrk="0" hangingPunct="1">
-              <a:lnSpc>
-                <a:spcPct val="90000"/>
-              </a:lnSpc>
-              <a:spcBef>
-                <a:spcPts val="500"/>
-              </a:spcBef>
-              <a:buFont typeface="Arial" panose="020B0604020202020204" pitchFamily="34" charset="0"/>
-              <a:buChar char="•"/>
-              <a:defRPr sz="2000" kern="1200">
+              </a:rPr>
+              <a:t>TN</a:t>
+            </a:r>
+            <a:r>
+              <a:rPr lang="de-DE" sz="2000" dirty="0"/>
+              <a:t>): Actual and predicted class is negative</a:t>
+            </a:r>
+          </a:p>
+          <a:p>
+            <a:pPr marL="457200" indent="-457200">
+              <a:buFont typeface="+mj-lt"/>
+              <a:buAutoNum type="arabicPeriod"/>
+            </a:pPr>
+            <a:r>
+              <a:rPr lang="de-DE" sz="2000" dirty="0"/>
+              <a:t>FALSE NEGATIVE (</a:t>
+            </a:r>
+            <a:r>
+              <a:rPr lang="de-DE" sz="2000" b="1" dirty="0">
                 <a:solidFill>
-                  <a:schemeClr val="tx1"/>
+                  <a:schemeClr val="tx2"/>
                 </a:solidFill>
-                <a:latin typeface="+mn-lt"/>
-                <a:ea typeface="+mn-ea"/>
-                <a:cs typeface="+mn-cs"/>
-              </a:defRPr>
-            </a:lvl3pPr>
-            <a:lvl4pPr marL="1600200" indent="-228600" algn="l" defTabSz="914400" rtl="0" eaLnBrk="1" latinLnBrk="0" hangingPunct="1">
-              <a:lnSpc>
-                <a:spcPct val="90000"/>
-              </a:lnSpc>
-              <a:spcBef>
-                <a:spcPts val="500"/>
-              </a:spcBef>
-              <a:buFont typeface="Arial" panose="020B0604020202020204" pitchFamily="34" charset="0"/>
-              <a:buChar char="•"/>
-              <a:defRPr sz="1800" kern="1200">
+              </a:rPr>
+              <a:t>FN</a:t>
+            </a:r>
+            <a:r>
+              <a:rPr lang="de-DE" sz="2000" dirty="0"/>
+              <a:t>): Actual class </a:t>
+            </a:r>
+            <a:br>
+              <a:rPr lang="de-DE" sz="2000" dirty="0"/>
+            </a:br>
+            <a:r>
+              <a:rPr lang="de-DE" sz="2000" dirty="0"/>
+              <a:t>is positive and predicted negative</a:t>
+            </a:r>
+          </a:p>
+          <a:p>
+            <a:pPr marL="457200" indent="-457200">
+              <a:buFont typeface="+mj-lt"/>
+              <a:buAutoNum type="arabicPeriod"/>
+            </a:pPr>
+            <a:r>
+              <a:rPr lang="de-DE" sz="2000" dirty="0"/>
+              <a:t>FALSE POSITIVE (</a:t>
+            </a:r>
+            <a:r>
+              <a:rPr lang="de-DE" sz="2000" b="1" dirty="0">
                 <a:solidFill>
-                  <a:schemeClr val="tx1"/>
+                  <a:schemeClr val="tx2"/>
                 </a:solidFill>
-                <a:latin typeface="+mn-lt"/>
-                <a:ea typeface="+mn-ea"/>
-                <a:cs typeface="+mn-cs"/>
-              </a:defRPr>
-            </a:lvl4pPr>
-            <a:lvl5pPr marL="2057400" indent="-228600" algn="l" defTabSz="914400" rtl="0" eaLnBrk="1" latinLnBrk="0" hangingPunct="1">
-              <a:lnSpc>
-                <a:spcPct val="90000"/>
-              </a:lnSpc>
-              <a:spcBef>
-                <a:spcPts val="500"/>
-              </a:spcBef>
-              <a:buFont typeface="Arial" panose="020B0604020202020204" pitchFamily="34" charset="0"/>
-              <a:buChar char="•"/>
-              <a:defRPr sz="1800" kern="1200">
-                <a:solidFill>
-                  <a:schemeClr val="tx1"/>
-                </a:solidFill>
-                <a:latin typeface="+mn-lt"/>
-                <a:ea typeface="+mn-ea"/>
-                <a:cs typeface="+mn-cs"/>
-              </a:defRPr>
-            </a:lvl5pPr>
-            <a:lvl6pPr marL="2514600" indent="-228600" algn="l" defTabSz="914400" rtl="0" eaLnBrk="1" latinLnBrk="0" hangingPunct="1">
-              <a:lnSpc>
-                <a:spcPct val="90000"/>
-              </a:lnSpc>
-              <a:spcBef>
-                <a:spcPts val="500"/>
-              </a:spcBef>
-              <a:buFont typeface="Arial" panose="020B0604020202020204" pitchFamily="34" charset="0"/>
-              <a:buChar char="•"/>
-              <a:defRPr sz="1800" kern="1200">
-                <a:solidFill>
-                  <a:schemeClr val="tx1"/>
-                </a:solidFill>
-                <a:latin typeface="+mn-lt"/>
-                <a:ea typeface="+mn-ea"/>
-                <a:cs typeface="+mn-cs"/>
-              </a:defRPr>
-            </a:lvl6pPr>
-            <a:lvl7pPr marL="2971800" indent="-228600" algn="l" defTabSz="914400" rtl="0" eaLnBrk="1" latinLnBrk="0" hangingPunct="1">
-              <a:lnSpc>
-                <a:spcPct val="90000"/>
-              </a:lnSpc>
-              <a:spcBef>
-                <a:spcPts val="500"/>
-              </a:spcBef>
-              <a:buFont typeface="Arial" panose="020B0604020202020204" pitchFamily="34" charset="0"/>
-              <a:buChar char="•"/>
-              <a:defRPr sz="1800" kern="1200">
-                <a:solidFill>
-                  <a:schemeClr val="tx1"/>
-                </a:solidFill>
-                <a:latin typeface="+mn-lt"/>
-                <a:ea typeface="+mn-ea"/>
-                <a:cs typeface="+mn-cs"/>
-              </a:defRPr>
-            </a:lvl7pPr>
-            <a:lvl8pPr marL="3429000" indent="-228600" algn="l" defTabSz="914400" rtl="0" eaLnBrk="1" latinLnBrk="0" hangingPunct="1">
-              <a:lnSpc>
-                <a:spcPct val="90000"/>
-              </a:lnSpc>
-              <a:spcBef>
-                <a:spcPts val="500"/>
-              </a:spcBef>
-              <a:buFont typeface="Arial" panose="020B0604020202020204" pitchFamily="34" charset="0"/>
-              <a:buChar char="•"/>
-              <a:defRPr sz="1800" kern="1200">
-                <a:solidFill>
-                  <a:schemeClr val="tx1"/>
-                </a:solidFill>
-                <a:latin typeface="+mn-lt"/>
-                <a:ea typeface="+mn-ea"/>
-                <a:cs typeface="+mn-cs"/>
-              </a:defRPr>
-            </a:lvl8pPr>
-            <a:lvl9pPr marL="3886200" indent="-228600" algn="l" defTabSz="914400" rtl="0" eaLnBrk="1" latinLnBrk="0" hangingPunct="1">
-              <a:lnSpc>
-                <a:spcPct val="90000"/>
-              </a:lnSpc>
-              <a:spcBef>
-                <a:spcPts val="500"/>
-              </a:spcBef>
-              <a:buFont typeface="Arial" panose="020B0604020202020204" pitchFamily="34" charset="0"/>
-              <a:buChar char="•"/>
-              <a:defRPr sz="1800" kern="1200">
-                <a:solidFill>
-                  <a:schemeClr val="tx1"/>
-                </a:solidFill>
-                <a:latin typeface="+mn-lt"/>
-                <a:ea typeface="+mn-ea"/>
-                <a:cs typeface="+mn-cs"/>
-              </a:defRPr>
-            </a:lvl9pPr>
-          </a:lstStyle>
-          <a:p>
-            <a:r>
-              <a:rPr lang="en-US" sz="1800" b="1" dirty="0"/>
-              <a:t>Medical Context:</a:t>
-            </a:r>
-            <a:endParaRPr lang="en-US" sz="1800" dirty="0"/>
-          </a:p>
-          <a:p>
-            <a:r>
-              <a:rPr lang="en-US" sz="1800" b="1" dirty="0"/>
-              <a:t>TP:</a:t>
-            </a:r>
-            <a:r>
-              <a:rPr lang="en-US" sz="1800" dirty="0"/>
-              <a:t> Correctly identifies diabetic patient</a:t>
-            </a:r>
-          </a:p>
-          <a:p>
-            <a:r>
-              <a:rPr lang="en-US" sz="1800" b="1" dirty="0"/>
-              <a:t>FP:</a:t>
-            </a:r>
-            <a:r>
-              <a:rPr lang="en-US" sz="1800" dirty="0"/>
-              <a:t> Misdiagnoses healthy patient as diabetic</a:t>
-            </a:r>
-          </a:p>
-          <a:p>
-            <a:r>
-              <a:rPr lang="en-US" sz="1800" b="1" dirty="0"/>
-              <a:t>TN:</a:t>
-            </a:r>
-            <a:r>
-              <a:rPr lang="en-US" sz="1800" dirty="0"/>
-              <a:t> Correctly identifies healthy patient</a:t>
-            </a:r>
-          </a:p>
-          <a:p>
-            <a:r>
-              <a:rPr lang="en-US" sz="1800" b="1" dirty="0"/>
-              <a:t>FN:</a:t>
-            </a:r>
-            <a:r>
-              <a:rPr lang="en-US" sz="1800" dirty="0"/>
-              <a:t> Misses diabetic patient (dangerous)</a:t>
-            </a:r>
-          </a:p>
-          <a:p>
-            <a:endParaRPr lang="en-US" sz="1800" dirty="0"/>
-          </a:p>
-          <a:p>
-            <a:r>
-              <a:rPr lang="en-US" sz="1800" dirty="0"/>
-              <a:t>Accuracy = (TP + TN ) / (TP + TN + FP + FN)</a:t>
-            </a:r>
+              </a:rPr>
+              <a:t>FP</a:t>
+            </a:r>
+            <a:r>
+              <a:rPr lang="de-DE" sz="2000" dirty="0"/>
+              <a:t>): Actual class </a:t>
+            </a:r>
+            <a:br>
+              <a:rPr lang="de-DE" sz="2000" dirty="0"/>
+            </a:br>
+            <a:r>
+              <a:rPr lang="de-DE" sz="2000" dirty="0"/>
+              <a:t>is negative and predicted positive</a:t>
+            </a:r>
+          </a:p>
+          <a:p>
+            <a:endParaRPr lang="de-DE" sz="2400" dirty="0"/>
           </a:p>
         </p:txBody>
       </p:sp>
       <p:graphicFrame>
         <p:nvGraphicFramePr>
-          <p:cNvPr id="11" name="Table 10">
-            <a:extLst>
-              <a:ext uri="{FF2B5EF4-FFF2-40B4-BE49-F238E27FC236}">
-                <a16:creationId xmlns:a16="http://schemas.microsoft.com/office/drawing/2014/main" id="{EBAFD4FA-3480-DFDD-24DC-C28CA337DF35}"/>
+          <p:cNvPr id="6" name="Table 96">
+            <a:extLst>
+              <a:ext uri="{FF2B5EF4-FFF2-40B4-BE49-F238E27FC236}">
+                <a16:creationId xmlns:a16="http://schemas.microsoft.com/office/drawing/2014/main" id="{95FCDC4C-175D-B542-BA3A-D6EC4578F8CC}"/>
               </a:ext>
             </a:extLst>
           </p:cNvPr>
           <p:cNvGraphicFramePr>
             <a:graphicFrameLocks noGrp="1"/>
           </p:cNvGraphicFramePr>
-          <p:nvPr/>
+          <p:nvPr>
+            <p:extLst>
+              <p:ext uri="{D42A27DB-BD31-4B8C-83A1-F6EECF244321}">
+                <p14:modId xmlns:p14="http://schemas.microsoft.com/office/powerpoint/2010/main" val="3738661343"/>
+              </p:ext>
+            </p:extLst>
+          </p:nvPr>
         </p:nvGraphicFramePr>
         <p:xfrm>
-          <a:off x="838200" y="2131496"/>
-          <a:ext cx="9957486" cy="1097280"/>
+          <a:off x="582780" y="3177777"/>
+          <a:ext cx="5620798" cy="2880321"/>
         </p:xfrm>
         <a:graphic>
           <a:graphicData uri="http://schemas.openxmlformats.org/drawingml/2006/table">
             <a:tbl>
-              <a:tblPr>
-                <a:tableStyleId>{616DA210-FB5B-4158-B5E0-FEB733F419BA}</a:tableStyleId>
+              <a:tblPr firstRow="1" bandRow="1">
+                <a:tableStyleId>{D7AC3CCA-C797-4891-BE02-D94E43425B78}</a:tableStyleId>
               </a:tblPr>
               <a:tblGrid>
-                <a:gridCol w="2611256">
+                <a:gridCol w="1475548">
                   <a:extLst>
                     <a:ext uri="{9D8B030D-6E8A-4147-A177-3AD203B41FA5}">
-                      <a16:colId xmlns:a16="http://schemas.microsoft.com/office/drawing/2014/main" val="2196020590"/>
+                      <a16:colId xmlns:a16="http://schemas.microsoft.com/office/drawing/2014/main" val="718356850"/>
                     </a:ext>
                   </a:extLst>
                 </a:gridCol>
-                <a:gridCol w="4027068">
+                <a:gridCol w="2072625">
                   <a:extLst>
                     <a:ext uri="{9D8B030D-6E8A-4147-A177-3AD203B41FA5}">
-                      <a16:colId xmlns:a16="http://schemas.microsoft.com/office/drawing/2014/main" val="139403631"/>
+                      <a16:colId xmlns:a16="http://schemas.microsoft.com/office/drawing/2014/main" val="2103916639"/>
                     </a:ext>
                   </a:extLst>
                 </a:gridCol>
-                <a:gridCol w="3319162">
+                <a:gridCol w="2072625">
                   <a:extLst>
                     <a:ext uri="{9D8B030D-6E8A-4147-A177-3AD203B41FA5}">
-                      <a16:colId xmlns:a16="http://schemas.microsoft.com/office/drawing/2014/main" val="1560750944"/>
+                      <a16:colId xmlns:a16="http://schemas.microsoft.com/office/drawing/2014/main" val="3907626621"/>
                     </a:ext>
                   </a:extLst>
                 </a:gridCol>
               </a:tblGrid>
-              <a:tr h="0">
+              <a:tr h="960107">
                 <a:tc>
                   <a:txBody>
                     <a:bodyPr/>
                     <a:lstStyle/>
                     <a:p>
-                      <a:pPr>
-                        <a:buNone/>
-                      </a:pPr>
-                      <a:endParaRPr lang="en-US"/>
+                      <a:endParaRPr lang="en-US" sz="1900" b="0" dirty="0">
+                        <a:solidFill>
+                          <a:schemeClr val="tx1"/>
+                        </a:solidFill>
+                      </a:endParaRPr>
                     </a:p>
                   </a:txBody>
-                  <a:tcPr anchor="ctr"/>
+                  <a:tcPr marL="121920" marR="121920" marT="60960" marB="60960" anchor="ctr"/>
                 </a:tc>
                 <a:tc>
                   <a:txBody>
                     <a:bodyPr/>
                     <a:lstStyle/>
                     <a:p>
-                      <a:pPr>
-                        <a:buNone/>
-                      </a:pPr>
+                      <a:pPr algn="ctr"/>
                       <a:r>
-                        <a:rPr lang="en-US" b="1" dirty="0"/>
-                        <a:t>Predicted Non-Diabetic</a:t>
+                        <a:rPr lang="en-US" sz="1900" b="0" dirty="0">
+                          <a:solidFill>
+                            <a:schemeClr val="tx1"/>
+                          </a:solidFill>
+                        </a:rPr>
+                        <a:t>Predicted class positive</a:t>
                       </a:r>
-                      <a:endParaRPr lang="en-US" dirty="0"/>
                     </a:p>
                   </a:txBody>
-                  <a:tcPr anchor="ctr"/>
+                  <a:tcPr marL="121920" marR="121920" marT="60960" marB="60960" anchor="ctr"/>
                 </a:tc>
                 <a:tc>
                   <a:txBody>
                     <a:bodyPr/>
                     <a:lstStyle/>
                     <a:p>
-                      <a:pPr>
+                      <a:pPr marL="0" marR="0" lvl="0" indent="0" algn="ctr" defTabSz="761970" rtl="0" eaLnBrk="1" fontAlgn="auto" latinLnBrk="0" hangingPunct="1">
+                        <a:lnSpc>
+                          <a:spcPct val="100000"/>
+                        </a:lnSpc>
+                        <a:spcBef>
+                          <a:spcPts val="0"/>
+                        </a:spcBef>
+                        <a:spcAft>
+                          <a:spcPts val="0"/>
+                        </a:spcAft>
+                        <a:buClrTx/>
+                        <a:buSzTx/>
+                        <a:buFontTx/>
                         <a:buNone/>
+                        <a:tabLst/>
+                        <a:defRPr/>
                       </a:pPr>
                       <a:r>
-                        <a:rPr lang="en-US" b="1"/>
-                        <a:t>Predicted Diabetic</a:t>
+                        <a:rPr lang="en-US" sz="1900" b="0" dirty="0">
+                          <a:solidFill>
+                            <a:schemeClr val="tx1"/>
+                          </a:solidFill>
+                        </a:rPr>
+                        <a:t>Predicted class negative</a:t>
                       </a:r>
-                      <a:endParaRPr lang="en-US"/>
                     </a:p>
                   </a:txBody>
-                  <a:tcPr anchor="ctr"/>
+                  <a:tcPr marL="121920" marR="121920" marT="60960" marB="60960" anchor="ctr"/>
                 </a:tc>
                 <a:extLst>
                   <a:ext uri="{0D108BD9-81ED-4DB2-BD59-A6C34878D82A}">
-                    <a16:rowId xmlns:a16="http://schemas.microsoft.com/office/drawing/2014/main" val="1035721716"/>
+                    <a16:rowId xmlns:a16="http://schemas.microsoft.com/office/drawing/2014/main" val="2960805545"/>
                   </a:ext>
                 </a:extLst>
               </a:tr>
-              <a:tr h="0">
+              <a:tr h="960107">
                 <a:tc>
                   <a:txBody>
                     <a:bodyPr/>
                     <a:lstStyle/>
                     <a:p>
-                      <a:pPr>
-                        <a:buNone/>
-                      </a:pPr>
+                      <a:pPr algn="ctr"/>
                       <a:r>
-                        <a:rPr lang="en-US" b="1"/>
-                        <a:t>Actual Non-Diabetic</a:t>
+                        <a:rPr lang="en-US" sz="1900" b="0" dirty="0">
+                          <a:solidFill>
+                            <a:schemeClr val="tx1"/>
+                          </a:solidFill>
+                        </a:rPr>
+                        <a:t>True class</a:t>
                       </a:r>
-                      <a:endParaRPr lang="en-US"/>
+                      <a:br>
+                        <a:rPr lang="en-US" sz="1900" b="0" dirty="0">
+                          <a:solidFill>
+                            <a:schemeClr val="tx1"/>
+                          </a:solidFill>
+                        </a:rPr>
+                      </a:br>
+                      <a:r>
+                        <a:rPr lang="en-US" sz="1900" b="0" dirty="0">
+                          <a:solidFill>
+                            <a:schemeClr val="tx1"/>
+                          </a:solidFill>
+                        </a:rPr>
+                        <a:t>positive</a:t>
+                      </a:r>
                     </a:p>
                   </a:txBody>
-                  <a:tcPr anchor="ctr"/>
+                  <a:tcPr marL="121920" marR="121920" marT="60960" marB="60960" anchor="ctr"/>
                 </a:tc>
                 <a:tc>
                   <a:txBody>
                     <a:bodyPr/>
                     <a:lstStyle/>
                     <a:p>
-                      <a:pPr>
-                        <a:buNone/>
-                      </a:pPr>
+                      <a:pPr algn="ctr"/>
                       <a:r>
-                        <a:rPr lang="en-US"/>
-                        <a:t>True Negative (TN)</a:t>
+                        <a:rPr lang="de-DE" sz="1900" dirty="0"/>
+                        <a:t>TRUE </a:t>
                       </a:r>
+                      <a:br>
+                        <a:rPr lang="de-DE" sz="1900" dirty="0"/>
+                      </a:br>
+                      <a:r>
+                        <a:rPr lang="de-DE" sz="1900" dirty="0"/>
+                        <a:t>POSITIVE </a:t>
+                      </a:r>
+                      <a:endParaRPr lang="en-US" sz="1900" dirty="0">
+                        <a:solidFill>
+                          <a:schemeClr val="tx1"/>
+                        </a:solidFill>
+                      </a:endParaRPr>
                     </a:p>
                   </a:txBody>
-                  <a:tcPr anchor="ctr"/>
+                  <a:tcPr marL="121920" marR="121920" marT="60960" marB="60960" anchor="ctr"/>
                 </a:tc>
                 <a:tc>
                   <a:txBody>
                     <a:bodyPr/>
                     <a:lstStyle/>
                     <a:p>
-                      <a:pPr>
-                        <a:buNone/>
-                      </a:pPr>
+                      <a:pPr algn="ctr"/>
                       <a:r>
-                        <a:rPr lang="en-US"/>
-                        <a:t>False Positive (FP)</a:t>
+                        <a:rPr lang="de-DE" sz="1900" dirty="0"/>
+                        <a:t>FALSE NEGATIVE </a:t>
                       </a:r>
+                      <a:endParaRPr lang="en-US" sz="1900" dirty="0">
+                        <a:solidFill>
+                          <a:schemeClr val="tx1"/>
+                        </a:solidFill>
+                      </a:endParaRPr>
                     </a:p>
                   </a:txBody>
-                  <a:tcPr anchor="ctr"/>
+                  <a:tcPr marL="121920" marR="121920" marT="60960" marB="60960" anchor="ctr"/>
                 </a:tc>
                 <a:extLst>
                   <a:ext uri="{0D108BD9-81ED-4DB2-BD59-A6C34878D82A}">
-                    <a16:rowId xmlns:a16="http://schemas.microsoft.com/office/drawing/2014/main" val="238350022"/>
+                    <a16:rowId xmlns:a16="http://schemas.microsoft.com/office/drawing/2014/main" val="700814895"/>
                   </a:ext>
                 </a:extLst>
               </a:tr>
-              <a:tr h="0">
+              <a:tr h="960107">
                 <a:tc>
                   <a:txBody>
                     <a:bodyPr/>
                     <a:lstStyle/>
                     <a:p>
-                      <a:pPr>
-                        <a:buNone/>
-                      </a:pPr>
+                      <a:pPr algn="ctr"/>
                       <a:r>
-                        <a:rPr lang="en-US" b="1"/>
-                        <a:t>Actual Diabetic</a:t>
+                        <a:rPr lang="en-US" sz="1900" b="0" dirty="0">
+                          <a:solidFill>
+                            <a:schemeClr val="tx1"/>
+                          </a:solidFill>
+                        </a:rPr>
+                        <a:t>True class</a:t>
                       </a:r>
-                      <a:endParaRPr lang="en-US"/>
+                      <a:br>
+                        <a:rPr lang="en-US" sz="1900" b="0" dirty="0">
+                          <a:solidFill>
+                            <a:schemeClr val="tx1"/>
+                          </a:solidFill>
+                        </a:rPr>
+                      </a:br>
+                      <a:r>
+                        <a:rPr lang="en-US" sz="1900" b="0" dirty="0">
+                          <a:solidFill>
+                            <a:schemeClr val="tx1"/>
+                          </a:solidFill>
+                        </a:rPr>
+                        <a:t>negative</a:t>
+                      </a:r>
                     </a:p>
                   </a:txBody>
-                  <a:tcPr anchor="ctr"/>
+                  <a:tcPr marL="121920" marR="121920" marT="60960" marB="60960" anchor="ctr"/>
                 </a:tc>
                 <a:tc>
                   <a:txBody>
                     <a:bodyPr/>
                     <a:lstStyle/>
                     <a:p>
-                      <a:pPr>
-                        <a:buNone/>
-                      </a:pPr>
+                      <a:pPr algn="ctr"/>
                       <a:r>
-                        <a:rPr lang="en-US"/>
-                        <a:t>False Negative (FN)</a:t>
+                        <a:rPr lang="de-DE" sz="1900" dirty="0"/>
+                        <a:t>FALSE POSITIVE </a:t>
                       </a:r>
+                      <a:endParaRPr lang="en-US" sz="1900" dirty="0">
+                        <a:solidFill>
+                          <a:schemeClr val="tx1"/>
+                        </a:solidFill>
+                      </a:endParaRPr>
                     </a:p>
                   </a:txBody>
-                  <a:tcPr anchor="ctr"/>
+                  <a:tcPr marL="121920" marR="121920" marT="60960" marB="60960" anchor="ctr"/>
                 </a:tc>
                 <a:tc>
                   <a:txBody>
                     <a:bodyPr/>
                     <a:lstStyle/>
                     <a:p>
-                      <a:pPr>
-                        <a:buNone/>
-                      </a:pPr>
+                      <a:pPr algn="ctr"/>
                       <a:r>
-                        <a:rPr lang="en-US" dirty="0"/>
-                        <a:t>True Positive (TP)</a:t>
+                        <a:rPr lang="de-DE" sz="1900" dirty="0"/>
+                        <a:t>TRUE NEGATIVE </a:t>
                       </a:r>
+                      <a:endParaRPr lang="en-US" sz="1900" dirty="0">
+                        <a:solidFill>
+                          <a:schemeClr val="tx1"/>
+                        </a:solidFill>
+                      </a:endParaRPr>
                     </a:p>
                   </a:txBody>
-                  <a:tcPr anchor="ctr"/>
+                  <a:tcPr marL="121920" marR="121920" marT="60960" marB="60960" anchor="ctr"/>
                 </a:tc>
                 <a:extLst>
                   <a:ext uri="{0D108BD9-81ED-4DB2-BD59-A6C34878D82A}">
-                    <a16:rowId xmlns:a16="http://schemas.microsoft.com/office/drawing/2014/main" val="3674301640"/>
+                    <a16:rowId xmlns:a16="http://schemas.microsoft.com/office/drawing/2014/main" val="4008217212"/>
                   </a:ext>
                 </a:extLst>
               </a:tr>
@@ -7960,16 +8101,84 @@
           </a:graphicData>
         </a:graphic>
       </p:graphicFrame>
+      <p:sp>
+        <p:nvSpPr>
+          <p:cNvPr id="9" name="Inhaltsplatzhalter 2">
+            <a:extLst>
+              <a:ext uri="{FF2B5EF4-FFF2-40B4-BE49-F238E27FC236}">
+                <a16:creationId xmlns:a16="http://schemas.microsoft.com/office/drawing/2014/main" id="{B36BB95C-3CD0-934A-BBF0-F6D0A346833C}"/>
+              </a:ext>
+            </a:extLst>
+          </p:cNvPr>
+          <p:cNvSpPr>
+            <a:spLocks noGrp="1"/>
+          </p:cNvSpPr>
+          <p:nvPr>
+            <p:ph idx="1"/>
+          </p:nvPr>
+        </p:nvSpPr>
+        <p:spPr>
+          <a:xfrm>
+            <a:off x="582780" y="1730189"/>
+            <a:ext cx="10515600" cy="1021977"/>
+          </a:xfrm>
+        </p:spPr>
+        <p:txBody>
+          <a:bodyPr>
+            <a:normAutofit/>
+          </a:bodyPr>
+          <a:lstStyle/>
+          <a:p>
+            <a:pPr marL="0" indent="0">
+              <a:buNone/>
+            </a:pPr>
+            <a:r>
+              <a:rPr lang="de-DE" dirty="0"/>
+              <a:t>Use these four statistics to calculate other evaluation metrics, such as overall accuracy, true positive rate, and false positive rate</a:t>
+            </a:r>
+          </a:p>
+          <a:p>
+            <a:pPr marL="0" indent="0">
+              <a:buNone/>
+            </a:pPr>
+            <a:endParaRPr lang="de-DE" dirty="0"/>
+          </a:p>
+          <a:p>
+            <a:pPr marL="0" indent="0">
+              <a:buNone/>
+            </a:pPr>
+            <a:endParaRPr lang="de-DE" dirty="0"/>
+          </a:p>
+          <a:p>
+            <a:pPr marL="0" indent="0">
+              <a:buNone/>
+            </a:pPr>
+            <a:endParaRPr lang="de-DE" dirty="0"/>
+          </a:p>
+        </p:txBody>
+      </p:sp>
     </p:spTree>
     <p:extLst>
       <p:ext uri="{BB962C8B-B14F-4D97-AF65-F5344CB8AC3E}">
-        <p14:creationId xmlns:p14="http://schemas.microsoft.com/office/powerpoint/2010/main" val="2379583142"/>
+        <p14:creationId xmlns:p14="http://schemas.microsoft.com/office/powerpoint/2010/main" val="1227170847"/>
       </p:ext>
     </p:extLst>
   </p:cSld>
   <p:clrMapOvr>
     <a:masterClrMapping/>
   </p:clrMapOvr>
+  <mc:AlternateContent xmlns:mc="http://schemas.openxmlformats.org/markup-compatibility/2006" xmlns:p14="http://schemas.microsoft.com/office/powerpoint/2010/main">
+    <mc:Choice Requires="p14">
+      <p:transition spd="med" p14:dur="700">
+        <p:fade/>
+      </p:transition>
+    </mc:Choice>
+    <mc:Fallback xmlns="">
+      <p:transition spd="med">
+        <p:fade/>
+      </p:transition>
+    </mc:Fallback>
+  </mc:AlternateContent>
 </p:sld>
 </file>
 
@@ -7992,10 +8201,10 @@
       </p:grpSpPr>
       <p:sp>
         <p:nvSpPr>
-          <p:cNvPr id="4" name="Title 3">
-            <a:extLst>
-              <a:ext uri="{FF2B5EF4-FFF2-40B4-BE49-F238E27FC236}">
-                <a16:creationId xmlns:a16="http://schemas.microsoft.com/office/drawing/2014/main" id="{C8A35FB7-F380-D87E-D597-1DB5F3622B03}"/>
+          <p:cNvPr id="2" name="Title 1">
+            <a:extLst>
+              <a:ext uri="{FF2B5EF4-FFF2-40B4-BE49-F238E27FC236}">
+                <a16:creationId xmlns:a16="http://schemas.microsoft.com/office/drawing/2014/main" id="{B22977B1-547B-43B2-86C8-50159B2DE907}"/>
               </a:ext>
             </a:extLst>
           </p:cNvPr>
@@ -8012,50 +8221,474 @@
           <a:lstStyle/>
           <a:p>
             <a:r>
-              <a:rPr lang="en-US" dirty="0"/>
-              <a:t>Unsupervised Learning</a:t>
-            </a:r>
+              <a:rPr lang="de-DE" dirty="0"/>
+              <a:t>Overall Accuracy</a:t>
+            </a:r>
+            <a:endParaRPr lang="en-US" dirty="0"/>
           </a:p>
         </p:txBody>
       </p:sp>
-      <p:sp>
-        <p:nvSpPr>
-          <p:cNvPr id="5" name="Text Placeholder 4">
-            <a:extLst>
-              <a:ext uri="{FF2B5EF4-FFF2-40B4-BE49-F238E27FC236}">
-                <a16:creationId xmlns:a16="http://schemas.microsoft.com/office/drawing/2014/main" id="{52021908-6640-2279-6376-B5868E148168}"/>
-              </a:ext>
-            </a:extLst>
-          </p:cNvPr>
-          <p:cNvSpPr>
-            <a:spLocks noGrp="1"/>
-          </p:cNvSpPr>
-          <p:nvPr>
-            <p:ph type="body" idx="1"/>
-          </p:nvPr>
-        </p:nvSpPr>
-        <p:spPr/>
-        <p:txBody>
-          <a:bodyPr/>
-          <a:lstStyle/>
-          <a:p>
-            <a:r>
-              <a:rPr lang="en-US" dirty="0"/>
-              <a:t>Clustering</a:t>
-            </a:r>
-          </a:p>
-        </p:txBody>
-      </p:sp>
+      <mc:AlternateContent xmlns:mc="http://schemas.openxmlformats.org/markup-compatibility/2006" xmlns:a14="http://schemas.microsoft.com/office/drawing/2010/main">
+        <mc:Choice Requires="a14">
+          <p:sp>
+            <p:nvSpPr>
+              <p:cNvPr id="3" name="Content Placeholder 2">
+                <a:extLst>
+                  <a:ext uri="{FF2B5EF4-FFF2-40B4-BE49-F238E27FC236}">
+                    <a16:creationId xmlns:a16="http://schemas.microsoft.com/office/drawing/2014/main" id="{844C7A84-9CD0-4AAB-8632-11C1BBF9CC59}"/>
+                  </a:ext>
+                </a:extLst>
+              </p:cNvPr>
+              <p:cNvSpPr>
+                <a:spLocks noGrp="1"/>
+              </p:cNvSpPr>
+              <p:nvPr>
+                <p:ph idx="1"/>
+              </p:nvPr>
+            </p:nvSpPr>
+            <p:spPr/>
+            <p:txBody>
+              <a:bodyPr>
+                <a:normAutofit/>
+              </a:bodyPr>
+              <a:lstStyle/>
+              <a:p>
+                <a:r>
+                  <a:rPr lang="de-DE" sz="2000" dirty="0"/>
+                  <a:t>Definition:</a:t>
+                </a:r>
+              </a:p>
+              <a:p>
+                <a:pPr marL="0" indent="0">
+                  <a:buNone/>
+                </a:pPr>
+                <a:endParaRPr lang="de-DE" sz="2000" dirty="0"/>
+              </a:p>
+              <a:p>
+                <a:pPr marL="0" indent="0">
+                  <a:buNone/>
+                </a:pPr>
+                <a14:m>
+                  <m:oMathPara xmlns:m="http://schemas.openxmlformats.org/officeDocument/2006/math">
+                    <m:oMathParaPr>
+                      <m:jc m:val="center"/>
+                    </m:oMathParaPr>
+                    <m:oMath xmlns:m="http://schemas.openxmlformats.org/officeDocument/2006/math">
+                      <m:r>
+                        <a:rPr lang="de-DE" sz="2000" b="1" i="1">
+                          <a:latin typeface="Cambria Math" panose="02040503050406030204" pitchFamily="18" charset="0"/>
+                        </a:rPr>
+                        <m:t>𝑶𝒗𝒆𝒓𝒂𝒍𝒍</m:t>
+                      </m:r>
+                      <m:r>
+                        <a:rPr lang="de-DE" sz="2000" b="1" i="1">
+                          <a:latin typeface="Cambria Math" panose="02040503050406030204" pitchFamily="18" charset="0"/>
+                        </a:rPr>
+                        <m:t> </m:t>
+                      </m:r>
+                      <m:r>
+                        <a:rPr lang="de-DE" sz="2000" b="1" i="1">
+                          <a:latin typeface="Cambria Math" panose="02040503050406030204" pitchFamily="18" charset="0"/>
+                        </a:rPr>
+                        <m:t>𝒂𝒄𝒄𝒖𝒓𝒂𝒄𝒚</m:t>
+                      </m:r>
+                      <m:r>
+                        <a:rPr lang="de-DE" sz="2000" b="1" i="1">
+                          <a:latin typeface="Cambria Math" panose="02040503050406030204" pitchFamily="18" charset="0"/>
+                        </a:rPr>
+                        <m:t>= </m:t>
+                      </m:r>
+                      <m:f>
+                        <m:fPr>
+                          <m:ctrlPr>
+                            <a:rPr lang="de-DE" sz="2000" b="1" i="1">
+                              <a:latin typeface="Cambria Math" panose="02040503050406030204" pitchFamily="18" charset="0"/>
+                            </a:rPr>
+                          </m:ctrlPr>
+                        </m:fPr>
+                        <m:num>
+                          <m:r>
+                            <a:rPr lang="de-DE" sz="2000" b="1" i="1">
+                              <a:latin typeface="Cambria Math" panose="02040503050406030204" pitchFamily="18" charset="0"/>
+                            </a:rPr>
+                            <m:t># </m:t>
+                          </m:r>
+                          <m:r>
+                            <a:rPr lang="de-DE" sz="2000" b="1" i="1">
+                              <a:latin typeface="Cambria Math" panose="02040503050406030204" pitchFamily="18" charset="0"/>
+                            </a:rPr>
+                            <m:t>𝑪𝒐𝒓𝒓𝒆𝒄𝒕</m:t>
+                          </m:r>
+                          <m:r>
+                            <a:rPr lang="de-DE" sz="2000" b="1" i="1">
+                              <a:latin typeface="Cambria Math" panose="02040503050406030204" pitchFamily="18" charset="0"/>
+                            </a:rPr>
+                            <m:t> </m:t>
+                          </m:r>
+                          <m:r>
+                            <a:rPr lang="de-DE" sz="2000" b="1" i="1">
+                              <a:latin typeface="Cambria Math" panose="02040503050406030204" pitchFamily="18" charset="0"/>
+                            </a:rPr>
+                            <m:t>𝒄𝒍𝒂𝒔𝒔𝒊𝒇𝒊𝒄𝒂𝒕𝒊𝒐𝒏𝒔</m:t>
+                          </m:r>
+                          <m:r>
+                            <a:rPr lang="de-DE" sz="2000" b="1" i="1">
+                              <a:latin typeface="Cambria Math" panose="02040503050406030204" pitchFamily="18" charset="0"/>
+                            </a:rPr>
+                            <m:t> (</m:t>
+                          </m:r>
+                          <m:r>
+                            <a:rPr lang="de-DE" sz="2000" b="1" i="1">
+                              <a:latin typeface="Cambria Math" panose="02040503050406030204" pitchFamily="18" charset="0"/>
+                            </a:rPr>
+                            <m:t>𝒕𝒆𝒔𝒕</m:t>
+                          </m:r>
+                          <m:r>
+                            <a:rPr lang="de-DE" sz="2000" b="1" i="1">
+                              <a:latin typeface="Cambria Math" panose="02040503050406030204" pitchFamily="18" charset="0"/>
+                            </a:rPr>
+                            <m:t> </m:t>
+                          </m:r>
+                          <m:r>
+                            <a:rPr lang="de-DE" sz="2000" b="1" i="1">
+                              <a:latin typeface="Cambria Math" panose="02040503050406030204" pitchFamily="18" charset="0"/>
+                            </a:rPr>
+                            <m:t>𝒔𝒆𝒕</m:t>
+                          </m:r>
+                          <m:r>
+                            <a:rPr lang="de-DE" sz="2000" b="1" i="1">
+                              <a:latin typeface="Cambria Math" panose="02040503050406030204" pitchFamily="18" charset="0"/>
+                            </a:rPr>
+                            <m:t>)</m:t>
+                          </m:r>
+                        </m:num>
+                        <m:den>
+                          <m:r>
+                            <a:rPr lang="de-DE" sz="2000" b="1" i="1">
+                              <a:latin typeface="Cambria Math" panose="02040503050406030204" pitchFamily="18" charset="0"/>
+                            </a:rPr>
+                            <m:t># </m:t>
+                          </m:r>
+                          <m:r>
+                            <a:rPr lang="de-DE" sz="2000" b="1" i="1">
+                              <a:latin typeface="Cambria Math" panose="02040503050406030204" pitchFamily="18" charset="0"/>
+                            </a:rPr>
+                            <m:t>𝑨𝒍𝒍</m:t>
+                          </m:r>
+                          <m:r>
+                            <a:rPr lang="de-DE" sz="2000" b="1" i="1">
+                              <a:latin typeface="Cambria Math" panose="02040503050406030204" pitchFamily="18" charset="0"/>
+                            </a:rPr>
+                            <m:t> </m:t>
+                          </m:r>
+                          <m:r>
+                            <a:rPr lang="de-DE" sz="2000" b="1" i="1">
+                              <a:latin typeface="Cambria Math" panose="02040503050406030204" pitchFamily="18" charset="0"/>
+                            </a:rPr>
+                            <m:t>𝒆𝒗𝒆𝒏𝒕𝒔</m:t>
+                          </m:r>
+                          <m:r>
+                            <a:rPr lang="de-DE" sz="2000" b="1" i="1">
+                              <a:latin typeface="Cambria Math" panose="02040503050406030204" pitchFamily="18" charset="0"/>
+                            </a:rPr>
+                            <m:t> (</m:t>
+                          </m:r>
+                          <m:r>
+                            <a:rPr lang="de-DE" sz="2000" b="1" i="1">
+                              <a:latin typeface="Cambria Math" panose="02040503050406030204" pitchFamily="18" charset="0"/>
+                            </a:rPr>
+                            <m:t>𝒕𝒆𝒔𝒕</m:t>
+                          </m:r>
+                          <m:r>
+                            <a:rPr lang="de-DE" sz="2000" b="1" i="1">
+                              <a:latin typeface="Cambria Math" panose="02040503050406030204" pitchFamily="18" charset="0"/>
+                            </a:rPr>
+                            <m:t> </m:t>
+                          </m:r>
+                          <m:r>
+                            <a:rPr lang="de-DE" sz="2000" b="1" i="1">
+                              <a:latin typeface="Cambria Math" panose="02040503050406030204" pitchFamily="18" charset="0"/>
+                            </a:rPr>
+                            <m:t>𝒔𝒆𝒕</m:t>
+                          </m:r>
+                          <m:r>
+                            <a:rPr lang="de-DE" sz="2000" b="1" i="1">
+                              <a:latin typeface="Cambria Math" panose="02040503050406030204" pitchFamily="18" charset="0"/>
+                            </a:rPr>
+                            <m:t>)</m:t>
+                          </m:r>
+                        </m:den>
+                      </m:f>
+                    </m:oMath>
+                  </m:oMathPara>
+                </a14:m>
+                <a:endParaRPr lang="de-DE" sz="2000" dirty="0"/>
+              </a:p>
+              <a:p>
+                <a:pPr marL="0" indent="0">
+                  <a:buNone/>
+                </a:pPr>
+                <a:endParaRPr lang="de-DE" sz="2000" dirty="0"/>
+              </a:p>
+              <a:p>
+                <a:r>
+                  <a:rPr lang="de-DE" sz="2000" dirty="0"/>
+                  <a:t>The proportion of correct classifications</a:t>
+                </a:r>
+              </a:p>
+              <a:p>
+                <a:pPr marL="0" indent="0">
+                  <a:buNone/>
+                </a:pPr>
+                <a:endParaRPr lang="de-DE" sz="2000" dirty="0"/>
+              </a:p>
+              <a:p>
+                <a:r>
+                  <a:rPr lang="de-DE" sz="2000" dirty="0"/>
+                  <a:t>Downsides:</a:t>
+                </a:r>
+              </a:p>
+              <a:p>
+                <a:pPr lvl="1"/>
+                <a:r>
+                  <a:rPr lang="de-DE" sz="1800" dirty="0"/>
+                  <a:t>Only considers the performance in general and not for the different </a:t>
+                </a:r>
+                <a:r>
+                  <a:rPr lang="de-DE" sz="1800" dirty="0" err="1"/>
+                  <a:t>classes</a:t>
+                </a:r>
+                <a:endParaRPr lang="de-DE" sz="1800" dirty="0"/>
+              </a:p>
+              <a:p>
+                <a:pPr lvl="1"/>
+                <a:r>
+                  <a:rPr lang="de-DE" sz="1800" dirty="0"/>
+                  <a:t>Therefore, not informative when </a:t>
+                </a:r>
+                <a:r>
+                  <a:rPr lang="de-DE" sz="1800" dirty="0" err="1"/>
+                  <a:t>the</a:t>
+                </a:r>
+                <a:r>
+                  <a:rPr lang="de-DE" sz="1800" dirty="0"/>
+                  <a:t> </a:t>
+                </a:r>
+                <a:r>
+                  <a:rPr lang="de-DE" sz="1800" dirty="0" err="1"/>
+                  <a:t>class</a:t>
+                </a:r>
+                <a:r>
+                  <a:rPr lang="de-DE" sz="1800" dirty="0"/>
+                  <a:t> distribution is unbalanced	</a:t>
+                </a:r>
+              </a:p>
+            </p:txBody>
+          </p:sp>
+        </mc:Choice>
+        <mc:Fallback xmlns="">
+          <p:sp>
+            <p:nvSpPr>
+              <p:cNvPr id="3" name="Content Placeholder 2">
+                <a:extLst>
+                  <a:ext uri="{FF2B5EF4-FFF2-40B4-BE49-F238E27FC236}">
+                    <a16:creationId xmlns:a16="http://schemas.microsoft.com/office/drawing/2014/main" id="{844C7A84-9CD0-4AAB-8632-11C1BBF9CC59}"/>
+                  </a:ext>
+                </a:extLst>
+              </p:cNvPr>
+              <p:cNvSpPr>
+                <a:spLocks noGrp="1" noRot="1" noChangeAspect="1" noMove="1" noResize="1" noEditPoints="1" noAdjustHandles="1" noChangeArrowheads="1" noChangeShapeType="1" noTextEdit="1"/>
+              </p:cNvSpPr>
+              <p:nvPr>
+                <p:ph idx="1"/>
+              </p:nvPr>
+            </p:nvSpPr>
+            <p:spPr>
+              <a:blipFill>
+                <a:blip r:embed="rId2"/>
+                <a:stretch>
+                  <a:fillRect l="-522" t="-1306"/>
+                </a:stretch>
+              </a:blipFill>
+            </p:spPr>
+            <p:txBody>
+              <a:bodyPr/>
+              <a:lstStyle/>
+              <a:p>
+                <a:r>
+                  <a:rPr lang="en-US">
+                    <a:noFill/>
+                  </a:rPr>
+                  <a:t> </a:t>
+                </a:r>
+              </a:p>
+            </p:txBody>
+          </p:sp>
+        </mc:Fallback>
+      </mc:AlternateContent>
     </p:spTree>
     <p:extLst>
       <p:ext uri="{BB962C8B-B14F-4D97-AF65-F5344CB8AC3E}">
-        <p14:creationId xmlns:p14="http://schemas.microsoft.com/office/powerpoint/2010/main" val="1090369301"/>
+        <p14:creationId xmlns:p14="http://schemas.microsoft.com/office/powerpoint/2010/main" val="1940856282"/>
       </p:ext>
     </p:extLst>
   </p:cSld>
   <p:clrMapOvr>
     <a:masterClrMapping/>
   </p:clrMapOvr>
+  <mc:AlternateContent xmlns:mc="http://schemas.openxmlformats.org/markup-compatibility/2006" xmlns:p14="http://schemas.microsoft.com/office/powerpoint/2010/main">
+    <mc:Choice Requires="p14">
+      <p:transition spd="med" p14:dur="700">
+        <p:fade/>
+      </p:transition>
+    </mc:Choice>
+    <mc:Fallback xmlns="">
+      <p:transition spd="med">
+        <p:fade/>
+      </p:transition>
+    </mc:Fallback>
+  </mc:AlternateContent>
+  <p:timing>
+    <p:tnLst>
+      <p:par>
+        <p:cTn id="1" dur="indefinite" restart="never" nodeType="tmRoot">
+          <p:childTnLst>
+            <p:seq concurrent="1" nextAc="seek">
+              <p:cTn id="2" dur="indefinite" nodeType="mainSeq">
+                <p:childTnLst>
+                  <p:par>
+                    <p:cTn id="3" fill="hold">
+                      <p:stCondLst>
+                        <p:cond delay="indefinite"/>
+                      </p:stCondLst>
+                      <p:childTnLst>
+                        <p:par>
+                          <p:cTn id="4" fill="hold">
+                            <p:stCondLst>
+                              <p:cond delay="0"/>
+                            </p:stCondLst>
+                            <p:childTnLst>
+                              <p:par>
+                                <p:cTn id="5" presetID="1" presetClass="entr" presetSubtype="0" fill="hold" nodeType="clickEffect">
+                                  <p:stCondLst>
+                                    <p:cond delay="0"/>
+                                  </p:stCondLst>
+                                  <p:childTnLst>
+                                    <p:set>
+                                      <p:cBhvr>
+                                        <p:cTn id="6" dur="1" fill="hold">
+                                          <p:stCondLst>
+                                            <p:cond delay="0"/>
+                                          </p:stCondLst>
+                                        </p:cTn>
+                                        <p:tgtEl>
+                                          <p:spTgt spid="3">
+                                            <p:txEl>
+                                              <p:pRg st="6" end="6"/>
+                                            </p:txEl>
+                                          </p:spTgt>
+                                        </p:tgtEl>
+                                        <p:attrNameLst>
+                                          <p:attrName>style.visibility</p:attrName>
+                                        </p:attrNameLst>
+                                      </p:cBhvr>
+                                      <p:to>
+                                        <p:strVal val="visible"/>
+                                      </p:to>
+                                    </p:set>
+                                  </p:childTnLst>
+                                </p:cTn>
+                              </p:par>
+                              <p:par>
+                                <p:cTn id="7" presetID="1" presetClass="entr" presetSubtype="0" fill="hold" nodeType="withEffect">
+                                  <p:stCondLst>
+                                    <p:cond delay="0"/>
+                                  </p:stCondLst>
+                                  <p:childTnLst>
+                                    <p:set>
+                                      <p:cBhvr>
+                                        <p:cTn id="8" dur="1" fill="hold">
+                                          <p:stCondLst>
+                                            <p:cond delay="0"/>
+                                          </p:stCondLst>
+                                        </p:cTn>
+                                        <p:tgtEl>
+                                          <p:spTgt spid="3">
+                                            <p:txEl>
+                                              <p:pRg st="7" end="7"/>
+                                            </p:txEl>
+                                          </p:spTgt>
+                                        </p:tgtEl>
+                                        <p:attrNameLst>
+                                          <p:attrName>style.visibility</p:attrName>
+                                        </p:attrNameLst>
+                                      </p:cBhvr>
+                                      <p:to>
+                                        <p:strVal val="visible"/>
+                                      </p:to>
+                                    </p:set>
+                                  </p:childTnLst>
+                                </p:cTn>
+                              </p:par>
+                              <p:par>
+                                <p:cTn id="9" presetID="1" presetClass="entr" presetSubtype="0" fill="hold" nodeType="withEffect">
+                                  <p:stCondLst>
+                                    <p:cond delay="0"/>
+                                  </p:stCondLst>
+                                  <p:childTnLst>
+                                    <p:set>
+                                      <p:cBhvr>
+                                        <p:cTn id="10" dur="1" fill="hold">
+                                          <p:stCondLst>
+                                            <p:cond delay="0"/>
+                                          </p:stCondLst>
+                                        </p:cTn>
+                                        <p:tgtEl>
+                                          <p:spTgt spid="3">
+                                            <p:txEl>
+                                              <p:pRg st="8" end="8"/>
+                                            </p:txEl>
+                                          </p:spTgt>
+                                        </p:tgtEl>
+                                        <p:attrNameLst>
+                                          <p:attrName>style.visibility</p:attrName>
+                                        </p:attrNameLst>
+                                      </p:cBhvr>
+                                      <p:to>
+                                        <p:strVal val="visible"/>
+                                      </p:to>
+                                    </p:set>
+                                  </p:childTnLst>
+                                </p:cTn>
+                              </p:par>
+                            </p:childTnLst>
+                          </p:cTn>
+                        </p:par>
+                      </p:childTnLst>
+                    </p:cTn>
+                  </p:par>
+                </p:childTnLst>
+              </p:cTn>
+              <p:prevCondLst>
+                <p:cond evt="onPrev" delay="0">
+                  <p:tgtEl>
+                    <p:sldTgt/>
+                  </p:tgtEl>
+                </p:cond>
+              </p:prevCondLst>
+              <p:nextCondLst>
+                <p:cond evt="onNext" delay="0">
+                  <p:tgtEl>
+                    <p:sldTgt/>
+                  </p:tgtEl>
+                </p:cond>
+              </p:nextCondLst>
+            </p:seq>
+          </p:childTnLst>
+        </p:cTn>
+      </p:par>
+    </p:tnLst>
+  </p:timing>
 </p:sld>
 </file>
 
@@ -8064,13 +8697,7 @@
   <p:cSld>
     <p:spTree>
       <p:nvGrpSpPr>
-        <p:cNvPr id="1" name="">
-          <a:extLst>
-            <a:ext uri="{FF2B5EF4-FFF2-40B4-BE49-F238E27FC236}">
-              <a16:creationId xmlns:a16="http://schemas.microsoft.com/office/drawing/2014/main" id="{C2A9FB6D-BFF1-C632-16F4-6613F20184FE}"/>
-            </a:ext>
-          </a:extLst>
-        </p:cNvPr>
+        <p:cNvPr id="1" name=""/>
         <p:cNvGrpSpPr/>
         <p:nvPr/>
       </p:nvGrpSpPr>
@@ -8084,81 +8711,10 @@
       </p:grpSpPr>
       <p:sp>
         <p:nvSpPr>
-          <p:cNvPr id="2" name="Content Placeholder 1">
-            <a:extLst>
-              <a:ext uri="{FF2B5EF4-FFF2-40B4-BE49-F238E27FC236}">
-                <a16:creationId xmlns:a16="http://schemas.microsoft.com/office/drawing/2014/main" id="{DE2E0D1E-23BE-D0F2-DD1E-E80DFE476EFC}"/>
-              </a:ext>
-            </a:extLst>
-          </p:cNvPr>
-          <p:cNvSpPr>
-            <a:spLocks noGrp="1"/>
-          </p:cNvSpPr>
-          <p:nvPr>
-            <p:ph idx="1"/>
-          </p:nvPr>
-        </p:nvSpPr>
-        <p:spPr/>
-        <p:txBody>
-          <a:bodyPr>
-            <a:normAutofit/>
-          </a:bodyPr>
-          <a:lstStyle/>
-          <a:p>
-            <a:r>
-              <a:rPr lang="en-US" sz="2400" b="1" dirty="0"/>
-              <a:t>Definition</a:t>
-            </a:r>
-            <a:r>
-              <a:rPr lang="en-US" sz="2400" dirty="0"/>
-              <a:t>: Learning from data without labeled outcomes.</a:t>
-            </a:r>
-          </a:p>
-          <a:p>
-            <a:r>
-              <a:rPr lang="en-US" sz="2400" b="1" dirty="0"/>
-              <a:t>Goal</a:t>
-            </a:r>
-            <a:r>
-              <a:rPr lang="en-US" sz="2400" dirty="0"/>
-              <a:t>: Discover hidden patterns or structures.</a:t>
-            </a:r>
-          </a:p>
-          <a:p>
-            <a:r>
-              <a:rPr lang="en-US" sz="2400" b="1" dirty="0"/>
-              <a:t>Contrast with Supervised Learning</a:t>
-            </a:r>
-            <a:r>
-              <a:rPr lang="en-US" sz="2400" dirty="0"/>
-              <a:t>:</a:t>
-            </a:r>
-          </a:p>
-          <a:p>
-            <a:pPr lvl="1"/>
-            <a:r>
-              <a:rPr lang="en-US" sz="2000" dirty="0"/>
-              <a:t>Supervised: Has labels (e.g., spam / not spam)</a:t>
-            </a:r>
-          </a:p>
-          <a:p>
-            <a:pPr lvl="1"/>
-            <a:r>
-              <a:rPr lang="en-US" sz="2000" dirty="0"/>
-              <a:t>Unsupervised: No labels (e.g., group customers)</a:t>
-            </a:r>
-          </a:p>
-          <a:p>
-            <a:endParaRPr lang="en-US" sz="2400" dirty="0"/>
-          </a:p>
-        </p:txBody>
-      </p:sp>
-      <p:sp>
-        <p:nvSpPr>
-          <p:cNvPr id="3" name="Title 2">
-            <a:extLst>
-              <a:ext uri="{FF2B5EF4-FFF2-40B4-BE49-F238E27FC236}">
-                <a16:creationId xmlns:a16="http://schemas.microsoft.com/office/drawing/2014/main" id="{19693A49-B618-2C1B-8FA8-2135C7F1FE56}"/>
+          <p:cNvPr id="2" name="Title 1">
+            <a:extLst>
+              <a:ext uri="{FF2B5EF4-FFF2-40B4-BE49-F238E27FC236}">
+                <a16:creationId xmlns:a16="http://schemas.microsoft.com/office/drawing/2014/main" id="{413F5A56-A997-CA42-ACD7-CA831784D65C}"/>
               </a:ext>
             </a:extLst>
           </p:cNvPr>
@@ -8171,28 +8727,1104 @@
         </p:nvSpPr>
         <p:spPr/>
         <p:txBody>
+          <a:bodyPr/>
+          <a:lstStyle/>
+          <a:p>
+            <a:r>
+              <a:rPr lang="en-US" dirty="0"/>
+              <a:t>Confusion Matrix for Sailing Example</a:t>
+            </a:r>
+          </a:p>
+        </p:txBody>
+      </p:sp>
+      <p:sp>
+        <p:nvSpPr>
+          <p:cNvPr id="4" name="Inhaltsplatzhalter 3">
+            <a:extLst>
+              <a:ext uri="{FF2B5EF4-FFF2-40B4-BE49-F238E27FC236}">
+                <a16:creationId xmlns:a16="http://schemas.microsoft.com/office/drawing/2014/main" id="{DAFFB958-32F0-704B-914A-D7005FD29F39}"/>
+              </a:ext>
+            </a:extLst>
+          </p:cNvPr>
+          <p:cNvSpPr>
+            <a:spLocks noGrp="1"/>
+          </p:cNvSpPr>
+          <p:nvPr>
+            <p:ph idx="1"/>
+          </p:nvPr>
+        </p:nvSpPr>
+        <p:spPr>
+          <a:xfrm>
+            <a:off x="838200" y="5151081"/>
+            <a:ext cx="10515600" cy="1613703"/>
+          </a:xfrm>
+        </p:spPr>
+        <p:txBody>
           <a:bodyPr>
             <a:normAutofit/>
           </a:bodyPr>
           <a:lstStyle/>
           <a:p>
             <a:r>
-              <a:rPr lang="en-US" dirty="0"/>
-              <a:t>What Is Unsupervised Learning?</a:t>
-            </a:r>
+              <a:rPr lang="en-US" sz="2000" dirty="0"/>
+              <a:t>Rows – true class values</a:t>
+            </a:r>
+          </a:p>
+          <a:p>
+            <a:r>
+              <a:rPr lang="en-US" sz="2000" dirty="0"/>
+              <a:t>Columns – predicted class values </a:t>
+            </a:r>
+          </a:p>
+          <a:p>
+            <a:r>
+              <a:rPr lang="en-US" sz="2000" dirty="0"/>
+              <a:t>Numbers on main diagonal – correctly classified samples</a:t>
+            </a:r>
+          </a:p>
+          <a:p>
+            <a:r>
+              <a:rPr lang="en-US" sz="2000" dirty="0"/>
+              <a:t>Numbers off the main diagonal – misclassified samples</a:t>
+            </a:r>
+          </a:p>
+          <a:p>
+            <a:endParaRPr lang="de-DE" sz="2000" dirty="0"/>
           </a:p>
         </p:txBody>
       </p:sp>
+      <p:graphicFrame>
+        <p:nvGraphicFramePr>
+          <p:cNvPr id="96" name="Table 96">
+            <a:extLst>
+              <a:ext uri="{FF2B5EF4-FFF2-40B4-BE49-F238E27FC236}">
+                <a16:creationId xmlns:a16="http://schemas.microsoft.com/office/drawing/2014/main" id="{F699DA68-632A-4C70-B511-E901FE5434D1}"/>
+              </a:ext>
+            </a:extLst>
+          </p:cNvPr>
+          <p:cNvGraphicFramePr>
+            <a:graphicFrameLocks noGrp="1"/>
+          </p:cNvGraphicFramePr>
+          <p:nvPr>
+            <p:extLst>
+              <p:ext uri="{D42A27DB-BD31-4B8C-83A1-F6EECF244321}">
+                <p14:modId xmlns:p14="http://schemas.microsoft.com/office/powerpoint/2010/main" val="3679402463"/>
+              </p:ext>
+            </p:extLst>
+          </p:nvPr>
+        </p:nvGraphicFramePr>
+        <p:xfrm>
+          <a:off x="838200" y="1734938"/>
+          <a:ext cx="4740450" cy="2261639"/>
+        </p:xfrm>
+        <a:graphic>
+          <a:graphicData uri="http://schemas.openxmlformats.org/drawingml/2006/table">
+            <a:tbl>
+              <a:tblPr firstRow="1" bandRow="1">
+                <a:tableStyleId>{D7AC3CCA-C797-4891-BE02-D94E43425B78}</a:tableStyleId>
+              </a:tblPr>
+              <a:tblGrid>
+                <a:gridCol w="1473640">
+                  <a:extLst>
+                    <a:ext uri="{9D8B030D-6E8A-4147-A177-3AD203B41FA5}">
+                      <a16:colId xmlns:a16="http://schemas.microsoft.com/office/drawing/2014/main" val="718356850"/>
+                    </a:ext>
+                  </a:extLst>
+                </a:gridCol>
+                <a:gridCol w="1633405">
+                  <a:extLst>
+                    <a:ext uri="{9D8B030D-6E8A-4147-A177-3AD203B41FA5}">
+                      <a16:colId xmlns:a16="http://schemas.microsoft.com/office/drawing/2014/main" val="2103916639"/>
+                    </a:ext>
+                  </a:extLst>
+                </a:gridCol>
+                <a:gridCol w="1633405">
+                  <a:extLst>
+                    <a:ext uri="{9D8B030D-6E8A-4147-A177-3AD203B41FA5}">
+                      <a16:colId xmlns:a16="http://schemas.microsoft.com/office/drawing/2014/main" val="3907626621"/>
+                    </a:ext>
+                  </a:extLst>
+                </a:gridCol>
+              </a:tblGrid>
+              <a:tr h="768085">
+                <a:tc>
+                  <a:txBody>
+                    <a:bodyPr/>
+                    <a:lstStyle/>
+                    <a:p>
+                      <a:r>
+                        <a:rPr lang="en-US" sz="1900" b="0" dirty="0">
+                          <a:solidFill>
+                            <a:schemeClr val="tx1"/>
+                          </a:solidFill>
+                        </a:rPr>
+                        <a:t>Diabetes</a:t>
+                      </a:r>
+                      <a:br>
+                        <a:rPr lang="en-US" sz="1900" b="0" dirty="0">
+                          <a:solidFill>
+                            <a:schemeClr val="tx1"/>
+                          </a:solidFill>
+                        </a:rPr>
+                      </a:br>
+                      <a:r>
+                        <a:rPr lang="en-US" sz="1900" b="0" dirty="0">
+                          <a:solidFill>
+                            <a:schemeClr val="tx1"/>
+                          </a:solidFill>
+                        </a:rPr>
+                        <a:t>yes / no</a:t>
+                      </a:r>
+                    </a:p>
+                  </a:txBody>
+                  <a:tcPr marL="121920" marR="121920" marT="60960" marB="60960" anchor="ctr"/>
+                </a:tc>
+                <a:tc>
+                  <a:txBody>
+                    <a:bodyPr/>
+                    <a:lstStyle/>
+                    <a:p>
+                      <a:pPr algn="ctr"/>
+                      <a:r>
+                        <a:rPr lang="en-US" sz="1900" b="0" dirty="0">
+                          <a:solidFill>
+                            <a:schemeClr val="tx1"/>
+                          </a:solidFill>
+                        </a:rPr>
+                        <a:t>Predicted</a:t>
+                      </a:r>
+                    </a:p>
+                    <a:p>
+                      <a:pPr algn="ctr"/>
+                      <a:r>
+                        <a:rPr lang="en-US" sz="1900" b="0" dirty="0">
+                          <a:solidFill>
+                            <a:schemeClr val="tx1"/>
+                          </a:solidFill>
+                        </a:rPr>
+                        <a:t>class: yes</a:t>
+                      </a:r>
+                    </a:p>
+                  </a:txBody>
+                  <a:tcPr marL="121920" marR="121920" marT="60960" marB="60960" anchor="ctr"/>
+                </a:tc>
+                <a:tc>
+                  <a:txBody>
+                    <a:bodyPr/>
+                    <a:lstStyle/>
+                    <a:p>
+                      <a:pPr marL="0" marR="0" lvl="0" indent="0" algn="l" defTabSz="761970" rtl="0" eaLnBrk="1" fontAlgn="auto" latinLnBrk="0" hangingPunct="1">
+                        <a:lnSpc>
+                          <a:spcPct val="100000"/>
+                        </a:lnSpc>
+                        <a:spcBef>
+                          <a:spcPts val="0"/>
+                        </a:spcBef>
+                        <a:spcAft>
+                          <a:spcPts val="0"/>
+                        </a:spcAft>
+                        <a:buClrTx/>
+                        <a:buSzTx/>
+                        <a:buFontTx/>
+                        <a:buNone/>
+                        <a:tabLst/>
+                        <a:defRPr/>
+                      </a:pPr>
+                      <a:r>
+                        <a:rPr lang="en-US" sz="1900" b="0" dirty="0">
+                          <a:solidFill>
+                            <a:schemeClr val="tx1"/>
+                          </a:solidFill>
+                        </a:rPr>
+                        <a:t>Predicted class: no</a:t>
+                      </a:r>
+                    </a:p>
+                  </a:txBody>
+                  <a:tcPr marL="121920" marR="121920" marT="60960" marB="60960" anchor="ctr"/>
+                </a:tc>
+                <a:extLst>
+                  <a:ext uri="{0D108BD9-81ED-4DB2-BD59-A6C34878D82A}">
+                    <a16:rowId xmlns:a16="http://schemas.microsoft.com/office/drawing/2014/main" val="2960805545"/>
+                  </a:ext>
+                </a:extLst>
+              </a:tr>
+              <a:tr h="746777">
+                <a:tc>
+                  <a:txBody>
+                    <a:bodyPr/>
+                    <a:lstStyle/>
+                    <a:p>
+                      <a:pPr algn="ctr"/>
+                      <a:r>
+                        <a:rPr lang="en-US" sz="1900" b="0" dirty="0">
+                          <a:solidFill>
+                            <a:schemeClr val="tx1"/>
+                          </a:solidFill>
+                        </a:rPr>
+                        <a:t>True class:</a:t>
+                      </a:r>
+                      <a:br>
+                        <a:rPr lang="en-US" sz="1900" b="0" dirty="0">
+                          <a:solidFill>
+                            <a:schemeClr val="tx1"/>
+                          </a:solidFill>
+                        </a:rPr>
+                      </a:br>
+                      <a:r>
+                        <a:rPr lang="en-US" sz="1900" b="0" dirty="0">
+                          <a:solidFill>
+                            <a:schemeClr val="tx1"/>
+                          </a:solidFill>
+                        </a:rPr>
+                        <a:t>yes</a:t>
+                      </a:r>
+                    </a:p>
+                  </a:txBody>
+                  <a:tcPr marL="121920" marR="121920" marT="60960" marB="60960" anchor="ctr"/>
+                </a:tc>
+                <a:tc>
+                  <a:txBody>
+                    <a:bodyPr/>
+                    <a:lstStyle/>
+                    <a:p>
+                      <a:pPr algn="ctr"/>
+                      <a:r>
+                        <a:rPr lang="en-US" sz="1900" dirty="0">
+                          <a:solidFill>
+                            <a:schemeClr val="tx1"/>
+                          </a:solidFill>
+                        </a:rPr>
+                        <a:t>22</a:t>
+                      </a:r>
+                    </a:p>
+                  </a:txBody>
+                  <a:tcPr marL="121920" marR="121920" marT="60960" marB="60960" anchor="ctr"/>
+                </a:tc>
+                <a:tc>
+                  <a:txBody>
+                    <a:bodyPr/>
+                    <a:lstStyle/>
+                    <a:p>
+                      <a:pPr algn="ctr"/>
+                      <a:r>
+                        <a:rPr lang="en-US" sz="1900" dirty="0">
+                          <a:solidFill>
+                            <a:schemeClr val="tx1"/>
+                          </a:solidFill>
+                        </a:rPr>
+                        <a:t>3</a:t>
+                      </a:r>
+                    </a:p>
+                  </a:txBody>
+                  <a:tcPr marL="121920" marR="121920" marT="60960" marB="60960" anchor="ctr"/>
+                </a:tc>
+                <a:extLst>
+                  <a:ext uri="{0D108BD9-81ED-4DB2-BD59-A6C34878D82A}">
+                    <a16:rowId xmlns:a16="http://schemas.microsoft.com/office/drawing/2014/main" val="700814895"/>
+                  </a:ext>
+                </a:extLst>
+              </a:tr>
+              <a:tr h="746777">
+                <a:tc>
+                  <a:txBody>
+                    <a:bodyPr/>
+                    <a:lstStyle/>
+                    <a:p>
+                      <a:pPr algn="ctr"/>
+                      <a:r>
+                        <a:rPr lang="en-US" sz="1900" b="0" dirty="0">
+                          <a:solidFill>
+                            <a:schemeClr val="tx1"/>
+                          </a:solidFill>
+                        </a:rPr>
+                        <a:t>True class:</a:t>
+                      </a:r>
+                      <a:br>
+                        <a:rPr lang="en-US" sz="1900" b="0" dirty="0">
+                          <a:solidFill>
+                            <a:schemeClr val="tx1"/>
+                          </a:solidFill>
+                        </a:rPr>
+                      </a:br>
+                      <a:r>
+                        <a:rPr lang="en-US" sz="1900" b="0" dirty="0">
+                          <a:solidFill>
+                            <a:schemeClr val="tx1"/>
+                          </a:solidFill>
+                        </a:rPr>
+                        <a:t>no</a:t>
+                      </a:r>
+                    </a:p>
+                  </a:txBody>
+                  <a:tcPr marL="121920" marR="121920" marT="60960" marB="60960"/>
+                </a:tc>
+                <a:tc>
+                  <a:txBody>
+                    <a:bodyPr/>
+                    <a:lstStyle/>
+                    <a:p>
+                      <a:pPr algn="ctr"/>
+                      <a:r>
+                        <a:rPr lang="en-US" sz="1900" dirty="0">
+                          <a:solidFill>
+                            <a:schemeClr val="tx1"/>
+                          </a:solidFill>
+                        </a:rPr>
+                        <a:t>12</a:t>
+                      </a:r>
+                    </a:p>
+                  </a:txBody>
+                  <a:tcPr marL="121920" marR="121920" marT="60960" marB="60960" anchor="ctr"/>
+                </a:tc>
+                <a:tc>
+                  <a:txBody>
+                    <a:bodyPr/>
+                    <a:lstStyle/>
+                    <a:p>
+                      <a:pPr algn="ctr"/>
+                      <a:r>
+                        <a:rPr lang="en-US" sz="1900" dirty="0">
+                          <a:solidFill>
+                            <a:schemeClr val="tx1"/>
+                          </a:solidFill>
+                        </a:rPr>
+                        <a:t>328</a:t>
+                      </a:r>
+                    </a:p>
+                  </a:txBody>
+                  <a:tcPr marL="121920" marR="121920" marT="60960" marB="60960" anchor="ctr"/>
+                </a:tc>
+                <a:extLst>
+                  <a:ext uri="{0D108BD9-81ED-4DB2-BD59-A6C34878D82A}">
+                    <a16:rowId xmlns:a16="http://schemas.microsoft.com/office/drawing/2014/main" val="4008217212"/>
+                  </a:ext>
+                </a:extLst>
+              </a:tr>
+            </a:tbl>
+          </a:graphicData>
+        </a:graphic>
+      </p:graphicFrame>
+      <p:graphicFrame>
+        <p:nvGraphicFramePr>
+          <p:cNvPr id="103" name="Table 96">
+            <a:extLst>
+              <a:ext uri="{FF2B5EF4-FFF2-40B4-BE49-F238E27FC236}">
+                <a16:creationId xmlns:a16="http://schemas.microsoft.com/office/drawing/2014/main" id="{2ADE5E6F-01FB-9146-95A4-CC9F2C15F16D}"/>
+              </a:ext>
+            </a:extLst>
+          </p:cNvPr>
+          <p:cNvGraphicFramePr>
+            <a:graphicFrameLocks noGrp="1"/>
+          </p:cNvGraphicFramePr>
+          <p:nvPr>
+            <p:extLst>
+              <p:ext uri="{D42A27DB-BD31-4B8C-83A1-F6EECF244321}">
+                <p14:modId xmlns:p14="http://schemas.microsoft.com/office/powerpoint/2010/main" val="275477171"/>
+              </p:ext>
+            </p:extLst>
+          </p:nvPr>
+        </p:nvGraphicFramePr>
+        <p:xfrm>
+          <a:off x="6613352" y="1735636"/>
+          <a:ext cx="4740450" cy="2261639"/>
+        </p:xfrm>
+        <a:graphic>
+          <a:graphicData uri="http://schemas.openxmlformats.org/drawingml/2006/table">
+            <a:tbl>
+              <a:tblPr firstRow="1" bandRow="1">
+                <a:tableStyleId>{D7AC3CCA-C797-4891-BE02-D94E43425B78}</a:tableStyleId>
+              </a:tblPr>
+              <a:tblGrid>
+                <a:gridCol w="1473640">
+                  <a:extLst>
+                    <a:ext uri="{9D8B030D-6E8A-4147-A177-3AD203B41FA5}">
+                      <a16:colId xmlns:a16="http://schemas.microsoft.com/office/drawing/2014/main" val="718356850"/>
+                    </a:ext>
+                  </a:extLst>
+                </a:gridCol>
+                <a:gridCol w="1633405">
+                  <a:extLst>
+                    <a:ext uri="{9D8B030D-6E8A-4147-A177-3AD203B41FA5}">
+                      <a16:colId xmlns:a16="http://schemas.microsoft.com/office/drawing/2014/main" val="2103916639"/>
+                    </a:ext>
+                  </a:extLst>
+                </a:gridCol>
+                <a:gridCol w="1633405">
+                  <a:extLst>
+                    <a:ext uri="{9D8B030D-6E8A-4147-A177-3AD203B41FA5}">
+                      <a16:colId xmlns:a16="http://schemas.microsoft.com/office/drawing/2014/main" val="3907626621"/>
+                    </a:ext>
+                  </a:extLst>
+                </a:gridCol>
+              </a:tblGrid>
+              <a:tr h="768085">
+                <a:tc>
+                  <a:txBody>
+                    <a:bodyPr/>
+                    <a:lstStyle/>
+                    <a:p>
+                      <a:r>
+                        <a:rPr lang="en-US" sz="1900" b="0" dirty="0">
+                          <a:solidFill>
+                            <a:schemeClr val="tx1"/>
+                          </a:solidFill>
+                        </a:rPr>
+                        <a:t>Diabetes</a:t>
+                      </a:r>
+                      <a:br>
+                        <a:rPr lang="en-US" sz="1900" b="0" dirty="0">
+                          <a:solidFill>
+                            <a:schemeClr val="tx1"/>
+                          </a:solidFill>
+                        </a:rPr>
+                      </a:br>
+                      <a:r>
+                        <a:rPr lang="en-US" sz="1900" b="0" dirty="0">
+                          <a:solidFill>
+                            <a:schemeClr val="tx1"/>
+                          </a:solidFill>
+                        </a:rPr>
+                        <a:t>yes / no</a:t>
+                      </a:r>
+                    </a:p>
+                  </a:txBody>
+                  <a:tcPr marL="121920" marR="121920" marT="60960" marB="60960"/>
+                </a:tc>
+                <a:tc>
+                  <a:txBody>
+                    <a:bodyPr/>
+                    <a:lstStyle/>
+                    <a:p>
+                      <a:pPr algn="ctr"/>
+                      <a:r>
+                        <a:rPr lang="en-US" sz="1900" b="0" dirty="0">
+                          <a:solidFill>
+                            <a:schemeClr val="tx1"/>
+                          </a:solidFill>
+                        </a:rPr>
+                        <a:t>Predicted</a:t>
+                      </a:r>
+                    </a:p>
+                    <a:p>
+                      <a:pPr algn="ctr"/>
+                      <a:r>
+                        <a:rPr lang="en-US" sz="1900" b="0" dirty="0">
+                          <a:solidFill>
+                            <a:schemeClr val="tx1"/>
+                          </a:solidFill>
+                        </a:rPr>
+                        <a:t>class: yes</a:t>
+                      </a:r>
+                    </a:p>
+                  </a:txBody>
+                  <a:tcPr marL="121920" marR="121920" marT="60960" marB="60960"/>
+                </a:tc>
+                <a:tc>
+                  <a:txBody>
+                    <a:bodyPr/>
+                    <a:lstStyle/>
+                    <a:p>
+                      <a:pPr marL="0" marR="0" lvl="0" indent="0" algn="l" defTabSz="761970" rtl="0" eaLnBrk="1" fontAlgn="auto" latinLnBrk="0" hangingPunct="1">
+                        <a:lnSpc>
+                          <a:spcPct val="100000"/>
+                        </a:lnSpc>
+                        <a:spcBef>
+                          <a:spcPts val="0"/>
+                        </a:spcBef>
+                        <a:spcAft>
+                          <a:spcPts val="0"/>
+                        </a:spcAft>
+                        <a:buClrTx/>
+                        <a:buSzTx/>
+                        <a:buFontTx/>
+                        <a:buNone/>
+                        <a:tabLst/>
+                        <a:defRPr/>
+                      </a:pPr>
+                      <a:r>
+                        <a:rPr lang="en-US" sz="1900" b="0" dirty="0">
+                          <a:solidFill>
+                            <a:schemeClr val="tx1"/>
+                          </a:solidFill>
+                        </a:rPr>
+                        <a:t>Predicted class: no</a:t>
+                      </a:r>
+                    </a:p>
+                  </a:txBody>
+                  <a:tcPr marL="121920" marR="121920" marT="60960" marB="60960"/>
+                </a:tc>
+                <a:extLst>
+                  <a:ext uri="{0D108BD9-81ED-4DB2-BD59-A6C34878D82A}">
+                    <a16:rowId xmlns:a16="http://schemas.microsoft.com/office/drawing/2014/main" val="2960805545"/>
+                  </a:ext>
+                </a:extLst>
+              </a:tr>
+              <a:tr h="746777">
+                <a:tc>
+                  <a:txBody>
+                    <a:bodyPr/>
+                    <a:lstStyle/>
+                    <a:p>
+                      <a:pPr algn="ctr"/>
+                      <a:r>
+                        <a:rPr lang="en-US" sz="1900" b="0" dirty="0">
+                          <a:solidFill>
+                            <a:schemeClr val="tx1"/>
+                          </a:solidFill>
+                        </a:rPr>
+                        <a:t>True class:</a:t>
+                      </a:r>
+                      <a:br>
+                        <a:rPr lang="en-US" sz="1900" b="0" dirty="0">
+                          <a:solidFill>
+                            <a:schemeClr val="tx1"/>
+                          </a:solidFill>
+                        </a:rPr>
+                      </a:br>
+                      <a:r>
+                        <a:rPr lang="en-US" sz="1900" b="0" dirty="0">
+                          <a:solidFill>
+                            <a:schemeClr val="tx1"/>
+                          </a:solidFill>
+                        </a:rPr>
+                        <a:t>yes</a:t>
+                      </a:r>
+                    </a:p>
+                  </a:txBody>
+                  <a:tcPr marL="121920" marR="121920" marT="60960" marB="60960" anchor="ctr"/>
+                </a:tc>
+                <a:tc>
+                  <a:txBody>
+                    <a:bodyPr/>
+                    <a:lstStyle/>
+                    <a:p>
+                      <a:pPr algn="ctr"/>
+                      <a:r>
+                        <a:rPr lang="en-US" sz="1900" dirty="0">
+                          <a:solidFill>
+                            <a:schemeClr val="tx1"/>
+                          </a:solidFill>
+                        </a:rPr>
+                        <a:t>0</a:t>
+                      </a:r>
+                    </a:p>
+                  </a:txBody>
+                  <a:tcPr marL="121920" marR="121920" marT="60960" marB="60960" anchor="ctr"/>
+                </a:tc>
+                <a:tc>
+                  <a:txBody>
+                    <a:bodyPr/>
+                    <a:lstStyle/>
+                    <a:p>
+                      <a:pPr algn="ctr"/>
+                      <a:r>
+                        <a:rPr lang="en-US" sz="1900" dirty="0">
+                          <a:solidFill>
+                            <a:schemeClr val="tx1"/>
+                          </a:solidFill>
+                        </a:rPr>
+                        <a:t>25</a:t>
+                      </a:r>
+                    </a:p>
+                  </a:txBody>
+                  <a:tcPr marL="121920" marR="121920" marT="60960" marB="60960" anchor="ctr"/>
+                </a:tc>
+                <a:extLst>
+                  <a:ext uri="{0D108BD9-81ED-4DB2-BD59-A6C34878D82A}">
+                    <a16:rowId xmlns:a16="http://schemas.microsoft.com/office/drawing/2014/main" val="700814895"/>
+                  </a:ext>
+                </a:extLst>
+              </a:tr>
+              <a:tr h="746777">
+                <a:tc>
+                  <a:txBody>
+                    <a:bodyPr/>
+                    <a:lstStyle/>
+                    <a:p>
+                      <a:pPr algn="ctr"/>
+                      <a:r>
+                        <a:rPr lang="en-US" sz="1900" b="0" dirty="0">
+                          <a:solidFill>
+                            <a:schemeClr val="tx1"/>
+                          </a:solidFill>
+                        </a:rPr>
+                        <a:t>True class:</a:t>
+                      </a:r>
+                      <a:br>
+                        <a:rPr lang="en-US" sz="1900" b="0" dirty="0">
+                          <a:solidFill>
+                            <a:schemeClr val="tx1"/>
+                          </a:solidFill>
+                        </a:rPr>
+                      </a:br>
+                      <a:r>
+                        <a:rPr lang="en-US" sz="1900" b="0" dirty="0">
+                          <a:solidFill>
+                            <a:schemeClr val="tx1"/>
+                          </a:solidFill>
+                        </a:rPr>
+                        <a:t>no</a:t>
+                      </a:r>
+                    </a:p>
+                  </a:txBody>
+                  <a:tcPr marL="121920" marR="121920" marT="60960" marB="60960"/>
+                </a:tc>
+                <a:tc>
+                  <a:txBody>
+                    <a:bodyPr/>
+                    <a:lstStyle/>
+                    <a:p>
+                      <a:pPr algn="ctr"/>
+                      <a:r>
+                        <a:rPr lang="en-US" sz="1900" dirty="0">
+                          <a:solidFill>
+                            <a:schemeClr val="tx1"/>
+                          </a:solidFill>
+                        </a:rPr>
+                        <a:t>0</a:t>
+                      </a:r>
+                    </a:p>
+                  </a:txBody>
+                  <a:tcPr marL="121920" marR="121920" marT="60960" marB="60960" anchor="ctr"/>
+                </a:tc>
+                <a:tc>
+                  <a:txBody>
+                    <a:bodyPr/>
+                    <a:lstStyle/>
+                    <a:p>
+                      <a:pPr algn="ctr"/>
+                      <a:r>
+                        <a:rPr lang="en-US" sz="1900" dirty="0">
+                          <a:solidFill>
+                            <a:schemeClr val="tx1"/>
+                          </a:solidFill>
+                        </a:rPr>
+                        <a:t>340</a:t>
+                      </a:r>
+                    </a:p>
+                  </a:txBody>
+                  <a:tcPr marL="121920" marR="121920" marT="60960" marB="60960" anchor="ctr"/>
+                </a:tc>
+                <a:extLst>
+                  <a:ext uri="{0D108BD9-81ED-4DB2-BD59-A6C34878D82A}">
+                    <a16:rowId xmlns:a16="http://schemas.microsoft.com/office/drawing/2014/main" val="4008217212"/>
+                  </a:ext>
+                </a:extLst>
+              </a:tr>
+            </a:tbl>
+          </a:graphicData>
+        </a:graphic>
+      </p:graphicFrame>
+      <mc:AlternateContent xmlns:mc="http://schemas.openxmlformats.org/markup-compatibility/2006" xmlns:a14="http://schemas.microsoft.com/office/drawing/2010/main">
+        <mc:Choice Requires="a14">
+          <p:sp>
+            <p:nvSpPr>
+              <p:cNvPr id="95" name="TextBox 94">
+                <a:extLst>
+                  <a:ext uri="{FF2B5EF4-FFF2-40B4-BE49-F238E27FC236}">
+                    <a16:creationId xmlns:a16="http://schemas.microsoft.com/office/drawing/2014/main" id="{4B25B004-1628-C74A-AAC8-765CE918D652}"/>
+                  </a:ext>
+                </a:extLst>
+              </p:cNvPr>
+              <p:cNvSpPr txBox="1"/>
+              <p:nvPr/>
+            </p:nvSpPr>
+            <p:spPr>
+              <a:xfrm>
+                <a:off x="1094747" y="4262718"/>
+                <a:ext cx="3365921" cy="622222"/>
+              </a:xfrm>
+              <a:prstGeom prst="rect">
+                <a:avLst/>
+              </a:prstGeom>
+              <a:noFill/>
+            </p:spPr>
+            <p:txBody>
+              <a:bodyPr wrap="none" rtlCol="0">
+                <a:spAutoFit/>
+              </a:bodyPr>
+              <a:lstStyle/>
+              <a:p>
+                <a:r>
+                  <a:rPr lang="en-US" sz="2400" dirty="0"/>
+                  <a:t> </a:t>
+                </a:r>
+                <a14:m>
+                  <m:oMath xmlns:m="http://schemas.openxmlformats.org/officeDocument/2006/math">
+                    <m:r>
+                      <m:rPr>
+                        <m:sty m:val="p"/>
+                      </m:rPr>
+                      <a:rPr lang="de-DE" sz="2400">
+                        <a:latin typeface="Cambria Math" panose="02040503050406030204" pitchFamily="18" charset="0"/>
+                      </a:rPr>
+                      <m:t>Ac</m:t>
+                    </m:r>
+                    <m:r>
+                      <a:rPr lang="de-DE" sz="2400" i="1">
+                        <a:latin typeface="Cambria Math" panose="02040503050406030204" pitchFamily="18" charset="0"/>
+                      </a:rPr>
+                      <m:t>𝑐𝑢𝑟𝑎𝑐𝑦</m:t>
+                    </m:r>
+                    <m:r>
+                      <a:rPr lang="de-DE" sz="2400" i="1">
+                        <a:latin typeface="Cambria Math" panose="02040503050406030204" pitchFamily="18" charset="0"/>
+                      </a:rPr>
+                      <m:t>=</m:t>
+                    </m:r>
+                    <m:f>
+                      <m:fPr>
+                        <m:ctrlPr>
+                          <a:rPr lang="de-DE" sz="2400" i="1">
+                            <a:latin typeface="Cambria Math" panose="02040503050406030204" pitchFamily="18" charset="0"/>
+                          </a:rPr>
+                        </m:ctrlPr>
+                      </m:fPr>
+                      <m:num>
+                        <m:r>
+                          <a:rPr lang="de-DE" sz="2400" i="1">
+                            <a:latin typeface="Cambria Math" panose="02040503050406030204" pitchFamily="18" charset="0"/>
+                          </a:rPr>
+                          <m:t>350</m:t>
+                        </m:r>
+                      </m:num>
+                      <m:den>
+                        <m:r>
+                          <a:rPr lang="de-DE" sz="2400" i="1">
+                            <a:latin typeface="Cambria Math" panose="02040503050406030204" pitchFamily="18" charset="0"/>
+                          </a:rPr>
+                          <m:t>365</m:t>
+                        </m:r>
+                      </m:den>
+                    </m:f>
+                    <m:r>
+                      <a:rPr lang="de-DE" sz="2400" i="1">
+                        <a:latin typeface="Cambria Math" panose="02040503050406030204" pitchFamily="18" charset="0"/>
+                      </a:rPr>
+                      <m:t>=0,96</m:t>
+                    </m:r>
+                  </m:oMath>
+                </a14:m>
+                <a:r>
+                  <a:rPr lang="en-US" sz="2400" dirty="0"/>
+                  <a:t> </a:t>
+                </a:r>
+              </a:p>
+            </p:txBody>
+          </p:sp>
+        </mc:Choice>
+        <mc:Fallback xmlns="">
+          <p:sp>
+            <p:nvSpPr>
+              <p:cNvPr id="95" name="TextBox 94">
+                <a:extLst>
+                  <a:ext uri="{FF2B5EF4-FFF2-40B4-BE49-F238E27FC236}">
+                    <a16:creationId xmlns:a16="http://schemas.microsoft.com/office/drawing/2014/main" id="{4B25B004-1628-C74A-AAC8-765CE918D652}"/>
+                  </a:ext>
+                </a:extLst>
+              </p:cNvPr>
+              <p:cNvSpPr txBox="1">
+                <a:spLocks noRot="1" noChangeAspect="1" noMove="1" noResize="1" noEditPoints="1" noAdjustHandles="1" noChangeArrowheads="1" noChangeShapeType="1" noTextEdit="1"/>
+              </p:cNvSpPr>
+              <p:nvPr/>
+            </p:nvSpPr>
+            <p:spPr>
+              <a:xfrm>
+                <a:off x="1094747" y="4262718"/>
+                <a:ext cx="3365921" cy="622222"/>
+              </a:xfrm>
+              <a:prstGeom prst="rect">
+                <a:avLst/>
+              </a:prstGeom>
+              <a:blipFill>
+                <a:blip r:embed="rId2"/>
+                <a:stretch>
+                  <a:fillRect/>
+                </a:stretch>
+              </a:blipFill>
+            </p:spPr>
+            <p:txBody>
+              <a:bodyPr/>
+              <a:lstStyle/>
+              <a:p>
+                <a:r>
+                  <a:rPr lang="en-US">
+                    <a:noFill/>
+                  </a:rPr>
+                  <a:t> </a:t>
+                </a:r>
+              </a:p>
+            </p:txBody>
+          </p:sp>
+        </mc:Fallback>
+      </mc:AlternateContent>
+      <mc:AlternateContent xmlns:mc="http://schemas.openxmlformats.org/markup-compatibility/2006" xmlns:a14="http://schemas.microsoft.com/office/drawing/2010/main">
+        <mc:Choice Requires="a14">
+          <p:sp>
+            <p:nvSpPr>
+              <p:cNvPr id="104" name="TextBox 103">
+                <a:extLst>
+                  <a:ext uri="{FF2B5EF4-FFF2-40B4-BE49-F238E27FC236}">
+                    <a16:creationId xmlns:a16="http://schemas.microsoft.com/office/drawing/2014/main" id="{17317157-2D16-C44F-8975-455C7DF51E3D}"/>
+                  </a:ext>
+                </a:extLst>
+              </p:cNvPr>
+              <p:cNvSpPr txBox="1"/>
+              <p:nvPr/>
+            </p:nvSpPr>
+            <p:spPr>
+              <a:xfrm>
+                <a:off x="7656827" y="4303187"/>
+                <a:ext cx="3296993" cy="616964"/>
+              </a:xfrm>
+              <a:prstGeom prst="rect">
+                <a:avLst/>
+              </a:prstGeom>
+              <a:noFill/>
+            </p:spPr>
+            <p:txBody>
+              <a:bodyPr wrap="none" rtlCol="0">
+                <a:spAutoFit/>
+              </a:bodyPr>
+              <a:lstStyle/>
+              <a:p>
+                <a:r>
+                  <a:rPr lang="en-US" sz="2400" dirty="0"/>
+                  <a:t> </a:t>
+                </a:r>
+                <a14:m>
+                  <m:oMath xmlns:m="http://schemas.openxmlformats.org/officeDocument/2006/math">
+                    <m:r>
+                      <m:rPr>
+                        <m:sty m:val="p"/>
+                      </m:rPr>
+                      <a:rPr lang="de-DE" sz="2400">
+                        <a:latin typeface="Cambria Math" panose="02040503050406030204" pitchFamily="18" charset="0"/>
+                      </a:rPr>
+                      <m:t>Ac</m:t>
+                    </m:r>
+                    <m:r>
+                      <a:rPr lang="de-DE" sz="2400" i="1">
+                        <a:latin typeface="Cambria Math" panose="02040503050406030204" pitchFamily="18" charset="0"/>
+                      </a:rPr>
+                      <m:t>𝑐𝑢𝑟𝑎𝑐𝑦</m:t>
+                    </m:r>
+                    <m:r>
+                      <a:rPr lang="de-DE" sz="2400" i="1">
+                        <a:latin typeface="Cambria Math" panose="02040503050406030204" pitchFamily="18" charset="0"/>
+                      </a:rPr>
+                      <m:t>=</m:t>
+                    </m:r>
+                    <m:f>
+                      <m:fPr>
+                        <m:ctrlPr>
+                          <a:rPr lang="de-DE" sz="2400" i="1">
+                            <a:latin typeface="Cambria Math" panose="02040503050406030204" pitchFamily="18" charset="0"/>
+                          </a:rPr>
+                        </m:ctrlPr>
+                      </m:fPr>
+                      <m:num>
+                        <m:r>
+                          <a:rPr lang="de-DE" sz="2400" i="1">
+                            <a:latin typeface="Cambria Math" panose="02040503050406030204" pitchFamily="18" charset="0"/>
+                          </a:rPr>
+                          <m:t>340</m:t>
+                        </m:r>
+                      </m:num>
+                      <m:den>
+                        <m:r>
+                          <a:rPr lang="de-DE" sz="2400" i="1">
+                            <a:latin typeface="Cambria Math" panose="02040503050406030204" pitchFamily="18" charset="0"/>
+                          </a:rPr>
+                          <m:t>365</m:t>
+                        </m:r>
+                      </m:den>
+                    </m:f>
+                    <m:r>
+                      <a:rPr lang="de-DE" sz="2400" i="1">
+                        <a:latin typeface="Cambria Math" panose="02040503050406030204" pitchFamily="18" charset="0"/>
+                      </a:rPr>
+                      <m:t>=0,93</m:t>
+                    </m:r>
+                  </m:oMath>
+                </a14:m>
+                <a:endParaRPr lang="en-US" sz="2400" dirty="0"/>
+              </a:p>
+            </p:txBody>
+          </p:sp>
+        </mc:Choice>
+        <mc:Fallback xmlns="">
+          <p:sp>
+            <p:nvSpPr>
+              <p:cNvPr id="104" name="TextBox 103">
+                <a:extLst>
+                  <a:ext uri="{FF2B5EF4-FFF2-40B4-BE49-F238E27FC236}">
+                    <a16:creationId xmlns:a16="http://schemas.microsoft.com/office/drawing/2014/main" id="{17317157-2D16-C44F-8975-455C7DF51E3D}"/>
+                  </a:ext>
+                </a:extLst>
+              </p:cNvPr>
+              <p:cNvSpPr txBox="1">
+                <a:spLocks noRot="1" noChangeAspect="1" noMove="1" noResize="1" noEditPoints="1" noAdjustHandles="1" noChangeArrowheads="1" noChangeShapeType="1" noTextEdit="1"/>
+              </p:cNvSpPr>
+              <p:nvPr/>
+            </p:nvSpPr>
+            <p:spPr>
+              <a:xfrm>
+                <a:off x="7656827" y="4303187"/>
+                <a:ext cx="3296993" cy="616964"/>
+              </a:xfrm>
+              <a:prstGeom prst="rect">
+                <a:avLst/>
+              </a:prstGeom>
+              <a:blipFill>
+                <a:blip r:embed="rId3"/>
+                <a:stretch>
+                  <a:fillRect/>
+                </a:stretch>
+              </a:blipFill>
+            </p:spPr>
+            <p:txBody>
+              <a:bodyPr/>
+              <a:lstStyle/>
+              <a:p>
+                <a:r>
+                  <a:rPr lang="en-US">
+                    <a:noFill/>
+                  </a:rPr>
+                  <a:t> </a:t>
+                </a:r>
+              </a:p>
+            </p:txBody>
+          </p:sp>
+        </mc:Fallback>
+      </mc:AlternateContent>
     </p:spTree>
     <p:extLst>
       <p:ext uri="{BB962C8B-B14F-4D97-AF65-F5344CB8AC3E}">
-        <p14:creationId xmlns:p14="http://schemas.microsoft.com/office/powerpoint/2010/main" val="2678295385"/>
+        <p14:creationId xmlns:p14="http://schemas.microsoft.com/office/powerpoint/2010/main" val="2775611767"/>
       </p:ext>
     </p:extLst>
   </p:cSld>
   <p:clrMapOvr>
     <a:masterClrMapping/>
   </p:clrMapOvr>
+  <mc:AlternateContent xmlns:mc="http://schemas.openxmlformats.org/markup-compatibility/2006" xmlns:p14="http://schemas.microsoft.com/office/powerpoint/2010/main">
+    <mc:Choice Requires="p14">
+      <p:transition spd="med" p14:dur="700">
+        <p:fade/>
+      </p:transition>
+    </mc:Choice>
+    <mc:Fallback xmlns="">
+      <p:transition spd="med">
+        <p:fade/>
+      </p:transition>
+    </mc:Fallback>
+  </mc:AlternateContent>
+  <p:timing>
+    <p:tnLst>
+      <p:par>
+        <p:cTn id="1" dur="indefinite" restart="never" nodeType="tmRoot">
+          <p:childTnLst>
+            <p:seq concurrent="1" nextAc="seek">
+              <p:cTn id="2" dur="indefinite" nodeType="mainSeq">
+                <p:childTnLst>
+                  <p:par>
+                    <p:cTn id="3" fill="hold">
+                      <p:stCondLst>
+                        <p:cond delay="indefinite"/>
+                      </p:stCondLst>
+                      <p:childTnLst>
+                        <p:par>
+                          <p:cTn id="4" fill="hold">
+                            <p:stCondLst>
+                              <p:cond delay="0"/>
+                            </p:stCondLst>
+                            <p:childTnLst>
+                              <p:par>
+                                <p:cTn id="5" presetID="1" presetClass="entr" presetSubtype="0" fill="hold" nodeType="clickEffect">
+                                  <p:stCondLst>
+                                    <p:cond delay="0"/>
+                                  </p:stCondLst>
+                                  <p:childTnLst>
+                                    <p:set>
+                                      <p:cBhvr>
+                                        <p:cTn id="6" dur="1" fill="hold">
+                                          <p:stCondLst>
+                                            <p:cond delay="0"/>
+                                          </p:stCondLst>
+                                        </p:cTn>
+                                        <p:tgtEl>
+                                          <p:spTgt spid="103"/>
+                                        </p:tgtEl>
+                                        <p:attrNameLst>
+                                          <p:attrName>style.visibility</p:attrName>
+                                        </p:attrNameLst>
+                                      </p:cBhvr>
+                                      <p:to>
+                                        <p:strVal val="visible"/>
+                                      </p:to>
+                                    </p:set>
+                                  </p:childTnLst>
+                                </p:cTn>
+                              </p:par>
+                              <p:par>
+                                <p:cTn id="7" presetID="1" presetClass="entr" presetSubtype="0" fill="hold" grpId="0" nodeType="withEffect">
+                                  <p:stCondLst>
+                                    <p:cond delay="0"/>
+                                  </p:stCondLst>
+                                  <p:childTnLst>
+                                    <p:set>
+                                      <p:cBhvr>
+                                        <p:cTn id="8" dur="1" fill="hold">
+                                          <p:stCondLst>
+                                            <p:cond delay="0"/>
+                                          </p:stCondLst>
+                                        </p:cTn>
+                                        <p:tgtEl>
+                                          <p:spTgt spid="104"/>
+                                        </p:tgtEl>
+                                        <p:attrNameLst>
+                                          <p:attrName>style.visibility</p:attrName>
+                                        </p:attrNameLst>
+                                      </p:cBhvr>
+                                      <p:to>
+                                        <p:strVal val="visible"/>
+                                      </p:to>
+                                    </p:set>
+                                  </p:childTnLst>
+                                </p:cTn>
+                              </p:par>
+                            </p:childTnLst>
+                          </p:cTn>
+                        </p:par>
+                      </p:childTnLst>
+                    </p:cTn>
+                  </p:par>
+                </p:childTnLst>
+              </p:cTn>
+              <p:prevCondLst>
+                <p:cond evt="onPrev" delay="0">
+                  <p:tgtEl>
+                    <p:sldTgt/>
+                  </p:tgtEl>
+                </p:cond>
+              </p:prevCondLst>
+              <p:nextCondLst>
+                <p:cond evt="onNext" delay="0">
+                  <p:tgtEl>
+                    <p:sldTgt/>
+                  </p:tgtEl>
+                </p:cond>
+              </p:nextCondLst>
+            </p:seq>
+          </p:childTnLst>
+        </p:cTn>
+      </p:par>
+    </p:tnLst>
+    <p:bldLst>
+      <p:bldP spid="104" grpId="0"/>
+    </p:bldLst>
+  </p:timing>
 </p:sld>
 </file>
 
@@ -8303,6 +9935,231 @@
 </file>
 
 <file path=ppt/slides/slide20.xml><?xml version="1.0" encoding="utf-8"?>
+<p:sld xmlns:a="http://schemas.openxmlformats.org/drawingml/2006/main" xmlns:r="http://schemas.openxmlformats.org/officeDocument/2006/relationships" xmlns:p="http://schemas.openxmlformats.org/presentationml/2006/main">
+  <p:cSld>
+    <p:spTree>
+      <p:nvGrpSpPr>
+        <p:cNvPr id="1" name=""/>
+        <p:cNvGrpSpPr/>
+        <p:nvPr/>
+      </p:nvGrpSpPr>
+      <p:grpSpPr>
+        <a:xfrm>
+          <a:off x="0" y="0"/>
+          <a:ext cx="0" cy="0"/>
+          <a:chOff x="0" y="0"/>
+          <a:chExt cx="0" cy="0"/>
+        </a:xfrm>
+      </p:grpSpPr>
+      <p:sp>
+        <p:nvSpPr>
+          <p:cNvPr id="4" name="Title 3">
+            <a:extLst>
+              <a:ext uri="{FF2B5EF4-FFF2-40B4-BE49-F238E27FC236}">
+                <a16:creationId xmlns:a16="http://schemas.microsoft.com/office/drawing/2014/main" id="{C8A35FB7-F380-D87E-D597-1DB5F3622B03}"/>
+              </a:ext>
+            </a:extLst>
+          </p:cNvPr>
+          <p:cNvSpPr>
+            <a:spLocks noGrp="1"/>
+          </p:cNvSpPr>
+          <p:nvPr>
+            <p:ph type="title"/>
+          </p:nvPr>
+        </p:nvSpPr>
+        <p:spPr/>
+        <p:txBody>
+          <a:bodyPr/>
+          <a:lstStyle/>
+          <a:p>
+            <a:r>
+              <a:rPr lang="en-US" dirty="0"/>
+              <a:t>Unsupervised Learning</a:t>
+            </a:r>
+          </a:p>
+        </p:txBody>
+      </p:sp>
+      <p:sp>
+        <p:nvSpPr>
+          <p:cNvPr id="5" name="Text Placeholder 4">
+            <a:extLst>
+              <a:ext uri="{FF2B5EF4-FFF2-40B4-BE49-F238E27FC236}">
+                <a16:creationId xmlns:a16="http://schemas.microsoft.com/office/drawing/2014/main" id="{52021908-6640-2279-6376-B5868E148168}"/>
+              </a:ext>
+            </a:extLst>
+          </p:cNvPr>
+          <p:cNvSpPr>
+            <a:spLocks noGrp="1"/>
+          </p:cNvSpPr>
+          <p:nvPr>
+            <p:ph type="body" idx="1"/>
+          </p:nvPr>
+        </p:nvSpPr>
+        <p:spPr/>
+        <p:txBody>
+          <a:bodyPr>
+            <a:normAutofit/>
+          </a:bodyPr>
+          <a:lstStyle/>
+          <a:p>
+            <a:r>
+              <a:rPr lang="en-US" sz="4400" dirty="0"/>
+              <a:t>Clustering</a:t>
+            </a:r>
+          </a:p>
+        </p:txBody>
+      </p:sp>
+    </p:spTree>
+    <p:extLst>
+      <p:ext uri="{BB962C8B-B14F-4D97-AF65-F5344CB8AC3E}">
+        <p14:creationId xmlns:p14="http://schemas.microsoft.com/office/powerpoint/2010/main" val="1090369301"/>
+      </p:ext>
+    </p:extLst>
+  </p:cSld>
+  <p:clrMapOvr>
+    <a:masterClrMapping/>
+  </p:clrMapOvr>
+</p:sld>
+</file>
+
+<file path=ppt/slides/slide21.xml><?xml version="1.0" encoding="utf-8"?>
+<p:sld xmlns:a="http://schemas.openxmlformats.org/drawingml/2006/main" xmlns:r="http://schemas.openxmlformats.org/officeDocument/2006/relationships" xmlns:p="http://schemas.openxmlformats.org/presentationml/2006/main">
+  <p:cSld>
+    <p:spTree>
+      <p:nvGrpSpPr>
+        <p:cNvPr id="1" name="">
+          <a:extLst>
+            <a:ext uri="{FF2B5EF4-FFF2-40B4-BE49-F238E27FC236}">
+              <a16:creationId xmlns:a16="http://schemas.microsoft.com/office/drawing/2014/main" id="{C2A9FB6D-BFF1-C632-16F4-6613F20184FE}"/>
+            </a:ext>
+          </a:extLst>
+        </p:cNvPr>
+        <p:cNvGrpSpPr/>
+        <p:nvPr/>
+      </p:nvGrpSpPr>
+      <p:grpSpPr>
+        <a:xfrm>
+          <a:off x="0" y="0"/>
+          <a:ext cx="0" cy="0"/>
+          <a:chOff x="0" y="0"/>
+          <a:chExt cx="0" cy="0"/>
+        </a:xfrm>
+      </p:grpSpPr>
+      <p:sp>
+        <p:nvSpPr>
+          <p:cNvPr id="2" name="Content Placeholder 1">
+            <a:extLst>
+              <a:ext uri="{FF2B5EF4-FFF2-40B4-BE49-F238E27FC236}">
+                <a16:creationId xmlns:a16="http://schemas.microsoft.com/office/drawing/2014/main" id="{DE2E0D1E-23BE-D0F2-DD1E-E80DFE476EFC}"/>
+              </a:ext>
+            </a:extLst>
+          </p:cNvPr>
+          <p:cNvSpPr>
+            <a:spLocks noGrp="1"/>
+          </p:cNvSpPr>
+          <p:nvPr>
+            <p:ph idx="1"/>
+          </p:nvPr>
+        </p:nvSpPr>
+        <p:spPr/>
+        <p:txBody>
+          <a:bodyPr>
+            <a:normAutofit/>
+          </a:bodyPr>
+          <a:lstStyle/>
+          <a:p>
+            <a:r>
+              <a:rPr lang="en-US" sz="2400" b="1" dirty="0"/>
+              <a:t>Definition</a:t>
+            </a:r>
+            <a:r>
+              <a:rPr lang="en-US" sz="2400" dirty="0"/>
+              <a:t>: Learning from data without labeled outcomes.</a:t>
+            </a:r>
+          </a:p>
+          <a:p>
+            <a:r>
+              <a:rPr lang="en-US" sz="2400" b="1" dirty="0"/>
+              <a:t>Goal</a:t>
+            </a:r>
+            <a:r>
+              <a:rPr lang="en-US" sz="2400" dirty="0"/>
+              <a:t>: Discover hidden patterns or structures.</a:t>
+            </a:r>
+          </a:p>
+          <a:p>
+            <a:r>
+              <a:rPr lang="en-US" sz="2400" b="1" dirty="0"/>
+              <a:t>Contrast with Supervised Learning</a:t>
+            </a:r>
+            <a:r>
+              <a:rPr lang="en-US" sz="2400" dirty="0"/>
+              <a:t>:</a:t>
+            </a:r>
+          </a:p>
+          <a:p>
+            <a:pPr lvl="1"/>
+            <a:r>
+              <a:rPr lang="en-US" sz="2000" dirty="0"/>
+              <a:t>Supervised: Has labels (e.g., spam / not spam)</a:t>
+            </a:r>
+          </a:p>
+          <a:p>
+            <a:pPr lvl="1"/>
+            <a:r>
+              <a:rPr lang="en-US" sz="2000" dirty="0"/>
+              <a:t>Unsupervised: No labels (e.g., group customers)</a:t>
+            </a:r>
+          </a:p>
+          <a:p>
+            <a:endParaRPr lang="en-US" sz="2400" dirty="0"/>
+          </a:p>
+        </p:txBody>
+      </p:sp>
+      <p:sp>
+        <p:nvSpPr>
+          <p:cNvPr id="3" name="Title 2">
+            <a:extLst>
+              <a:ext uri="{FF2B5EF4-FFF2-40B4-BE49-F238E27FC236}">
+                <a16:creationId xmlns:a16="http://schemas.microsoft.com/office/drawing/2014/main" id="{19693A49-B618-2C1B-8FA8-2135C7F1FE56}"/>
+              </a:ext>
+            </a:extLst>
+          </p:cNvPr>
+          <p:cNvSpPr>
+            <a:spLocks noGrp="1"/>
+          </p:cNvSpPr>
+          <p:nvPr>
+            <p:ph type="title"/>
+          </p:nvPr>
+        </p:nvSpPr>
+        <p:spPr/>
+        <p:txBody>
+          <a:bodyPr>
+            <a:normAutofit/>
+          </a:bodyPr>
+          <a:lstStyle/>
+          <a:p>
+            <a:r>
+              <a:rPr lang="en-US" dirty="0"/>
+              <a:t>What Is Unsupervised Learning?</a:t>
+            </a:r>
+          </a:p>
+        </p:txBody>
+      </p:sp>
+    </p:spTree>
+    <p:extLst>
+      <p:ext uri="{BB962C8B-B14F-4D97-AF65-F5344CB8AC3E}">
+        <p14:creationId xmlns:p14="http://schemas.microsoft.com/office/powerpoint/2010/main" val="2678295385"/>
+      </p:ext>
+    </p:extLst>
+  </p:cSld>
+  <p:clrMapOvr>
+    <a:masterClrMapping/>
+  </p:clrMapOvr>
+</p:sld>
+</file>
+
+<file path=ppt/slides/slide22.xml><?xml version="1.0" encoding="utf-8"?>
 <p:sld xmlns:a="http://schemas.openxmlformats.org/drawingml/2006/main" xmlns:r="http://schemas.openxmlformats.org/officeDocument/2006/relationships" xmlns:p="http://schemas.openxmlformats.org/presentationml/2006/main">
   <p:cSld>
     <p:spTree>
@@ -8731,7 +10588,7 @@
 </p:sld>
 </file>
 
-<file path=ppt/slides/slide21.xml><?xml version="1.0" encoding="utf-8"?>
+<file path=ppt/slides/slide23.xml><?xml version="1.0" encoding="utf-8"?>
 <p:sld xmlns:a="http://schemas.openxmlformats.org/drawingml/2006/main" xmlns:r="http://schemas.openxmlformats.org/officeDocument/2006/relationships" xmlns:p="http://schemas.openxmlformats.org/presentationml/2006/main">
   <p:cSld>
     <p:spTree>
@@ -8896,7 +10753,7 @@
 </p:sld>
 </file>
 
-<file path=ppt/slides/slide22.xml><?xml version="1.0" encoding="utf-8"?>
+<file path=ppt/slides/slide24.xml><?xml version="1.0" encoding="utf-8"?>
 <p:sld xmlns:a="http://schemas.openxmlformats.org/drawingml/2006/main" xmlns:r="http://schemas.openxmlformats.org/officeDocument/2006/relationships" xmlns:p="http://schemas.openxmlformats.org/presentationml/2006/main">
   <p:cSld>
     <p:spTree>
@@ -9165,7 +11022,7 @@
 </p:sld>
 </file>
 
-<file path=ppt/slides/slide23.xml><?xml version="1.0" encoding="utf-8"?>
+<file path=ppt/slides/slide25.xml><?xml version="1.0" encoding="utf-8"?>
 <p:sld xmlns:a="http://schemas.openxmlformats.org/drawingml/2006/main" xmlns:r="http://schemas.openxmlformats.org/officeDocument/2006/relationships" xmlns:p="http://schemas.openxmlformats.org/presentationml/2006/main">
   <p:cSld>
     <p:spTree>
@@ -9243,186 +11100,6 @@
     <p:extLst>
       <p:ext uri="{BB962C8B-B14F-4D97-AF65-F5344CB8AC3E}">
         <p14:creationId xmlns:p14="http://schemas.microsoft.com/office/powerpoint/2010/main" val="4254678125"/>
-      </p:ext>
-    </p:extLst>
-  </p:cSld>
-  <p:clrMapOvr>
-    <a:masterClrMapping/>
-  </p:clrMapOvr>
-</p:sld>
-</file>
-
-<file path=ppt/slides/slide24.xml><?xml version="1.0" encoding="utf-8"?>
-<p:sld xmlns:a="http://schemas.openxmlformats.org/drawingml/2006/main" xmlns:r="http://schemas.openxmlformats.org/officeDocument/2006/relationships" xmlns:p="http://schemas.openxmlformats.org/presentationml/2006/main">
-  <p:cSld>
-    <p:spTree>
-      <p:nvGrpSpPr>
-        <p:cNvPr id="1" name=""/>
-        <p:cNvGrpSpPr/>
-        <p:nvPr/>
-      </p:nvGrpSpPr>
-      <p:grpSpPr>
-        <a:xfrm>
-          <a:off x="0" y="0"/>
-          <a:ext cx="0" cy="0"/>
-          <a:chOff x="0" y="0"/>
-          <a:chExt cx="0" cy="0"/>
-        </a:xfrm>
-      </p:grpSpPr>
-      <p:pic>
-        <p:nvPicPr>
-          <p:cNvPr id="5" name="Content Placeholder 4">
-            <a:extLst>
-              <a:ext uri="{FF2B5EF4-FFF2-40B4-BE49-F238E27FC236}">
-                <a16:creationId xmlns:a16="http://schemas.microsoft.com/office/drawing/2014/main" id="{6E5F27CB-AEB4-8BA8-3770-DDAD8FE95CC8}"/>
-              </a:ext>
-            </a:extLst>
-          </p:cNvPr>
-          <p:cNvPicPr>
-            <a:picLocks noGrp="1" noChangeAspect="1"/>
-          </p:cNvPicPr>
-          <p:nvPr>
-            <p:ph idx="1"/>
-          </p:nvPr>
-        </p:nvPicPr>
-        <p:blipFill>
-          <a:blip r:embed="rId2"/>
-          <a:stretch>
-            <a:fillRect/>
-          </a:stretch>
-        </p:blipFill>
-        <p:spPr>
-          <a:xfrm>
-            <a:off x="1428098" y="1850698"/>
-            <a:ext cx="9335803" cy="4696480"/>
-          </a:xfrm>
-        </p:spPr>
-      </p:pic>
-      <p:sp>
-        <p:nvSpPr>
-          <p:cNvPr id="3" name="Title 2">
-            <a:extLst>
-              <a:ext uri="{FF2B5EF4-FFF2-40B4-BE49-F238E27FC236}">
-                <a16:creationId xmlns:a16="http://schemas.microsoft.com/office/drawing/2014/main" id="{E25C224B-2CEF-DDE5-AB3E-027E4E271948}"/>
-              </a:ext>
-            </a:extLst>
-          </p:cNvPr>
-          <p:cNvSpPr>
-            <a:spLocks noGrp="1"/>
-          </p:cNvSpPr>
-          <p:nvPr>
-            <p:ph type="title"/>
-          </p:nvPr>
-        </p:nvSpPr>
-        <p:spPr/>
-        <p:txBody>
-          <a:bodyPr/>
-          <a:lstStyle/>
-          <a:p>
-            <a:r>
-              <a:rPr lang="en-US" dirty="0"/>
-              <a:t>Iteration 1</a:t>
-            </a:r>
-          </a:p>
-        </p:txBody>
-      </p:sp>
-    </p:spTree>
-    <p:extLst>
-      <p:ext uri="{BB962C8B-B14F-4D97-AF65-F5344CB8AC3E}">
-        <p14:creationId xmlns:p14="http://schemas.microsoft.com/office/powerpoint/2010/main" val="720950840"/>
-      </p:ext>
-    </p:extLst>
-  </p:cSld>
-  <p:clrMapOvr>
-    <a:masterClrMapping/>
-  </p:clrMapOvr>
-</p:sld>
-</file>
-
-<file path=ppt/slides/slide25.xml><?xml version="1.0" encoding="utf-8"?>
-<p:sld xmlns:a="http://schemas.openxmlformats.org/drawingml/2006/main" xmlns:r="http://schemas.openxmlformats.org/officeDocument/2006/relationships" xmlns:p="http://schemas.openxmlformats.org/presentationml/2006/main">
-  <p:cSld>
-    <p:spTree>
-      <p:nvGrpSpPr>
-        <p:cNvPr id="1" name="">
-          <a:extLst>
-            <a:ext uri="{FF2B5EF4-FFF2-40B4-BE49-F238E27FC236}">
-              <a16:creationId xmlns:a16="http://schemas.microsoft.com/office/drawing/2014/main" id="{09B9C6A5-3422-7C5F-EB56-9696E9EF1F84}"/>
-            </a:ext>
-          </a:extLst>
-        </p:cNvPr>
-        <p:cNvGrpSpPr/>
-        <p:nvPr/>
-      </p:nvGrpSpPr>
-      <p:grpSpPr>
-        <a:xfrm>
-          <a:off x="0" y="0"/>
-          <a:ext cx="0" cy="0"/>
-          <a:chOff x="0" y="0"/>
-          <a:chExt cx="0" cy="0"/>
-        </a:xfrm>
-      </p:grpSpPr>
-      <p:pic>
-        <p:nvPicPr>
-          <p:cNvPr id="5" name="Content Placeholder 4">
-            <a:extLst>
-              <a:ext uri="{FF2B5EF4-FFF2-40B4-BE49-F238E27FC236}">
-                <a16:creationId xmlns:a16="http://schemas.microsoft.com/office/drawing/2014/main" id="{D6CC812E-5DFB-68F0-9F07-1F900E35FAE9}"/>
-              </a:ext>
-            </a:extLst>
-          </p:cNvPr>
-          <p:cNvPicPr>
-            <a:picLocks noGrp="1" noChangeAspect="1"/>
-          </p:cNvPicPr>
-          <p:nvPr>
-            <p:ph idx="1"/>
-          </p:nvPr>
-        </p:nvPicPr>
-        <p:blipFill>
-          <a:blip r:embed="rId2"/>
-          <a:stretch>
-            <a:fillRect/>
-          </a:stretch>
-        </p:blipFill>
-        <p:spPr>
-          <a:xfrm>
-            <a:off x="838200" y="1738697"/>
-            <a:ext cx="8983329" cy="4763165"/>
-          </a:xfrm>
-        </p:spPr>
-      </p:pic>
-      <p:sp>
-        <p:nvSpPr>
-          <p:cNvPr id="3" name="Title 2">
-            <a:extLst>
-              <a:ext uri="{FF2B5EF4-FFF2-40B4-BE49-F238E27FC236}">
-                <a16:creationId xmlns:a16="http://schemas.microsoft.com/office/drawing/2014/main" id="{82B918A9-C75B-A929-63B3-DEBA507D7A69}"/>
-              </a:ext>
-            </a:extLst>
-          </p:cNvPr>
-          <p:cNvSpPr>
-            <a:spLocks noGrp="1"/>
-          </p:cNvSpPr>
-          <p:nvPr>
-            <p:ph type="title"/>
-          </p:nvPr>
-        </p:nvSpPr>
-        <p:spPr/>
-        <p:txBody>
-          <a:bodyPr/>
-          <a:lstStyle/>
-          <a:p>
-            <a:r>
-              <a:rPr lang="en-US" dirty="0"/>
-              <a:t>Recompute Centroids</a:t>
-            </a:r>
-          </a:p>
-        </p:txBody>
-      </p:sp>
-    </p:spTree>
-    <p:extLst>
-      <p:ext uri="{BB962C8B-B14F-4D97-AF65-F5344CB8AC3E}">
-        <p14:creationId xmlns:p14="http://schemas.microsoft.com/office/powerpoint/2010/main" val="3527500105"/>
       </p:ext>
     </p:extLst>
   </p:cSld>
@@ -9454,7 +11131,7 @@
           <p:cNvPr id="5" name="Content Placeholder 4">
             <a:extLst>
               <a:ext uri="{FF2B5EF4-FFF2-40B4-BE49-F238E27FC236}">
-                <a16:creationId xmlns:a16="http://schemas.microsoft.com/office/drawing/2014/main" id="{45148756-767F-4DC5-3E03-A87FC22218A4}"/>
+                <a16:creationId xmlns:a16="http://schemas.microsoft.com/office/drawing/2014/main" id="{6E5F27CB-AEB4-8BA8-3770-DDAD8FE95CC8}"/>
               </a:ext>
             </a:extLst>
           </p:cNvPr>
@@ -9473,8 +11150,8 @@
         </p:blipFill>
         <p:spPr>
           <a:xfrm>
-            <a:off x="838200" y="1642503"/>
-            <a:ext cx="9291803" cy="5130800"/>
+            <a:off x="1428098" y="1850698"/>
+            <a:ext cx="9335803" cy="4696480"/>
           </a:xfrm>
         </p:spPr>
       </p:pic>
@@ -9483,7 +11160,7 @@
           <p:cNvPr id="3" name="Title 2">
             <a:extLst>
               <a:ext uri="{FF2B5EF4-FFF2-40B4-BE49-F238E27FC236}">
-                <a16:creationId xmlns:a16="http://schemas.microsoft.com/office/drawing/2014/main" id="{27EF1A9B-F247-97CD-9F76-765640F12DBA}"/>
+                <a16:creationId xmlns:a16="http://schemas.microsoft.com/office/drawing/2014/main" id="{E25C224B-2CEF-DDE5-AB3E-027E4E271948}"/>
               </a:ext>
             </a:extLst>
           </p:cNvPr>
@@ -9501,7 +11178,7 @@
           <a:p>
             <a:r>
               <a:rPr lang="en-US" dirty="0"/>
-              <a:t>Iteration 2</a:t>
+              <a:t>Iteration 1</a:t>
             </a:r>
           </a:p>
         </p:txBody>
@@ -9509,7 +11186,7 @@
     </p:spTree>
     <p:extLst>
       <p:ext uri="{BB962C8B-B14F-4D97-AF65-F5344CB8AC3E}">
-        <p14:creationId xmlns:p14="http://schemas.microsoft.com/office/powerpoint/2010/main" val="220586107"/>
+        <p14:creationId xmlns:p14="http://schemas.microsoft.com/office/powerpoint/2010/main" val="720950840"/>
       </p:ext>
     </p:extLst>
   </p:cSld>
@@ -9524,7 +11201,13 @@
   <p:cSld>
     <p:spTree>
       <p:nvGrpSpPr>
-        <p:cNvPr id="1" name=""/>
+        <p:cNvPr id="1" name="">
+          <a:extLst>
+            <a:ext uri="{FF2B5EF4-FFF2-40B4-BE49-F238E27FC236}">
+              <a16:creationId xmlns:a16="http://schemas.microsoft.com/office/drawing/2014/main" id="{09B9C6A5-3422-7C5F-EB56-9696E9EF1F84}"/>
+            </a:ext>
+          </a:extLst>
+        </p:cNvPr>
         <p:cNvGrpSpPr/>
         <p:nvPr/>
       </p:nvGrpSpPr>
@@ -9541,7 +11224,7 @@
           <p:cNvPr id="5" name="Content Placeholder 4">
             <a:extLst>
               <a:ext uri="{FF2B5EF4-FFF2-40B4-BE49-F238E27FC236}">
-                <a16:creationId xmlns:a16="http://schemas.microsoft.com/office/drawing/2014/main" id="{3B9DBA4F-425E-DC6E-B348-3BEC3C93A3D8}"/>
+                <a16:creationId xmlns:a16="http://schemas.microsoft.com/office/drawing/2014/main" id="{D6CC812E-5DFB-68F0-9F07-1F900E35FAE9}"/>
               </a:ext>
             </a:extLst>
           </p:cNvPr>
@@ -9560,8 +11243,8 @@
         </p:blipFill>
         <p:spPr>
           <a:xfrm>
-            <a:off x="838200" y="1633538"/>
-            <a:ext cx="7795021" cy="5130800"/>
+            <a:off x="838200" y="1738697"/>
+            <a:ext cx="8983329" cy="4763165"/>
           </a:xfrm>
         </p:spPr>
       </p:pic>
@@ -9570,7 +11253,7 @@
           <p:cNvPr id="3" name="Title 2">
             <a:extLst>
               <a:ext uri="{FF2B5EF4-FFF2-40B4-BE49-F238E27FC236}">
-                <a16:creationId xmlns:a16="http://schemas.microsoft.com/office/drawing/2014/main" id="{87FBF711-943A-A26E-DBF8-64895F800C88}"/>
+                <a16:creationId xmlns:a16="http://schemas.microsoft.com/office/drawing/2014/main" id="{82B918A9-C75B-A929-63B3-DEBA507D7A69}"/>
               </a:ext>
             </a:extLst>
           </p:cNvPr>
@@ -9588,7 +11271,7 @@
           <a:p>
             <a:r>
               <a:rPr lang="en-US" dirty="0"/>
-              <a:t>Iteration 2</a:t>
+              <a:t>Recompute Centroids</a:t>
             </a:r>
           </a:p>
         </p:txBody>
@@ -9596,7 +11279,7 @@
     </p:spTree>
     <p:extLst>
       <p:ext uri="{BB962C8B-B14F-4D97-AF65-F5344CB8AC3E}">
-        <p14:creationId xmlns:p14="http://schemas.microsoft.com/office/powerpoint/2010/main" val="387226928"/>
+        <p14:creationId xmlns:p14="http://schemas.microsoft.com/office/powerpoint/2010/main" val="3527500105"/>
       </p:ext>
     </p:extLst>
   </p:cSld>
@@ -9628,7 +11311,7 @@
           <p:cNvPr id="5" name="Content Placeholder 4">
             <a:extLst>
               <a:ext uri="{FF2B5EF4-FFF2-40B4-BE49-F238E27FC236}">
-                <a16:creationId xmlns:a16="http://schemas.microsoft.com/office/drawing/2014/main" id="{894CAF02-EF27-9105-2A49-E5CAC2F133AB}"/>
+                <a16:creationId xmlns:a16="http://schemas.microsoft.com/office/drawing/2014/main" id="{45148756-767F-4DC5-3E03-A87FC22218A4}"/>
               </a:ext>
             </a:extLst>
           </p:cNvPr>
@@ -9647,8 +11330,8 @@
         </p:blipFill>
         <p:spPr>
           <a:xfrm>
-            <a:off x="838200" y="1644053"/>
-            <a:ext cx="7459116" cy="4820323"/>
+            <a:off x="838200" y="1642503"/>
+            <a:ext cx="9291803" cy="5130800"/>
           </a:xfrm>
         </p:spPr>
       </p:pic>
@@ -9657,7 +11340,7 @@
           <p:cNvPr id="3" name="Title 2">
             <a:extLst>
               <a:ext uri="{FF2B5EF4-FFF2-40B4-BE49-F238E27FC236}">
-                <a16:creationId xmlns:a16="http://schemas.microsoft.com/office/drawing/2014/main" id="{C1D57D19-92D5-3BF3-025F-755276358DE7}"/>
+                <a16:creationId xmlns:a16="http://schemas.microsoft.com/office/drawing/2014/main" id="{27EF1A9B-F247-97CD-9F76-765640F12DBA}"/>
               </a:ext>
             </a:extLst>
           </p:cNvPr>
@@ -9683,7 +11366,7 @@
     </p:spTree>
     <p:extLst>
       <p:ext uri="{BB962C8B-B14F-4D97-AF65-F5344CB8AC3E}">
-        <p14:creationId xmlns:p14="http://schemas.microsoft.com/office/powerpoint/2010/main" val="3174966729"/>
+        <p14:creationId xmlns:p14="http://schemas.microsoft.com/office/powerpoint/2010/main" val="220586107"/>
       </p:ext>
     </p:extLst>
   </p:cSld>
@@ -9698,13 +11381,7 @@
   <p:cSld>
     <p:spTree>
       <p:nvGrpSpPr>
-        <p:cNvPr id="1" name="">
-          <a:extLst>
-            <a:ext uri="{FF2B5EF4-FFF2-40B4-BE49-F238E27FC236}">
-              <a16:creationId xmlns:a16="http://schemas.microsoft.com/office/drawing/2014/main" id="{796D51D0-ABEB-BFBD-57BB-585463CC3662}"/>
-            </a:ext>
-          </a:extLst>
-        </p:cNvPr>
+        <p:cNvPr id="1" name=""/>
         <p:cNvGrpSpPr/>
         <p:nvPr/>
       </p:nvGrpSpPr>
@@ -9716,58 +11393,41 @@
           <a:chExt cx="0" cy="0"/>
         </a:xfrm>
       </p:grpSpPr>
-      <p:sp>
-        <p:nvSpPr>
-          <p:cNvPr id="2" name="Content Placeholder 1">
-            <a:extLst>
-              <a:ext uri="{FF2B5EF4-FFF2-40B4-BE49-F238E27FC236}">
-                <a16:creationId xmlns:a16="http://schemas.microsoft.com/office/drawing/2014/main" id="{E0D0851D-A9E1-D6CE-957E-6B0D8DE9808F}"/>
-              </a:ext>
-            </a:extLst>
-          </p:cNvPr>
-          <p:cNvSpPr>
-            <a:spLocks noGrp="1"/>
-          </p:cNvSpPr>
+      <p:pic>
+        <p:nvPicPr>
+          <p:cNvPr id="5" name="Content Placeholder 4">
+            <a:extLst>
+              <a:ext uri="{FF2B5EF4-FFF2-40B4-BE49-F238E27FC236}">
+                <a16:creationId xmlns:a16="http://schemas.microsoft.com/office/drawing/2014/main" id="{3B9DBA4F-425E-DC6E-B348-3BEC3C93A3D8}"/>
+              </a:ext>
+            </a:extLst>
+          </p:cNvPr>
+          <p:cNvPicPr>
+            <a:picLocks noGrp="1" noChangeAspect="1"/>
+          </p:cNvPicPr>
           <p:nvPr>
             <p:ph idx="1"/>
           </p:nvPr>
-        </p:nvSpPr>
+        </p:nvPicPr>
+        <p:blipFill>
+          <a:blip r:embed="rId2"/>
+          <a:stretch>
+            <a:fillRect/>
+          </a:stretch>
+        </p:blipFill>
         <p:spPr>
           <a:xfrm>
-            <a:off x="838200" y="1633491"/>
-            <a:ext cx="10515600" cy="1629662"/>
+            <a:off x="838200" y="1633538"/>
+            <a:ext cx="7795021" cy="5130800"/>
           </a:xfrm>
         </p:spPr>
-        <p:txBody>
-          <a:bodyPr>
-            <a:normAutofit/>
-          </a:bodyPr>
-          <a:lstStyle/>
-          <a:p>
-            <a:pPr marL="285750" indent="-285750"/>
-            <a:r>
-              <a:rPr lang="en-US" sz="2000" dirty="0"/>
-              <a:t>Repeat the process and compute the distance to the new centroids and move the points to their new clusters.</a:t>
-            </a:r>
-          </a:p>
-          <a:p>
-            <a:pPr marL="285750" indent="-285750"/>
-            <a:r>
-              <a:rPr lang="en-US" sz="2000" dirty="0"/>
-              <a:t>Keep repeating the process until the points stops changing their clusters.</a:t>
-            </a:r>
-          </a:p>
-          <a:p>
-            <a:endParaRPr lang="en-US" sz="2000" dirty="0"/>
-          </a:p>
-        </p:txBody>
-      </p:sp>
+      </p:pic>
       <p:sp>
         <p:nvSpPr>
           <p:cNvPr id="3" name="Title 2">
             <a:extLst>
               <a:ext uri="{FF2B5EF4-FFF2-40B4-BE49-F238E27FC236}">
-                <a16:creationId xmlns:a16="http://schemas.microsoft.com/office/drawing/2014/main" id="{57D83FF7-CFAA-1BBE-453C-50EA492F6C78}"/>
+                <a16:creationId xmlns:a16="http://schemas.microsoft.com/office/drawing/2014/main" id="{87FBF711-943A-A26E-DBF8-64895F800C88}"/>
               </a:ext>
             </a:extLst>
           </p:cNvPr>
@@ -9785,7 +11445,7 @@
           <a:p>
             <a:r>
               <a:rPr lang="en-US" dirty="0"/>
-              <a:t>Repeat the process until convergence</a:t>
+              <a:t>Iteration 2</a:t>
             </a:r>
           </a:p>
         </p:txBody>
@@ -9793,7 +11453,7 @@
     </p:spTree>
     <p:extLst>
       <p:ext uri="{BB962C8B-B14F-4D97-AF65-F5344CB8AC3E}">
-        <p14:creationId xmlns:p14="http://schemas.microsoft.com/office/powerpoint/2010/main" val="3677226602"/>
+        <p14:creationId xmlns:p14="http://schemas.microsoft.com/office/powerpoint/2010/main" val="387226928"/>
       </p:ext>
     </p:extLst>
   </p:cSld>
@@ -9926,6 +11586,203 @@
 </p:sld>
 </file>
 
+<file path=ppt/slides/slide30.xml><?xml version="1.0" encoding="utf-8"?>
+<p:sld xmlns:a="http://schemas.openxmlformats.org/drawingml/2006/main" xmlns:r="http://schemas.openxmlformats.org/officeDocument/2006/relationships" xmlns:p="http://schemas.openxmlformats.org/presentationml/2006/main">
+  <p:cSld>
+    <p:spTree>
+      <p:nvGrpSpPr>
+        <p:cNvPr id="1" name=""/>
+        <p:cNvGrpSpPr/>
+        <p:nvPr/>
+      </p:nvGrpSpPr>
+      <p:grpSpPr>
+        <a:xfrm>
+          <a:off x="0" y="0"/>
+          <a:ext cx="0" cy="0"/>
+          <a:chOff x="0" y="0"/>
+          <a:chExt cx="0" cy="0"/>
+        </a:xfrm>
+      </p:grpSpPr>
+      <p:pic>
+        <p:nvPicPr>
+          <p:cNvPr id="5" name="Content Placeholder 4">
+            <a:extLst>
+              <a:ext uri="{FF2B5EF4-FFF2-40B4-BE49-F238E27FC236}">
+                <a16:creationId xmlns:a16="http://schemas.microsoft.com/office/drawing/2014/main" id="{894CAF02-EF27-9105-2A49-E5CAC2F133AB}"/>
+              </a:ext>
+            </a:extLst>
+          </p:cNvPr>
+          <p:cNvPicPr>
+            <a:picLocks noGrp="1" noChangeAspect="1"/>
+          </p:cNvPicPr>
+          <p:nvPr>
+            <p:ph idx="1"/>
+          </p:nvPr>
+        </p:nvPicPr>
+        <p:blipFill>
+          <a:blip r:embed="rId2"/>
+          <a:stretch>
+            <a:fillRect/>
+          </a:stretch>
+        </p:blipFill>
+        <p:spPr>
+          <a:xfrm>
+            <a:off x="838200" y="1644053"/>
+            <a:ext cx="7459116" cy="4820323"/>
+          </a:xfrm>
+        </p:spPr>
+      </p:pic>
+      <p:sp>
+        <p:nvSpPr>
+          <p:cNvPr id="3" name="Title 2">
+            <a:extLst>
+              <a:ext uri="{FF2B5EF4-FFF2-40B4-BE49-F238E27FC236}">
+                <a16:creationId xmlns:a16="http://schemas.microsoft.com/office/drawing/2014/main" id="{C1D57D19-92D5-3BF3-025F-755276358DE7}"/>
+              </a:ext>
+            </a:extLst>
+          </p:cNvPr>
+          <p:cNvSpPr>
+            <a:spLocks noGrp="1"/>
+          </p:cNvSpPr>
+          <p:nvPr>
+            <p:ph type="title"/>
+          </p:nvPr>
+        </p:nvSpPr>
+        <p:spPr/>
+        <p:txBody>
+          <a:bodyPr/>
+          <a:lstStyle/>
+          <a:p>
+            <a:r>
+              <a:rPr lang="en-US" dirty="0"/>
+              <a:t>Iteration 2</a:t>
+            </a:r>
+          </a:p>
+        </p:txBody>
+      </p:sp>
+    </p:spTree>
+    <p:extLst>
+      <p:ext uri="{BB962C8B-B14F-4D97-AF65-F5344CB8AC3E}">
+        <p14:creationId xmlns:p14="http://schemas.microsoft.com/office/powerpoint/2010/main" val="3174966729"/>
+      </p:ext>
+    </p:extLst>
+  </p:cSld>
+  <p:clrMapOvr>
+    <a:masterClrMapping/>
+  </p:clrMapOvr>
+</p:sld>
+</file>
+
+<file path=ppt/slides/slide31.xml><?xml version="1.0" encoding="utf-8"?>
+<p:sld xmlns:a="http://schemas.openxmlformats.org/drawingml/2006/main" xmlns:r="http://schemas.openxmlformats.org/officeDocument/2006/relationships" xmlns:p="http://schemas.openxmlformats.org/presentationml/2006/main">
+  <p:cSld>
+    <p:spTree>
+      <p:nvGrpSpPr>
+        <p:cNvPr id="1" name="">
+          <a:extLst>
+            <a:ext uri="{FF2B5EF4-FFF2-40B4-BE49-F238E27FC236}">
+              <a16:creationId xmlns:a16="http://schemas.microsoft.com/office/drawing/2014/main" id="{796D51D0-ABEB-BFBD-57BB-585463CC3662}"/>
+            </a:ext>
+          </a:extLst>
+        </p:cNvPr>
+        <p:cNvGrpSpPr/>
+        <p:nvPr/>
+      </p:nvGrpSpPr>
+      <p:grpSpPr>
+        <a:xfrm>
+          <a:off x="0" y="0"/>
+          <a:ext cx="0" cy="0"/>
+          <a:chOff x="0" y="0"/>
+          <a:chExt cx="0" cy="0"/>
+        </a:xfrm>
+      </p:grpSpPr>
+      <p:sp>
+        <p:nvSpPr>
+          <p:cNvPr id="2" name="Content Placeholder 1">
+            <a:extLst>
+              <a:ext uri="{FF2B5EF4-FFF2-40B4-BE49-F238E27FC236}">
+                <a16:creationId xmlns:a16="http://schemas.microsoft.com/office/drawing/2014/main" id="{E0D0851D-A9E1-D6CE-957E-6B0D8DE9808F}"/>
+              </a:ext>
+            </a:extLst>
+          </p:cNvPr>
+          <p:cNvSpPr>
+            <a:spLocks noGrp="1"/>
+          </p:cNvSpPr>
+          <p:nvPr>
+            <p:ph idx="1"/>
+          </p:nvPr>
+        </p:nvSpPr>
+        <p:spPr>
+          <a:xfrm>
+            <a:off x="838200" y="1633491"/>
+            <a:ext cx="10515600" cy="1629662"/>
+          </a:xfrm>
+        </p:spPr>
+        <p:txBody>
+          <a:bodyPr>
+            <a:normAutofit/>
+          </a:bodyPr>
+          <a:lstStyle/>
+          <a:p>
+            <a:pPr marL="285750" indent="-285750"/>
+            <a:r>
+              <a:rPr lang="en-US" sz="2000" dirty="0"/>
+              <a:t>Repeat the process and compute the distance to the new centroids and move the points to their new clusters.</a:t>
+            </a:r>
+          </a:p>
+          <a:p>
+            <a:pPr marL="285750" indent="-285750"/>
+            <a:r>
+              <a:rPr lang="en-US" sz="2000" dirty="0"/>
+              <a:t>Keep repeating the process until the points stops changing their clusters.</a:t>
+            </a:r>
+          </a:p>
+          <a:p>
+            <a:endParaRPr lang="en-US" sz="2000" dirty="0"/>
+          </a:p>
+        </p:txBody>
+      </p:sp>
+      <p:sp>
+        <p:nvSpPr>
+          <p:cNvPr id="3" name="Title 2">
+            <a:extLst>
+              <a:ext uri="{FF2B5EF4-FFF2-40B4-BE49-F238E27FC236}">
+                <a16:creationId xmlns:a16="http://schemas.microsoft.com/office/drawing/2014/main" id="{57D83FF7-CFAA-1BBE-453C-50EA492F6C78}"/>
+              </a:ext>
+            </a:extLst>
+          </p:cNvPr>
+          <p:cNvSpPr>
+            <a:spLocks noGrp="1"/>
+          </p:cNvSpPr>
+          <p:nvPr>
+            <p:ph type="title"/>
+          </p:nvPr>
+        </p:nvSpPr>
+        <p:spPr/>
+        <p:txBody>
+          <a:bodyPr/>
+          <a:lstStyle/>
+          <a:p>
+            <a:r>
+              <a:rPr lang="en-US" dirty="0"/>
+              <a:t>Repeat the process until convergence</a:t>
+            </a:r>
+          </a:p>
+        </p:txBody>
+      </p:sp>
+    </p:spTree>
+    <p:extLst>
+      <p:ext uri="{BB962C8B-B14F-4D97-AF65-F5344CB8AC3E}">
+        <p14:creationId xmlns:p14="http://schemas.microsoft.com/office/powerpoint/2010/main" val="3677226602"/>
+      </p:ext>
+    </p:extLst>
+  </p:cSld>
+  <p:clrMapOvr>
+    <a:masterClrMapping/>
+  </p:clrMapOvr>
+</p:sld>
+</file>
+
 <file path=ppt/slides/slide4.xml><?xml version="1.0" encoding="utf-8"?>
 <p:sld xmlns:a="http://schemas.openxmlformats.org/drawingml/2006/main" xmlns:r="http://schemas.openxmlformats.org/officeDocument/2006/relationships" xmlns:p="http://schemas.openxmlformats.org/presentationml/2006/main">
   <p:cSld>
@@ -10041,13 +11898,13 @@
           <p:nvPr>
             <p:extLst>
               <p:ext uri="{D42A27DB-BD31-4B8C-83A1-F6EECF244321}">
-                <p14:modId xmlns:p14="http://schemas.microsoft.com/office/powerpoint/2010/main" val="722495271"/>
+                <p14:modId xmlns:p14="http://schemas.microsoft.com/office/powerpoint/2010/main" val="2784371521"/>
               </p:ext>
             </p:extLst>
           </p:nvPr>
         </p:nvGraphicFramePr>
         <p:xfrm>
-          <a:off x="838200" y="3191781"/>
+          <a:off x="838200" y="2884748"/>
           <a:ext cx="10515600" cy="2194560"/>
         </p:xfrm>
         <a:graphic>
@@ -10264,10 +12121,10 @@
                     <a:lstStyle/>
                     <a:p>
                       <a:r>
-                        <a:rPr lang="en-US" b="1"/>
+                        <a:rPr lang="en-US" b="1" dirty="0"/>
                         <a:t>Medical Cost Estimation</a:t>
                       </a:r>
-                      <a:endParaRPr lang="en-US"/>
+                      <a:endParaRPr lang="en-US" dirty="0"/>
                     </a:p>
                   </a:txBody>
                   <a:tcPr anchor="ctr"/>

</xml_diff>